<commit_message>
Remove chrM from the illustration
</commit_message>
<xml_diff>
--- a/Machine_Learning_Random_Forests/Dataset_Profile.pptx
+++ b/Machine_Learning_Random_Forests/Dataset_Profile.pptx
@@ -107,6 +107,11 @@
       </a:defRPr>
     </a:lvl9pPr>
   </p:defaultTextStyle>
+  <p:extLst>
+    <p:ext uri="{EFAFB233-063F-42B5-8137-9DF3F51BA10A}">
+      <p15:sldGuideLst xmlns:p15="http://schemas.microsoft.com/office/powerpoint/2012/main"/>
+    </p:ext>
+  </p:extLst>
 </p:presentation>
 </file>
 
@@ -2614,43 +2619,6 @@
         </a:p>
       </dgm:t>
     </dgm:pt>
-    <dgm:pt modelId="{3FC442DB-3FAF-9C47-9463-E1ED64C9DCA7}">
-      <dgm:prSet phldrT="[Text]"/>
-      <dgm:spPr/>
-      <dgm:t>
-        <a:bodyPr/>
-        <a:lstStyle/>
-        <a:p>
-          <a:r>
-            <a:rPr lang="en-US" dirty="0" err="1"/>
-            <a:t>chrM</a:t>
-          </a:r>
-          <a:endParaRPr lang="en-US" dirty="0"/>
-        </a:p>
-      </dgm:t>
-    </dgm:pt>
-    <dgm:pt modelId="{47093809-A9C8-C641-AA7F-B0FD0F52B50F}" type="parTrans" cxnId="{4456D5D2-6603-EF47-A30D-18E4B5F1B377}">
-      <dgm:prSet/>
-      <dgm:spPr/>
-      <dgm:t>
-        <a:bodyPr/>
-        <a:lstStyle/>
-        <a:p>
-          <a:endParaRPr lang="en-US"/>
-        </a:p>
-      </dgm:t>
-    </dgm:pt>
-    <dgm:pt modelId="{8293BB08-09C3-E542-9D80-F066763BAC0C}" type="sibTrans" cxnId="{4456D5D2-6603-EF47-A30D-18E4B5F1B377}">
-      <dgm:prSet/>
-      <dgm:spPr/>
-      <dgm:t>
-        <a:bodyPr/>
-        <a:lstStyle/>
-        <a:p>
-          <a:endParaRPr lang="en-US"/>
-        </a:p>
-      </dgm:t>
-    </dgm:pt>
     <dgm:pt modelId="{3EBB9E4D-B769-104C-A202-07B497D123E2}">
       <dgm:prSet phldrT="[Text]"/>
       <dgm:spPr/>
@@ -2801,11 +2769,11 @@
       <dgm:spPr/>
     </dgm:pt>
     <dgm:pt modelId="{55F6D424-0C3E-9746-81D6-3992B3097CE6}" type="pres">
-      <dgm:prSet presAssocID="{FE170462-FE36-2445-88C8-6703125B5DDB}" presName="Name25" presStyleLbl="parChTrans1D2" presStyleIdx="0" presStyleCnt="25"/>
+      <dgm:prSet presAssocID="{FE170462-FE36-2445-88C8-6703125B5DDB}" presName="Name25" presStyleLbl="parChTrans1D2" presStyleIdx="0" presStyleCnt="24"/>
       <dgm:spPr/>
     </dgm:pt>
     <dgm:pt modelId="{5F27C417-6E2E-0D40-B336-182FD9B2AE07}" type="pres">
-      <dgm:prSet presAssocID="{FE170462-FE36-2445-88C8-6703125B5DDB}" presName="connTx" presStyleLbl="parChTrans1D2" presStyleIdx="0" presStyleCnt="25"/>
+      <dgm:prSet presAssocID="{FE170462-FE36-2445-88C8-6703125B5DDB}" presName="connTx" presStyleLbl="parChTrans1D2" presStyleIdx="0" presStyleCnt="24"/>
       <dgm:spPr/>
     </dgm:pt>
     <dgm:pt modelId="{A3F11FED-50A1-854C-A321-5E8E6A877D2B}" type="pres">
@@ -2813,7 +2781,7 @@
       <dgm:spPr/>
     </dgm:pt>
     <dgm:pt modelId="{2D43822A-D53D-BA46-9910-38E933BE5F5E}" type="pres">
-      <dgm:prSet presAssocID="{C3013AF6-A5CD-7E43-9E34-048C85B4186A}" presName="level2Shape" presStyleLbl="node2" presStyleIdx="0" presStyleCnt="25" custLinFactNeighborX="-5108" custLinFactNeighborY="-2168"/>
+      <dgm:prSet presAssocID="{C3013AF6-A5CD-7E43-9E34-048C85B4186A}" presName="level2Shape" presStyleLbl="node2" presStyleIdx="0" presStyleCnt="24" custLinFactNeighborX="-5108" custLinFactNeighborY="-2168"/>
       <dgm:spPr/>
     </dgm:pt>
     <dgm:pt modelId="{E41C9119-2925-EA40-A096-B66F99779F6A}" type="pres">
@@ -2821,11 +2789,11 @@
       <dgm:spPr/>
     </dgm:pt>
     <dgm:pt modelId="{CA1501D0-BB60-2A44-BDD1-5C704DEBDF47}" type="pres">
-      <dgm:prSet presAssocID="{F0A61594-EAF8-8E42-8792-171B56BBB246}" presName="Name25" presStyleLbl="parChTrans1D2" presStyleIdx="1" presStyleCnt="25"/>
+      <dgm:prSet presAssocID="{F0A61594-EAF8-8E42-8792-171B56BBB246}" presName="Name25" presStyleLbl="parChTrans1D2" presStyleIdx="1" presStyleCnt="24"/>
       <dgm:spPr/>
     </dgm:pt>
     <dgm:pt modelId="{77216575-51C7-354B-89B0-1E0575870855}" type="pres">
-      <dgm:prSet presAssocID="{F0A61594-EAF8-8E42-8792-171B56BBB246}" presName="connTx" presStyleLbl="parChTrans1D2" presStyleIdx="1" presStyleCnt="25"/>
+      <dgm:prSet presAssocID="{F0A61594-EAF8-8E42-8792-171B56BBB246}" presName="connTx" presStyleLbl="parChTrans1D2" presStyleIdx="1" presStyleCnt="24"/>
       <dgm:spPr/>
     </dgm:pt>
     <dgm:pt modelId="{B988086F-B17B-404C-B634-827AE3E4665B}" type="pres">
@@ -2833,7 +2801,7 @@
       <dgm:spPr/>
     </dgm:pt>
     <dgm:pt modelId="{DF967CC0-5D1D-3D47-B26B-BFE911929264}" type="pres">
-      <dgm:prSet presAssocID="{1691AC4C-1901-A844-80D2-D4241630105F}" presName="level2Shape" presStyleLbl="node2" presStyleIdx="1" presStyleCnt="25"/>
+      <dgm:prSet presAssocID="{1691AC4C-1901-A844-80D2-D4241630105F}" presName="level2Shape" presStyleLbl="node2" presStyleIdx="1" presStyleCnt="24"/>
       <dgm:spPr/>
     </dgm:pt>
     <dgm:pt modelId="{B1D30185-E9FD-314B-A02D-8B32033AEEA1}" type="pres">
@@ -2841,11 +2809,11 @@
       <dgm:spPr/>
     </dgm:pt>
     <dgm:pt modelId="{51555E19-D16B-9F42-8D99-15EE5C9E9404}" type="pres">
-      <dgm:prSet presAssocID="{12F2A5AD-0EF0-7C4E-A44A-01ACD0D00E7D}" presName="Name25" presStyleLbl="parChTrans1D2" presStyleIdx="2" presStyleCnt="25"/>
+      <dgm:prSet presAssocID="{12F2A5AD-0EF0-7C4E-A44A-01ACD0D00E7D}" presName="Name25" presStyleLbl="parChTrans1D2" presStyleIdx="2" presStyleCnt="24"/>
       <dgm:spPr/>
     </dgm:pt>
     <dgm:pt modelId="{EC567BCA-7C43-1D45-B05E-3D11674B54EE}" type="pres">
-      <dgm:prSet presAssocID="{12F2A5AD-0EF0-7C4E-A44A-01ACD0D00E7D}" presName="connTx" presStyleLbl="parChTrans1D2" presStyleIdx="2" presStyleCnt="25"/>
+      <dgm:prSet presAssocID="{12F2A5AD-0EF0-7C4E-A44A-01ACD0D00E7D}" presName="connTx" presStyleLbl="parChTrans1D2" presStyleIdx="2" presStyleCnt="24"/>
       <dgm:spPr/>
     </dgm:pt>
     <dgm:pt modelId="{A3E38D11-B873-5942-8DE2-C3F9D1D1F599}" type="pres">
@@ -2853,7 +2821,7 @@
       <dgm:spPr/>
     </dgm:pt>
     <dgm:pt modelId="{7FBB34B1-6FC2-2448-B193-46CAF63327D6}" type="pres">
-      <dgm:prSet presAssocID="{440C823C-CF5F-4B4E-BCAF-A55A3D4CECFB}" presName="level2Shape" presStyleLbl="node2" presStyleIdx="2" presStyleCnt="25"/>
+      <dgm:prSet presAssocID="{440C823C-CF5F-4B4E-BCAF-A55A3D4CECFB}" presName="level2Shape" presStyleLbl="node2" presStyleIdx="2" presStyleCnt="24"/>
       <dgm:spPr/>
     </dgm:pt>
     <dgm:pt modelId="{5460D437-733F-0544-AE0B-E13C7E3CBEE6}" type="pres">
@@ -2861,11 +2829,11 @@
       <dgm:spPr/>
     </dgm:pt>
     <dgm:pt modelId="{851004DB-3D27-8D41-B7D8-F5585A05FBC9}" type="pres">
-      <dgm:prSet presAssocID="{55813A8D-0398-7E48-BB6C-3D42D9A39C1F}" presName="Name25" presStyleLbl="parChTrans1D2" presStyleIdx="3" presStyleCnt="25"/>
+      <dgm:prSet presAssocID="{55813A8D-0398-7E48-BB6C-3D42D9A39C1F}" presName="Name25" presStyleLbl="parChTrans1D2" presStyleIdx="3" presStyleCnt="24"/>
       <dgm:spPr/>
     </dgm:pt>
     <dgm:pt modelId="{546BA940-855E-0746-AAA3-65170F145A45}" type="pres">
-      <dgm:prSet presAssocID="{55813A8D-0398-7E48-BB6C-3D42D9A39C1F}" presName="connTx" presStyleLbl="parChTrans1D2" presStyleIdx="3" presStyleCnt="25"/>
+      <dgm:prSet presAssocID="{55813A8D-0398-7E48-BB6C-3D42D9A39C1F}" presName="connTx" presStyleLbl="parChTrans1D2" presStyleIdx="3" presStyleCnt="24"/>
       <dgm:spPr/>
     </dgm:pt>
     <dgm:pt modelId="{E0AEDF77-0C38-694B-A807-76DDAE0F72AD}" type="pres">
@@ -2873,7 +2841,7 @@
       <dgm:spPr/>
     </dgm:pt>
     <dgm:pt modelId="{CCE3219C-C860-364F-8077-CC9B11A019CF}" type="pres">
-      <dgm:prSet presAssocID="{019C8F76-9496-D74F-9AA0-83B26F49B7EC}" presName="level2Shape" presStyleLbl="node2" presStyleIdx="3" presStyleCnt="25"/>
+      <dgm:prSet presAssocID="{019C8F76-9496-D74F-9AA0-83B26F49B7EC}" presName="level2Shape" presStyleLbl="node2" presStyleIdx="3" presStyleCnt="24"/>
       <dgm:spPr/>
     </dgm:pt>
     <dgm:pt modelId="{BA7C625A-06BD-B849-AA4A-087771787853}" type="pres">
@@ -2881,11 +2849,11 @@
       <dgm:spPr/>
     </dgm:pt>
     <dgm:pt modelId="{54CF4744-7EFB-8F4A-8559-6EA33EA2B829}" type="pres">
-      <dgm:prSet presAssocID="{4D3D3C34-2DA6-2A47-BAD6-AE2BA70D99C9}" presName="Name25" presStyleLbl="parChTrans1D2" presStyleIdx="4" presStyleCnt="25"/>
+      <dgm:prSet presAssocID="{4D3D3C34-2DA6-2A47-BAD6-AE2BA70D99C9}" presName="Name25" presStyleLbl="parChTrans1D2" presStyleIdx="4" presStyleCnt="24"/>
       <dgm:spPr/>
     </dgm:pt>
     <dgm:pt modelId="{7BF09617-48DF-3E4E-8140-945A2A20A7BB}" type="pres">
-      <dgm:prSet presAssocID="{4D3D3C34-2DA6-2A47-BAD6-AE2BA70D99C9}" presName="connTx" presStyleLbl="parChTrans1D2" presStyleIdx="4" presStyleCnt="25"/>
+      <dgm:prSet presAssocID="{4D3D3C34-2DA6-2A47-BAD6-AE2BA70D99C9}" presName="connTx" presStyleLbl="parChTrans1D2" presStyleIdx="4" presStyleCnt="24"/>
       <dgm:spPr/>
     </dgm:pt>
     <dgm:pt modelId="{3D3FC740-6F7C-B746-914C-6111C6BA3610}" type="pres">
@@ -2893,7 +2861,7 @@
       <dgm:spPr/>
     </dgm:pt>
     <dgm:pt modelId="{D48B78A3-B660-484C-A33E-190B59FC9068}" type="pres">
-      <dgm:prSet presAssocID="{AE30B095-8A50-7440-BDC9-A13E8DDC0F7A}" presName="level2Shape" presStyleLbl="node2" presStyleIdx="4" presStyleCnt="25"/>
+      <dgm:prSet presAssocID="{AE30B095-8A50-7440-BDC9-A13E8DDC0F7A}" presName="level2Shape" presStyleLbl="node2" presStyleIdx="4" presStyleCnt="24"/>
       <dgm:spPr/>
     </dgm:pt>
     <dgm:pt modelId="{435E670A-8949-9040-9887-17509128CEBF}" type="pres">
@@ -2901,11 +2869,11 @@
       <dgm:spPr/>
     </dgm:pt>
     <dgm:pt modelId="{870FCE60-2715-3746-82DB-6C354285458E}" type="pres">
-      <dgm:prSet presAssocID="{040ABEB4-CF52-7B45-821A-26FA5CDEB67B}" presName="Name25" presStyleLbl="parChTrans1D2" presStyleIdx="5" presStyleCnt="25"/>
+      <dgm:prSet presAssocID="{040ABEB4-CF52-7B45-821A-26FA5CDEB67B}" presName="Name25" presStyleLbl="parChTrans1D2" presStyleIdx="5" presStyleCnt="24"/>
       <dgm:spPr/>
     </dgm:pt>
     <dgm:pt modelId="{54DFD968-11EF-8D4F-A568-3D2920A006E8}" type="pres">
-      <dgm:prSet presAssocID="{040ABEB4-CF52-7B45-821A-26FA5CDEB67B}" presName="connTx" presStyleLbl="parChTrans1D2" presStyleIdx="5" presStyleCnt="25"/>
+      <dgm:prSet presAssocID="{040ABEB4-CF52-7B45-821A-26FA5CDEB67B}" presName="connTx" presStyleLbl="parChTrans1D2" presStyleIdx="5" presStyleCnt="24"/>
       <dgm:spPr/>
     </dgm:pt>
     <dgm:pt modelId="{AFCB1BF0-25E1-144C-AD7E-26206AA27343}" type="pres">
@@ -2913,7 +2881,7 @@
       <dgm:spPr/>
     </dgm:pt>
     <dgm:pt modelId="{3A900AD8-E4D1-874A-BFF9-E7ED232100E1}" type="pres">
-      <dgm:prSet presAssocID="{B73A77CB-7DBD-F04A-93D1-035ED33470A8}" presName="level2Shape" presStyleLbl="node2" presStyleIdx="5" presStyleCnt="25"/>
+      <dgm:prSet presAssocID="{B73A77CB-7DBD-F04A-93D1-035ED33470A8}" presName="level2Shape" presStyleLbl="node2" presStyleIdx="5" presStyleCnt="24"/>
       <dgm:spPr/>
     </dgm:pt>
     <dgm:pt modelId="{EB504ADC-8BA0-5644-9623-54BDB4050A95}" type="pres">
@@ -2921,11 +2889,11 @@
       <dgm:spPr/>
     </dgm:pt>
     <dgm:pt modelId="{D7DAE6FF-862E-904E-AA50-ABB148E11EB4}" type="pres">
-      <dgm:prSet presAssocID="{93915103-2624-684A-ACF8-91A5BF07F55F}" presName="Name25" presStyleLbl="parChTrans1D2" presStyleIdx="6" presStyleCnt="25"/>
+      <dgm:prSet presAssocID="{93915103-2624-684A-ACF8-91A5BF07F55F}" presName="Name25" presStyleLbl="parChTrans1D2" presStyleIdx="6" presStyleCnt="24"/>
       <dgm:spPr/>
     </dgm:pt>
     <dgm:pt modelId="{9B8DD4B9-CDF5-9343-97C0-8F9376F28583}" type="pres">
-      <dgm:prSet presAssocID="{93915103-2624-684A-ACF8-91A5BF07F55F}" presName="connTx" presStyleLbl="parChTrans1D2" presStyleIdx="6" presStyleCnt="25"/>
+      <dgm:prSet presAssocID="{93915103-2624-684A-ACF8-91A5BF07F55F}" presName="connTx" presStyleLbl="parChTrans1D2" presStyleIdx="6" presStyleCnt="24"/>
       <dgm:spPr/>
     </dgm:pt>
     <dgm:pt modelId="{72B55E13-7242-E64A-AFE8-0EE279DEF8CB}" type="pres">
@@ -2933,7 +2901,7 @@
       <dgm:spPr/>
     </dgm:pt>
     <dgm:pt modelId="{6FF70F9E-F18C-A549-9540-2E619403D71F}" type="pres">
-      <dgm:prSet presAssocID="{50E621B2-BFC9-1646-B69E-A31B2B218040}" presName="level2Shape" presStyleLbl="node2" presStyleIdx="6" presStyleCnt="25"/>
+      <dgm:prSet presAssocID="{50E621B2-BFC9-1646-B69E-A31B2B218040}" presName="level2Shape" presStyleLbl="node2" presStyleIdx="6" presStyleCnt="24"/>
       <dgm:spPr/>
     </dgm:pt>
     <dgm:pt modelId="{4D2328E8-2161-E040-8717-8E76ECBC4C58}" type="pres">
@@ -2941,11 +2909,11 @@
       <dgm:spPr/>
     </dgm:pt>
     <dgm:pt modelId="{70BF2D5B-6425-5D40-8C55-CC92D08C6D9F}" type="pres">
-      <dgm:prSet presAssocID="{F590A5D4-F227-594C-9EE0-FE054F028F14}" presName="Name25" presStyleLbl="parChTrans1D2" presStyleIdx="7" presStyleCnt="25"/>
+      <dgm:prSet presAssocID="{F590A5D4-F227-594C-9EE0-FE054F028F14}" presName="Name25" presStyleLbl="parChTrans1D2" presStyleIdx="7" presStyleCnt="24"/>
       <dgm:spPr/>
     </dgm:pt>
     <dgm:pt modelId="{59BFB2F0-1993-9446-B2C0-AA9620680450}" type="pres">
-      <dgm:prSet presAssocID="{F590A5D4-F227-594C-9EE0-FE054F028F14}" presName="connTx" presStyleLbl="parChTrans1D2" presStyleIdx="7" presStyleCnt="25"/>
+      <dgm:prSet presAssocID="{F590A5D4-F227-594C-9EE0-FE054F028F14}" presName="connTx" presStyleLbl="parChTrans1D2" presStyleIdx="7" presStyleCnt="24"/>
       <dgm:spPr/>
     </dgm:pt>
     <dgm:pt modelId="{6BEFCA83-3B69-3340-9FA4-3DB704464F1B}" type="pres">
@@ -2953,7 +2921,7 @@
       <dgm:spPr/>
     </dgm:pt>
     <dgm:pt modelId="{AF20F9D4-A121-A844-B26D-00C13F030434}" type="pres">
-      <dgm:prSet presAssocID="{784BC7F6-B521-9E42-94CA-E6E78986E2B6}" presName="level2Shape" presStyleLbl="node2" presStyleIdx="7" presStyleCnt="25"/>
+      <dgm:prSet presAssocID="{784BC7F6-B521-9E42-94CA-E6E78986E2B6}" presName="level2Shape" presStyleLbl="node2" presStyleIdx="7" presStyleCnt="24"/>
       <dgm:spPr/>
     </dgm:pt>
     <dgm:pt modelId="{6CEE75D2-B67F-074B-9C5C-ED5485FF5256}" type="pres">
@@ -2961,11 +2929,11 @@
       <dgm:spPr/>
     </dgm:pt>
     <dgm:pt modelId="{812DE7EE-50D0-FA41-BB8B-3C7C1F2E6173}" type="pres">
-      <dgm:prSet presAssocID="{C7A8F4DA-F093-2F4C-A8F2-1CAE9F19D3CF}" presName="Name25" presStyleLbl="parChTrans1D2" presStyleIdx="8" presStyleCnt="25"/>
+      <dgm:prSet presAssocID="{C7A8F4DA-F093-2F4C-A8F2-1CAE9F19D3CF}" presName="Name25" presStyleLbl="parChTrans1D2" presStyleIdx="8" presStyleCnt="24"/>
       <dgm:spPr/>
     </dgm:pt>
     <dgm:pt modelId="{7B658FF8-B5C8-284D-8233-E4D1D3EA382D}" type="pres">
-      <dgm:prSet presAssocID="{C7A8F4DA-F093-2F4C-A8F2-1CAE9F19D3CF}" presName="connTx" presStyleLbl="parChTrans1D2" presStyleIdx="8" presStyleCnt="25"/>
+      <dgm:prSet presAssocID="{C7A8F4DA-F093-2F4C-A8F2-1CAE9F19D3CF}" presName="connTx" presStyleLbl="parChTrans1D2" presStyleIdx="8" presStyleCnt="24"/>
       <dgm:spPr/>
     </dgm:pt>
     <dgm:pt modelId="{3B41F8EE-841D-5A42-A5FB-4C3A8C52D068}" type="pres">
@@ -2973,7 +2941,7 @@
       <dgm:spPr/>
     </dgm:pt>
     <dgm:pt modelId="{B53F28F2-8DC7-FF41-8194-031D6090094F}" type="pres">
-      <dgm:prSet presAssocID="{9B654400-210F-154B-82AE-D517A31FC37B}" presName="level2Shape" presStyleLbl="node2" presStyleIdx="8" presStyleCnt="25"/>
+      <dgm:prSet presAssocID="{9B654400-210F-154B-82AE-D517A31FC37B}" presName="level2Shape" presStyleLbl="node2" presStyleIdx="8" presStyleCnt="24"/>
       <dgm:spPr/>
     </dgm:pt>
     <dgm:pt modelId="{C70F43E5-D13C-0B42-9D4D-CEE4740ED5CD}" type="pres">
@@ -2981,11 +2949,11 @@
       <dgm:spPr/>
     </dgm:pt>
     <dgm:pt modelId="{C4518E9A-E7BC-B64C-9E82-50DAC7362BE3}" type="pres">
-      <dgm:prSet presAssocID="{C7C7742D-0EF2-684D-8EE2-CD033EED53AC}" presName="Name25" presStyleLbl="parChTrans1D2" presStyleIdx="9" presStyleCnt="25"/>
+      <dgm:prSet presAssocID="{C7C7742D-0EF2-684D-8EE2-CD033EED53AC}" presName="Name25" presStyleLbl="parChTrans1D2" presStyleIdx="9" presStyleCnt="24"/>
       <dgm:spPr/>
     </dgm:pt>
     <dgm:pt modelId="{F970713F-D8C1-EF45-B118-5D1C6A54FDF2}" type="pres">
-      <dgm:prSet presAssocID="{C7C7742D-0EF2-684D-8EE2-CD033EED53AC}" presName="connTx" presStyleLbl="parChTrans1D2" presStyleIdx="9" presStyleCnt="25"/>
+      <dgm:prSet presAssocID="{C7C7742D-0EF2-684D-8EE2-CD033EED53AC}" presName="connTx" presStyleLbl="parChTrans1D2" presStyleIdx="9" presStyleCnt="24"/>
       <dgm:spPr/>
     </dgm:pt>
     <dgm:pt modelId="{9D1F8C55-50E4-4944-ACB0-7C5B2A1ABADD}" type="pres">
@@ -2993,7 +2961,7 @@
       <dgm:spPr/>
     </dgm:pt>
     <dgm:pt modelId="{57C5DA5C-AC8A-F941-8A8A-9F5C7809C086}" type="pres">
-      <dgm:prSet presAssocID="{DDF323BA-8708-0442-9AA1-A7DEBC0C79C7}" presName="level2Shape" presStyleLbl="node2" presStyleIdx="9" presStyleCnt="25"/>
+      <dgm:prSet presAssocID="{DDF323BA-8708-0442-9AA1-A7DEBC0C79C7}" presName="level2Shape" presStyleLbl="node2" presStyleIdx="9" presStyleCnt="24"/>
       <dgm:spPr/>
     </dgm:pt>
     <dgm:pt modelId="{1724AD1D-1F5F-574D-92D2-2A1ABCAD1A52}" type="pres">
@@ -3001,11 +2969,11 @@
       <dgm:spPr/>
     </dgm:pt>
     <dgm:pt modelId="{439FBDF5-7C84-0D4C-9FE0-F9646B80D49B}" type="pres">
-      <dgm:prSet presAssocID="{3BF68A1E-9B17-EF4C-945B-23385A7827A0}" presName="Name25" presStyleLbl="parChTrans1D2" presStyleIdx="10" presStyleCnt="25"/>
+      <dgm:prSet presAssocID="{3BF68A1E-9B17-EF4C-945B-23385A7827A0}" presName="Name25" presStyleLbl="parChTrans1D2" presStyleIdx="10" presStyleCnt="24"/>
       <dgm:spPr/>
     </dgm:pt>
     <dgm:pt modelId="{D3D25C93-4CC7-5541-97B0-505BE2FA5D74}" type="pres">
-      <dgm:prSet presAssocID="{3BF68A1E-9B17-EF4C-945B-23385A7827A0}" presName="connTx" presStyleLbl="parChTrans1D2" presStyleIdx="10" presStyleCnt="25"/>
+      <dgm:prSet presAssocID="{3BF68A1E-9B17-EF4C-945B-23385A7827A0}" presName="connTx" presStyleLbl="parChTrans1D2" presStyleIdx="10" presStyleCnt="24"/>
       <dgm:spPr/>
     </dgm:pt>
     <dgm:pt modelId="{DFC481BF-66F2-A141-ADE9-95EAB5F53D2E}" type="pres">
@@ -3013,7 +2981,7 @@
       <dgm:spPr/>
     </dgm:pt>
     <dgm:pt modelId="{5625E0CD-8675-9A46-8B99-772D47419F32}" type="pres">
-      <dgm:prSet presAssocID="{8E589F8D-FB1A-5848-960B-918D51C2939F}" presName="level2Shape" presStyleLbl="node2" presStyleIdx="10" presStyleCnt="25"/>
+      <dgm:prSet presAssocID="{8E589F8D-FB1A-5848-960B-918D51C2939F}" presName="level2Shape" presStyleLbl="node2" presStyleIdx="10" presStyleCnt="24"/>
       <dgm:spPr/>
     </dgm:pt>
     <dgm:pt modelId="{6850CCDD-002C-B64C-BE9E-999B9F272202}" type="pres">
@@ -3021,11 +2989,11 @@
       <dgm:spPr/>
     </dgm:pt>
     <dgm:pt modelId="{60229A0C-FFCE-A547-865E-2EB6579C6B04}" type="pres">
-      <dgm:prSet presAssocID="{0C46B7B2-9228-9540-8568-A9292F1C438D}" presName="Name25" presStyleLbl="parChTrans1D2" presStyleIdx="11" presStyleCnt="25"/>
+      <dgm:prSet presAssocID="{0C46B7B2-9228-9540-8568-A9292F1C438D}" presName="Name25" presStyleLbl="parChTrans1D2" presStyleIdx="11" presStyleCnt="24"/>
       <dgm:spPr/>
     </dgm:pt>
     <dgm:pt modelId="{6A109E4D-8F6D-ED40-9FF3-9DA9EA9E521A}" type="pres">
-      <dgm:prSet presAssocID="{0C46B7B2-9228-9540-8568-A9292F1C438D}" presName="connTx" presStyleLbl="parChTrans1D2" presStyleIdx="11" presStyleCnt="25"/>
+      <dgm:prSet presAssocID="{0C46B7B2-9228-9540-8568-A9292F1C438D}" presName="connTx" presStyleLbl="parChTrans1D2" presStyleIdx="11" presStyleCnt="24"/>
       <dgm:spPr/>
     </dgm:pt>
     <dgm:pt modelId="{A446B8C9-920C-9240-BDEB-775EA09254D6}" type="pres">
@@ -3033,7 +3001,7 @@
       <dgm:spPr/>
     </dgm:pt>
     <dgm:pt modelId="{61CDE175-5DB6-0C4B-866D-7AEAA68BF44C}" type="pres">
-      <dgm:prSet presAssocID="{64A7FF19-1CB1-4247-90F5-1DE5C4B543A1}" presName="level2Shape" presStyleLbl="node2" presStyleIdx="11" presStyleCnt="25"/>
+      <dgm:prSet presAssocID="{64A7FF19-1CB1-4247-90F5-1DE5C4B543A1}" presName="level2Shape" presStyleLbl="node2" presStyleIdx="11" presStyleCnt="24"/>
       <dgm:spPr/>
     </dgm:pt>
     <dgm:pt modelId="{112E616E-EE26-0247-B401-77121AAF62D4}" type="pres">
@@ -3041,11 +3009,11 @@
       <dgm:spPr/>
     </dgm:pt>
     <dgm:pt modelId="{58B9977E-81D7-3D40-A6A6-3B86AAA454D2}" type="pres">
-      <dgm:prSet presAssocID="{85CE2295-9C36-EA45-B231-583E23C496E3}" presName="Name25" presStyleLbl="parChTrans1D2" presStyleIdx="12" presStyleCnt="25"/>
+      <dgm:prSet presAssocID="{85CE2295-9C36-EA45-B231-583E23C496E3}" presName="Name25" presStyleLbl="parChTrans1D2" presStyleIdx="12" presStyleCnt="24"/>
       <dgm:spPr/>
     </dgm:pt>
     <dgm:pt modelId="{02E93767-72AF-1547-B699-8EF00968861A}" type="pres">
-      <dgm:prSet presAssocID="{85CE2295-9C36-EA45-B231-583E23C496E3}" presName="connTx" presStyleLbl="parChTrans1D2" presStyleIdx="12" presStyleCnt="25"/>
+      <dgm:prSet presAssocID="{85CE2295-9C36-EA45-B231-583E23C496E3}" presName="connTx" presStyleLbl="parChTrans1D2" presStyleIdx="12" presStyleCnt="24"/>
       <dgm:spPr/>
     </dgm:pt>
     <dgm:pt modelId="{8998999C-3C67-D145-9BCA-AA832095323F}" type="pres">
@@ -3053,7 +3021,7 @@
       <dgm:spPr/>
     </dgm:pt>
     <dgm:pt modelId="{CBBB8745-E466-5A4C-8EB6-E13F92625655}" type="pres">
-      <dgm:prSet presAssocID="{5105791D-3095-404F-BB77-88ACFFB2D9DA}" presName="level2Shape" presStyleLbl="node2" presStyleIdx="12" presStyleCnt="25"/>
+      <dgm:prSet presAssocID="{5105791D-3095-404F-BB77-88ACFFB2D9DA}" presName="level2Shape" presStyleLbl="node2" presStyleIdx="12" presStyleCnt="24"/>
       <dgm:spPr/>
     </dgm:pt>
     <dgm:pt modelId="{06F98F34-9605-6749-98B8-8F2671079FCF}" type="pres">
@@ -3061,11 +3029,11 @@
       <dgm:spPr/>
     </dgm:pt>
     <dgm:pt modelId="{1B7D74DC-D6D3-9044-891C-F3074618C62B}" type="pres">
-      <dgm:prSet presAssocID="{051A668A-F68B-644A-A58A-71917D4F95A8}" presName="Name25" presStyleLbl="parChTrans1D2" presStyleIdx="13" presStyleCnt="25"/>
+      <dgm:prSet presAssocID="{051A668A-F68B-644A-A58A-71917D4F95A8}" presName="Name25" presStyleLbl="parChTrans1D2" presStyleIdx="13" presStyleCnt="24"/>
       <dgm:spPr/>
     </dgm:pt>
     <dgm:pt modelId="{B4704E34-A9A3-C447-B7FE-2E655AC0453D}" type="pres">
-      <dgm:prSet presAssocID="{051A668A-F68B-644A-A58A-71917D4F95A8}" presName="connTx" presStyleLbl="parChTrans1D2" presStyleIdx="13" presStyleCnt="25"/>
+      <dgm:prSet presAssocID="{051A668A-F68B-644A-A58A-71917D4F95A8}" presName="connTx" presStyleLbl="parChTrans1D2" presStyleIdx="13" presStyleCnt="24"/>
       <dgm:spPr/>
     </dgm:pt>
     <dgm:pt modelId="{CDA5DC1D-40ED-2742-A7B1-51E3B5CF6183}" type="pres">
@@ -3073,7 +3041,7 @@
       <dgm:spPr/>
     </dgm:pt>
     <dgm:pt modelId="{67C57D55-59E8-1B4A-B1B5-6B3887F607C6}" type="pres">
-      <dgm:prSet presAssocID="{9118F74D-2E74-AE40-B46B-8CD54349CB1F}" presName="level2Shape" presStyleLbl="node2" presStyleIdx="13" presStyleCnt="25"/>
+      <dgm:prSet presAssocID="{9118F74D-2E74-AE40-B46B-8CD54349CB1F}" presName="level2Shape" presStyleLbl="node2" presStyleIdx="13" presStyleCnt="24"/>
       <dgm:spPr/>
     </dgm:pt>
     <dgm:pt modelId="{FB3FF4E5-B805-3B4A-BACA-AB200EB81A06}" type="pres">
@@ -3081,11 +3049,11 @@
       <dgm:spPr/>
     </dgm:pt>
     <dgm:pt modelId="{CBEC6CF4-DC44-6A45-A7C6-DAD20C03EDAF}" type="pres">
-      <dgm:prSet presAssocID="{9BF6AB22-8DCD-FB43-8830-6A4A81124DBA}" presName="Name25" presStyleLbl="parChTrans1D2" presStyleIdx="14" presStyleCnt="25"/>
+      <dgm:prSet presAssocID="{9BF6AB22-8DCD-FB43-8830-6A4A81124DBA}" presName="Name25" presStyleLbl="parChTrans1D2" presStyleIdx="14" presStyleCnt="24"/>
       <dgm:spPr/>
     </dgm:pt>
     <dgm:pt modelId="{F34B2B54-BBBB-944B-9FEB-B5530B2DA306}" type="pres">
-      <dgm:prSet presAssocID="{9BF6AB22-8DCD-FB43-8830-6A4A81124DBA}" presName="connTx" presStyleLbl="parChTrans1D2" presStyleIdx="14" presStyleCnt="25"/>
+      <dgm:prSet presAssocID="{9BF6AB22-8DCD-FB43-8830-6A4A81124DBA}" presName="connTx" presStyleLbl="parChTrans1D2" presStyleIdx="14" presStyleCnt="24"/>
       <dgm:spPr/>
     </dgm:pt>
     <dgm:pt modelId="{B02FFBEC-4D87-8B49-87EC-3D082829CECE}" type="pres">
@@ -3093,7 +3061,7 @@
       <dgm:spPr/>
     </dgm:pt>
     <dgm:pt modelId="{00864838-1B52-8E45-B86B-39EAD4017B01}" type="pres">
-      <dgm:prSet presAssocID="{2288C821-584B-F342-B599-989987F218BF}" presName="level2Shape" presStyleLbl="node2" presStyleIdx="14" presStyleCnt="25"/>
+      <dgm:prSet presAssocID="{2288C821-584B-F342-B599-989987F218BF}" presName="level2Shape" presStyleLbl="node2" presStyleIdx="14" presStyleCnt="24"/>
       <dgm:spPr/>
     </dgm:pt>
     <dgm:pt modelId="{2389AEF5-554F-1742-950A-AAA8A1263A02}" type="pres">
@@ -3101,11 +3069,11 @@
       <dgm:spPr/>
     </dgm:pt>
     <dgm:pt modelId="{5B9690A2-7D29-614F-ADBE-E8599DD2D150}" type="pres">
-      <dgm:prSet presAssocID="{14FA5825-1846-F94C-A96F-8DE9533D0FAB}" presName="Name25" presStyleLbl="parChTrans1D2" presStyleIdx="15" presStyleCnt="25"/>
+      <dgm:prSet presAssocID="{14FA5825-1846-F94C-A96F-8DE9533D0FAB}" presName="Name25" presStyleLbl="parChTrans1D2" presStyleIdx="15" presStyleCnt="24"/>
       <dgm:spPr/>
     </dgm:pt>
     <dgm:pt modelId="{08725D77-2006-FE4E-9C39-80544BDD7CC5}" type="pres">
-      <dgm:prSet presAssocID="{14FA5825-1846-F94C-A96F-8DE9533D0FAB}" presName="connTx" presStyleLbl="parChTrans1D2" presStyleIdx="15" presStyleCnt="25"/>
+      <dgm:prSet presAssocID="{14FA5825-1846-F94C-A96F-8DE9533D0FAB}" presName="connTx" presStyleLbl="parChTrans1D2" presStyleIdx="15" presStyleCnt="24"/>
       <dgm:spPr/>
     </dgm:pt>
     <dgm:pt modelId="{4CDFF07F-09EE-E743-A76C-E10907323C1A}" type="pres">
@@ -3113,7 +3081,7 @@
       <dgm:spPr/>
     </dgm:pt>
     <dgm:pt modelId="{1F717781-6253-174D-8898-94FB6BBD213B}" type="pres">
-      <dgm:prSet presAssocID="{D2DA8C1F-E308-864D-A5B8-CD0E5E1E4691}" presName="level2Shape" presStyleLbl="node2" presStyleIdx="15" presStyleCnt="25"/>
+      <dgm:prSet presAssocID="{D2DA8C1F-E308-864D-A5B8-CD0E5E1E4691}" presName="level2Shape" presStyleLbl="node2" presStyleIdx="15" presStyleCnt="24"/>
       <dgm:spPr/>
     </dgm:pt>
     <dgm:pt modelId="{89705325-A9B9-1840-A039-EF79FF3B0CA9}" type="pres">
@@ -3121,11 +3089,11 @@
       <dgm:spPr/>
     </dgm:pt>
     <dgm:pt modelId="{3E791A08-CC1A-A248-9DB4-ED573FD7ABB7}" type="pres">
-      <dgm:prSet presAssocID="{6A93AE4B-30B3-2347-ADB4-51FA3071C3D9}" presName="Name25" presStyleLbl="parChTrans1D2" presStyleIdx="16" presStyleCnt="25"/>
+      <dgm:prSet presAssocID="{6A93AE4B-30B3-2347-ADB4-51FA3071C3D9}" presName="Name25" presStyleLbl="parChTrans1D2" presStyleIdx="16" presStyleCnt="24"/>
       <dgm:spPr/>
     </dgm:pt>
     <dgm:pt modelId="{FED14491-8A4A-3443-A785-9081C623DB70}" type="pres">
-      <dgm:prSet presAssocID="{6A93AE4B-30B3-2347-ADB4-51FA3071C3D9}" presName="connTx" presStyleLbl="parChTrans1D2" presStyleIdx="16" presStyleCnt="25"/>
+      <dgm:prSet presAssocID="{6A93AE4B-30B3-2347-ADB4-51FA3071C3D9}" presName="connTx" presStyleLbl="parChTrans1D2" presStyleIdx="16" presStyleCnt="24"/>
       <dgm:spPr/>
     </dgm:pt>
     <dgm:pt modelId="{2A69E1FC-51FA-A140-8E5B-DE42F267A430}" type="pres">
@@ -3133,7 +3101,7 @@
       <dgm:spPr/>
     </dgm:pt>
     <dgm:pt modelId="{2E1D7EA0-6AB4-9141-86FE-0F761B089AE5}" type="pres">
-      <dgm:prSet presAssocID="{333CE00A-9826-0742-A7EA-A37F817DBAC7}" presName="level2Shape" presStyleLbl="node2" presStyleIdx="16" presStyleCnt="25"/>
+      <dgm:prSet presAssocID="{333CE00A-9826-0742-A7EA-A37F817DBAC7}" presName="level2Shape" presStyleLbl="node2" presStyleIdx="16" presStyleCnt="24"/>
       <dgm:spPr/>
     </dgm:pt>
     <dgm:pt modelId="{922EBA48-E16C-C24D-BD14-423922908B81}" type="pres">
@@ -3141,11 +3109,11 @@
       <dgm:spPr/>
     </dgm:pt>
     <dgm:pt modelId="{77B49D6C-F968-2841-A1D7-8E4234186E13}" type="pres">
-      <dgm:prSet presAssocID="{3FFC5128-734C-3B42-893E-F476F8A1CE1C}" presName="Name25" presStyleLbl="parChTrans1D2" presStyleIdx="17" presStyleCnt="25"/>
+      <dgm:prSet presAssocID="{3FFC5128-734C-3B42-893E-F476F8A1CE1C}" presName="Name25" presStyleLbl="parChTrans1D2" presStyleIdx="17" presStyleCnt="24"/>
       <dgm:spPr/>
     </dgm:pt>
     <dgm:pt modelId="{6E48A615-D59B-A640-BC0B-B275E2D5FF2D}" type="pres">
-      <dgm:prSet presAssocID="{3FFC5128-734C-3B42-893E-F476F8A1CE1C}" presName="connTx" presStyleLbl="parChTrans1D2" presStyleIdx="17" presStyleCnt="25"/>
+      <dgm:prSet presAssocID="{3FFC5128-734C-3B42-893E-F476F8A1CE1C}" presName="connTx" presStyleLbl="parChTrans1D2" presStyleIdx="17" presStyleCnt="24"/>
       <dgm:spPr/>
     </dgm:pt>
     <dgm:pt modelId="{7145B698-1DBD-514A-B786-358D13610A6D}" type="pres">
@@ -3153,7 +3121,7 @@
       <dgm:spPr/>
     </dgm:pt>
     <dgm:pt modelId="{405E2DBC-DC2D-784B-8141-B760FC2DD6CF}" type="pres">
-      <dgm:prSet presAssocID="{C151942D-02D0-2749-8921-9A01BF73270F}" presName="level2Shape" presStyleLbl="node2" presStyleIdx="17" presStyleCnt="25"/>
+      <dgm:prSet presAssocID="{C151942D-02D0-2749-8921-9A01BF73270F}" presName="level2Shape" presStyleLbl="node2" presStyleIdx="17" presStyleCnt="24"/>
       <dgm:spPr/>
     </dgm:pt>
     <dgm:pt modelId="{9C85E0AC-3FE5-C94F-8A36-31799BF39BE5}" type="pres">
@@ -3161,11 +3129,11 @@
       <dgm:spPr/>
     </dgm:pt>
     <dgm:pt modelId="{FEEAB88C-3FA1-FD49-957A-DBD4B72C6CE6}" type="pres">
-      <dgm:prSet presAssocID="{552802E6-D185-F84E-B3B8-ADD9BF17BB88}" presName="Name25" presStyleLbl="parChTrans1D2" presStyleIdx="18" presStyleCnt="25"/>
+      <dgm:prSet presAssocID="{552802E6-D185-F84E-B3B8-ADD9BF17BB88}" presName="Name25" presStyleLbl="parChTrans1D2" presStyleIdx="18" presStyleCnt="24"/>
       <dgm:spPr/>
     </dgm:pt>
     <dgm:pt modelId="{16FFA66C-5817-C648-8782-F6FE583CD7E5}" type="pres">
-      <dgm:prSet presAssocID="{552802E6-D185-F84E-B3B8-ADD9BF17BB88}" presName="connTx" presStyleLbl="parChTrans1D2" presStyleIdx="18" presStyleCnt="25"/>
+      <dgm:prSet presAssocID="{552802E6-D185-F84E-B3B8-ADD9BF17BB88}" presName="connTx" presStyleLbl="parChTrans1D2" presStyleIdx="18" presStyleCnt="24"/>
       <dgm:spPr/>
     </dgm:pt>
     <dgm:pt modelId="{065D1855-25AF-4448-B1B8-6D5678C9703B}" type="pres">
@@ -3173,7 +3141,7 @@
       <dgm:spPr/>
     </dgm:pt>
     <dgm:pt modelId="{BAE0FEAE-239B-CD46-B8BC-6C53DD99554A}" type="pres">
-      <dgm:prSet presAssocID="{6B0FF664-7B4E-E345-8537-63C3EB1DC0A7}" presName="level2Shape" presStyleLbl="node2" presStyleIdx="18" presStyleCnt="25"/>
+      <dgm:prSet presAssocID="{6B0FF664-7B4E-E345-8537-63C3EB1DC0A7}" presName="level2Shape" presStyleLbl="node2" presStyleIdx="18" presStyleCnt="24"/>
       <dgm:spPr/>
     </dgm:pt>
     <dgm:pt modelId="{A799F220-8C58-264B-B025-B4A5F10D6AAE}" type="pres">
@@ -3181,11 +3149,11 @@
       <dgm:spPr/>
     </dgm:pt>
     <dgm:pt modelId="{C1A4BF2C-CE03-C249-9398-0EE1FC713264}" type="pres">
-      <dgm:prSet presAssocID="{4CC05530-6CAD-9C49-821D-B660A71E253C}" presName="Name25" presStyleLbl="parChTrans1D2" presStyleIdx="19" presStyleCnt="25"/>
+      <dgm:prSet presAssocID="{4CC05530-6CAD-9C49-821D-B660A71E253C}" presName="Name25" presStyleLbl="parChTrans1D2" presStyleIdx="19" presStyleCnt="24"/>
       <dgm:spPr/>
     </dgm:pt>
     <dgm:pt modelId="{191E0F80-02C0-4048-AF29-F9B30F32058D}" type="pres">
-      <dgm:prSet presAssocID="{4CC05530-6CAD-9C49-821D-B660A71E253C}" presName="connTx" presStyleLbl="parChTrans1D2" presStyleIdx="19" presStyleCnt="25"/>
+      <dgm:prSet presAssocID="{4CC05530-6CAD-9C49-821D-B660A71E253C}" presName="connTx" presStyleLbl="parChTrans1D2" presStyleIdx="19" presStyleCnt="24"/>
       <dgm:spPr/>
     </dgm:pt>
     <dgm:pt modelId="{D9351C28-315F-D84B-97EA-EE21D575D71D}" type="pres">
@@ -3193,7 +3161,7 @@
       <dgm:spPr/>
     </dgm:pt>
     <dgm:pt modelId="{E64CE84F-B3E9-D247-A32A-2ED6AFE3B3A4}" type="pres">
-      <dgm:prSet presAssocID="{2A5ACF61-7959-7D46-A721-BE913F5EF38B}" presName="level2Shape" presStyleLbl="node2" presStyleIdx="19" presStyleCnt="25"/>
+      <dgm:prSet presAssocID="{2A5ACF61-7959-7D46-A721-BE913F5EF38B}" presName="level2Shape" presStyleLbl="node2" presStyleIdx="19" presStyleCnt="24"/>
       <dgm:spPr/>
     </dgm:pt>
     <dgm:pt modelId="{DC037B7F-5709-B146-B07C-A6030875634B}" type="pres">
@@ -3201,11 +3169,11 @@
       <dgm:spPr/>
     </dgm:pt>
     <dgm:pt modelId="{5A867635-C7C9-0543-AD10-1815728B35A0}" type="pres">
-      <dgm:prSet presAssocID="{229571E2-2FAC-3A48-8B93-FF3A4ED57E50}" presName="Name25" presStyleLbl="parChTrans1D2" presStyleIdx="20" presStyleCnt="25"/>
+      <dgm:prSet presAssocID="{229571E2-2FAC-3A48-8B93-FF3A4ED57E50}" presName="Name25" presStyleLbl="parChTrans1D2" presStyleIdx="20" presStyleCnt="24"/>
       <dgm:spPr/>
     </dgm:pt>
     <dgm:pt modelId="{B0D72C4A-496A-9E44-84AE-1C6638CFFF82}" type="pres">
-      <dgm:prSet presAssocID="{229571E2-2FAC-3A48-8B93-FF3A4ED57E50}" presName="connTx" presStyleLbl="parChTrans1D2" presStyleIdx="20" presStyleCnt="25"/>
+      <dgm:prSet presAssocID="{229571E2-2FAC-3A48-8B93-FF3A4ED57E50}" presName="connTx" presStyleLbl="parChTrans1D2" presStyleIdx="20" presStyleCnt="24"/>
       <dgm:spPr/>
     </dgm:pt>
     <dgm:pt modelId="{B3F9A9EE-0C7D-AA4E-BEEC-701B9583B923}" type="pres">
@@ -3213,7 +3181,7 @@
       <dgm:spPr/>
     </dgm:pt>
     <dgm:pt modelId="{34B2AC0E-F2BF-1243-8FCC-E2ED149030BD}" type="pres">
-      <dgm:prSet presAssocID="{379D3441-5B98-514C-B06A-460E7F24AF14}" presName="level2Shape" presStyleLbl="node2" presStyleIdx="20" presStyleCnt="25"/>
+      <dgm:prSet presAssocID="{379D3441-5B98-514C-B06A-460E7F24AF14}" presName="level2Shape" presStyleLbl="node2" presStyleIdx="20" presStyleCnt="24"/>
       <dgm:spPr/>
     </dgm:pt>
     <dgm:pt modelId="{D5496093-1F56-ED46-A083-014302E7DC26}" type="pres">
@@ -3221,11 +3189,11 @@
       <dgm:spPr/>
     </dgm:pt>
     <dgm:pt modelId="{B4DD0CD4-6CF2-F148-8458-F4E7BBF4367B}" type="pres">
-      <dgm:prSet presAssocID="{06973F15-C0DB-CE4A-ABB9-D2CE5347155F}" presName="Name25" presStyleLbl="parChTrans1D2" presStyleIdx="21" presStyleCnt="25"/>
+      <dgm:prSet presAssocID="{06973F15-C0DB-CE4A-ABB9-D2CE5347155F}" presName="Name25" presStyleLbl="parChTrans1D2" presStyleIdx="21" presStyleCnt="24"/>
       <dgm:spPr/>
     </dgm:pt>
     <dgm:pt modelId="{E08B967A-24A7-B942-ABB0-DAF237D8FD54}" type="pres">
-      <dgm:prSet presAssocID="{06973F15-C0DB-CE4A-ABB9-D2CE5347155F}" presName="connTx" presStyleLbl="parChTrans1D2" presStyleIdx="21" presStyleCnt="25"/>
+      <dgm:prSet presAssocID="{06973F15-C0DB-CE4A-ABB9-D2CE5347155F}" presName="connTx" presStyleLbl="parChTrans1D2" presStyleIdx="21" presStyleCnt="24"/>
       <dgm:spPr/>
     </dgm:pt>
     <dgm:pt modelId="{8480A077-F0D5-C747-992D-847479DFC0C2}" type="pres">
@@ -3233,70 +3201,50 @@
       <dgm:spPr/>
     </dgm:pt>
     <dgm:pt modelId="{F21CA52C-B75C-4A4B-B197-8AC086F7F825}" type="pres">
-      <dgm:prSet presAssocID="{684CCBB5-0A75-2343-BCC5-670C7BA71746}" presName="level2Shape" presStyleLbl="node2" presStyleIdx="21" presStyleCnt="25"/>
+      <dgm:prSet presAssocID="{684CCBB5-0A75-2343-BCC5-670C7BA71746}" presName="level2Shape" presStyleLbl="node2" presStyleIdx="21" presStyleCnt="24"/>
       <dgm:spPr/>
     </dgm:pt>
     <dgm:pt modelId="{40A73574-CB62-E447-800B-DC66FD3FEF19}" type="pres">
       <dgm:prSet presAssocID="{684CCBB5-0A75-2343-BCC5-670C7BA71746}" presName="hierChild3" presStyleCnt="0"/>
       <dgm:spPr/>
     </dgm:pt>
-    <dgm:pt modelId="{114B6E05-9A1A-DC4F-BE03-42FAF049F489}" type="pres">
-      <dgm:prSet presAssocID="{47093809-A9C8-C641-AA7F-B0FD0F52B50F}" presName="Name25" presStyleLbl="parChTrans1D2" presStyleIdx="22" presStyleCnt="25"/>
-      <dgm:spPr/>
-    </dgm:pt>
-    <dgm:pt modelId="{E6987C68-D5C7-D248-BCFE-08D4C1008CBF}" type="pres">
-      <dgm:prSet presAssocID="{47093809-A9C8-C641-AA7F-B0FD0F52B50F}" presName="connTx" presStyleLbl="parChTrans1D2" presStyleIdx="22" presStyleCnt="25"/>
-      <dgm:spPr/>
-    </dgm:pt>
-    <dgm:pt modelId="{D7E561E1-D2F6-3848-B3B1-E2E78313D58B}" type="pres">
-      <dgm:prSet presAssocID="{3FC442DB-3FAF-9C47-9463-E1ED64C9DCA7}" presName="Name30" presStyleCnt="0"/>
-      <dgm:spPr/>
-    </dgm:pt>
-    <dgm:pt modelId="{F98C6F64-C2A4-AF42-8FAD-334EABD39D16}" type="pres">
-      <dgm:prSet presAssocID="{3FC442DB-3FAF-9C47-9463-E1ED64C9DCA7}" presName="level2Shape" presStyleLbl="node2" presStyleIdx="22" presStyleCnt="25"/>
-      <dgm:spPr/>
-    </dgm:pt>
-    <dgm:pt modelId="{0B686479-74F6-D74C-9736-48075BE9B3B5}" type="pres">
-      <dgm:prSet presAssocID="{3FC442DB-3FAF-9C47-9463-E1ED64C9DCA7}" presName="hierChild3" presStyleCnt="0"/>
-      <dgm:spPr/>
-    </dgm:pt>
-    <dgm:pt modelId="{06283703-33C4-FF4D-AF1E-B1E876AACC28}" type="pres">
-      <dgm:prSet presAssocID="{139FE588-F06D-A041-B072-CFFF188A9D68}" presName="Name25" presStyleLbl="parChTrans1D2" presStyleIdx="23" presStyleCnt="25"/>
-      <dgm:spPr/>
-    </dgm:pt>
-    <dgm:pt modelId="{B3D58A65-9EDB-C445-BD07-78AA3EB1882E}" type="pres">
-      <dgm:prSet presAssocID="{139FE588-F06D-A041-B072-CFFF188A9D68}" presName="connTx" presStyleLbl="parChTrans1D2" presStyleIdx="23" presStyleCnt="25"/>
-      <dgm:spPr/>
-    </dgm:pt>
-    <dgm:pt modelId="{40CD444D-3D0A-D34B-8F0C-EFF30EA26E6E}" type="pres">
+    <dgm:pt modelId="{EC2E63CA-2EC9-0F4E-9D1F-3AFD2B926D14}" type="pres">
+      <dgm:prSet presAssocID="{139FE588-F06D-A041-B072-CFFF188A9D68}" presName="Name25" presStyleLbl="parChTrans1D2" presStyleIdx="22" presStyleCnt="24"/>
+      <dgm:spPr/>
+    </dgm:pt>
+    <dgm:pt modelId="{FD0DC035-5D10-1E41-A165-29D6950AC3B2}" type="pres">
+      <dgm:prSet presAssocID="{139FE588-F06D-A041-B072-CFFF188A9D68}" presName="connTx" presStyleLbl="parChTrans1D2" presStyleIdx="22" presStyleCnt="24"/>
+      <dgm:spPr/>
+    </dgm:pt>
+    <dgm:pt modelId="{3956C997-DCAA-E142-B538-19C83391D0A6}" type="pres">
       <dgm:prSet presAssocID="{3EBB9E4D-B769-104C-A202-07B497D123E2}" presName="Name30" presStyleCnt="0"/>
       <dgm:spPr/>
     </dgm:pt>
-    <dgm:pt modelId="{D7567818-17D6-8B4A-B431-A93BB6E6F124}" type="pres">
-      <dgm:prSet presAssocID="{3EBB9E4D-B769-104C-A202-07B497D123E2}" presName="level2Shape" presStyleLbl="node2" presStyleIdx="23" presStyleCnt="25"/>
-      <dgm:spPr/>
-    </dgm:pt>
-    <dgm:pt modelId="{3F205D18-10D7-534B-9018-B75EA0B52605}" type="pres">
+    <dgm:pt modelId="{DF821C6A-036F-BF4C-A79F-2767F5017844}" type="pres">
+      <dgm:prSet presAssocID="{3EBB9E4D-B769-104C-A202-07B497D123E2}" presName="level2Shape" presStyleLbl="node2" presStyleIdx="22" presStyleCnt="24"/>
+      <dgm:spPr/>
+    </dgm:pt>
+    <dgm:pt modelId="{FCDB7F01-7877-BF4E-9AD4-FB7EF1A99A46}" type="pres">
       <dgm:prSet presAssocID="{3EBB9E4D-B769-104C-A202-07B497D123E2}" presName="hierChild3" presStyleCnt="0"/>
       <dgm:spPr/>
     </dgm:pt>
-    <dgm:pt modelId="{930BB466-81C3-F843-B23D-2A44CCB5F756}" type="pres">
-      <dgm:prSet presAssocID="{E91B1DF9-0981-8F46-A86D-BF43E44A0A32}" presName="Name25" presStyleLbl="parChTrans1D2" presStyleIdx="24" presStyleCnt="25"/>
-      <dgm:spPr/>
-    </dgm:pt>
-    <dgm:pt modelId="{19D2C979-52D0-7549-B4D7-E452BAD68738}" type="pres">
-      <dgm:prSet presAssocID="{E91B1DF9-0981-8F46-A86D-BF43E44A0A32}" presName="connTx" presStyleLbl="parChTrans1D2" presStyleIdx="24" presStyleCnt="25"/>
-      <dgm:spPr/>
-    </dgm:pt>
-    <dgm:pt modelId="{D22D7FAC-4AE3-E948-9F51-57916B7C92C9}" type="pres">
+    <dgm:pt modelId="{2E7EC5D6-C9BB-8545-81A7-27940D1777C1}" type="pres">
+      <dgm:prSet presAssocID="{E91B1DF9-0981-8F46-A86D-BF43E44A0A32}" presName="Name25" presStyleLbl="parChTrans1D2" presStyleIdx="23" presStyleCnt="24"/>
+      <dgm:spPr/>
+    </dgm:pt>
+    <dgm:pt modelId="{E501CF91-6D44-FA44-9CF1-8C1D1A7FC0D9}" type="pres">
+      <dgm:prSet presAssocID="{E91B1DF9-0981-8F46-A86D-BF43E44A0A32}" presName="connTx" presStyleLbl="parChTrans1D2" presStyleIdx="23" presStyleCnt="24"/>
+      <dgm:spPr/>
+    </dgm:pt>
+    <dgm:pt modelId="{A03C1B55-7506-2D40-B503-CB705B5C4B52}" type="pres">
       <dgm:prSet presAssocID="{2DC4C02F-D718-9E4A-A7A4-795F2E8AF1C6}" presName="Name30" presStyleCnt="0"/>
       <dgm:spPr/>
     </dgm:pt>
-    <dgm:pt modelId="{7A789CAC-4CAA-3A43-A2FE-FFDDD364D4C8}" type="pres">
-      <dgm:prSet presAssocID="{2DC4C02F-D718-9E4A-A7A4-795F2E8AF1C6}" presName="level2Shape" presStyleLbl="node2" presStyleIdx="24" presStyleCnt="25"/>
-      <dgm:spPr/>
-    </dgm:pt>
-    <dgm:pt modelId="{475017D5-2A91-8946-A8BD-72C00B383AED}" type="pres">
+    <dgm:pt modelId="{0FB4856C-5335-3A43-9584-3D6694A05062}" type="pres">
+      <dgm:prSet presAssocID="{2DC4C02F-D718-9E4A-A7A4-795F2E8AF1C6}" presName="level2Shape" presStyleLbl="node2" presStyleIdx="23" presStyleCnt="24"/>
+      <dgm:spPr/>
+    </dgm:pt>
+    <dgm:pt modelId="{388900C8-84B6-D448-A8FC-BF739C05FDD5}" type="pres">
       <dgm:prSet presAssocID="{2DC4C02F-D718-9E4A-A7A4-795F2E8AF1C6}" presName="hierChild3" presStyleCnt="0"/>
       <dgm:spPr/>
     </dgm:pt>
@@ -3312,13 +3260,12 @@
     <dgm:cxn modelId="{8D7FEA0C-E373-8944-BE58-BBC1EFC8EFB0}" type="presOf" srcId="{F590A5D4-F227-594C-9EE0-FE054F028F14}" destId="{59BFB2F0-1993-9446-B2C0-AA9620680450}" srcOrd="1" destOrd="0" presId="urn:microsoft.com/office/officeart/2005/8/layout/hierarchy5"/>
     <dgm:cxn modelId="{06403D0D-D790-C341-A91A-B3EACCBCFDF2}" type="presOf" srcId="{9BF6AB22-8DCD-FB43-8830-6A4A81124DBA}" destId="{F34B2B54-BBBB-944B-9FEB-B5530B2DA306}" srcOrd="1" destOrd="0" presId="urn:microsoft.com/office/officeart/2005/8/layout/hierarchy5"/>
     <dgm:cxn modelId="{64B72918-A175-814B-8ADE-486F2622FE15}" type="presOf" srcId="{C7A8F4DA-F093-2F4C-A8F2-1CAE9F19D3CF}" destId="{812DE7EE-50D0-FA41-BB8B-3C7C1F2E6173}" srcOrd="0" destOrd="0" presId="urn:microsoft.com/office/officeart/2005/8/layout/hierarchy5"/>
-    <dgm:cxn modelId="{6B483018-80A9-FF47-BE91-E2AEB45A8909}" type="presOf" srcId="{47093809-A9C8-C641-AA7F-B0FD0F52B50F}" destId="{114B6E05-9A1A-DC4F-BE03-42FAF049F489}" srcOrd="0" destOrd="0" presId="urn:microsoft.com/office/officeart/2005/8/layout/hierarchy5"/>
     <dgm:cxn modelId="{81CA7218-B372-4B41-88F3-0EA948F65E56}" type="presOf" srcId="{4D3D3C34-2DA6-2A47-BAD6-AE2BA70D99C9}" destId="{54CF4744-7EFB-8F4A-8559-6EA33EA2B829}" srcOrd="0" destOrd="0" presId="urn:microsoft.com/office/officeart/2005/8/layout/hierarchy5"/>
     <dgm:cxn modelId="{2C2D9719-2843-7142-9D35-E40E6CB84BDA}" srcId="{6233EEBE-8EA0-EC46-98C6-D2F1E0F885EB}" destId="{50E621B2-BFC9-1646-B69E-A31B2B218040}" srcOrd="6" destOrd="0" parTransId="{93915103-2624-684A-ACF8-91A5BF07F55F}" sibTransId="{4CC39CA2-C094-8B49-8F31-A7F19E6A58D3}"/>
     <dgm:cxn modelId="{DBBAE91A-613D-024E-A2B1-BF51A1B60863}" type="presOf" srcId="{051A668A-F68B-644A-A58A-71917D4F95A8}" destId="{1B7D74DC-D6D3-9044-891C-F3074618C62B}" srcOrd="0" destOrd="0" presId="urn:microsoft.com/office/officeart/2005/8/layout/hierarchy5"/>
     <dgm:cxn modelId="{424A241B-279F-D849-B164-2DEDF1C53F95}" type="presOf" srcId="{040ABEB4-CF52-7B45-821A-26FA5CDEB67B}" destId="{54DFD968-11EF-8D4F-A568-3D2920A006E8}" srcOrd="1" destOrd="0" presId="urn:microsoft.com/office/officeart/2005/8/layout/hierarchy5"/>
+    <dgm:cxn modelId="{930B701B-EDCA-484B-A2F5-796277E7B0E1}" type="presOf" srcId="{139FE588-F06D-A041-B072-CFFF188A9D68}" destId="{FD0DC035-5D10-1E41-A165-29D6950AC3B2}" srcOrd="1" destOrd="0" presId="urn:microsoft.com/office/officeart/2005/8/layout/hierarchy5"/>
     <dgm:cxn modelId="{1A03A01E-555E-C848-8368-1349B9BCD9F2}" type="presOf" srcId="{229571E2-2FAC-3A48-8B93-FF3A4ED57E50}" destId="{5A867635-C7C9-0543-AD10-1815728B35A0}" srcOrd="0" destOrd="0" presId="urn:microsoft.com/office/officeart/2005/8/layout/hierarchy5"/>
-    <dgm:cxn modelId="{46C1D51F-DED3-AC4A-A998-A6F648CF0D65}" type="presOf" srcId="{47093809-A9C8-C641-AA7F-B0FD0F52B50F}" destId="{E6987C68-D5C7-D248-BCFE-08D4C1008CBF}" srcOrd="1" destOrd="0" presId="urn:microsoft.com/office/officeart/2005/8/layout/hierarchy5"/>
     <dgm:cxn modelId="{4F25A622-49E4-3E49-A0A9-039BA16D9F9E}" srcId="{6233EEBE-8EA0-EC46-98C6-D2F1E0F885EB}" destId="{B73A77CB-7DBD-F04A-93D1-035ED33470A8}" srcOrd="5" destOrd="0" parTransId="{040ABEB4-CF52-7B45-821A-26FA5CDEB67B}" sibTransId="{C30428E6-0008-FF4D-BA6E-71BACCC39006}"/>
     <dgm:cxn modelId="{34B3B524-DFB8-AD4F-886C-552C7B4BA845}" srcId="{6233EEBE-8EA0-EC46-98C6-D2F1E0F885EB}" destId="{DDF323BA-8708-0442-9AA1-A7DEBC0C79C7}" srcOrd="9" destOrd="0" parTransId="{C7C7742D-0EF2-684D-8EE2-CD033EED53AC}" sibTransId="{FFD9ADF8-3ECD-4D4A-B599-30693ED30827}"/>
     <dgm:cxn modelId="{60A97925-12FC-324E-8FD1-AFF8DFEE1AF9}" srcId="{BDC1A316-6EDC-5348-B2E7-F937DEC2E314}" destId="{6233EEBE-8EA0-EC46-98C6-D2F1E0F885EB}" srcOrd="0" destOrd="0" parTransId="{55AADFD9-BE87-944B-83EA-80BDBA21B5EE}" sibTransId="{EF6C7607-9298-3944-A9A6-5B5A7EEC81EE}"/>
@@ -3333,19 +3280,16 @@
     <dgm:cxn modelId="{84DB3737-5B17-894B-80BB-16C09AF83D88}" type="presOf" srcId="{F0A61594-EAF8-8E42-8792-171B56BBB246}" destId="{CA1501D0-BB60-2A44-BDD1-5C704DEBDF47}" srcOrd="0" destOrd="0" presId="urn:microsoft.com/office/officeart/2005/8/layout/hierarchy5"/>
     <dgm:cxn modelId="{851BA038-87D7-F846-9F4B-9F920969BA31}" type="presOf" srcId="{DDF323BA-8708-0442-9AA1-A7DEBC0C79C7}" destId="{57C5DA5C-AC8A-F941-8A8A-9F5C7809C086}" srcOrd="0" destOrd="0" presId="urn:microsoft.com/office/officeart/2005/8/layout/hierarchy5"/>
     <dgm:cxn modelId="{B3F90A39-1A0B-0849-9585-D7AA487BEA75}" type="presOf" srcId="{B73A77CB-7DBD-F04A-93D1-035ED33470A8}" destId="{3A900AD8-E4D1-874A-BFF9-E7ED232100E1}" srcOrd="0" destOrd="0" presId="urn:microsoft.com/office/officeart/2005/8/layout/hierarchy5"/>
-    <dgm:cxn modelId="{378A7A3A-F12E-FA47-A617-FE86AB87F593}" type="presOf" srcId="{3EBB9E4D-B769-104C-A202-07B497D123E2}" destId="{D7567818-17D6-8B4A-B431-A93BB6E6F124}" srcOrd="0" destOrd="0" presId="urn:microsoft.com/office/officeart/2005/8/layout/hierarchy5"/>
     <dgm:cxn modelId="{9FC3753F-86AA-9D47-8C40-19F2B09B0E5B}" srcId="{6233EEBE-8EA0-EC46-98C6-D2F1E0F885EB}" destId="{1691AC4C-1901-A844-80D2-D4241630105F}" srcOrd="1" destOrd="0" parTransId="{F0A61594-EAF8-8E42-8792-171B56BBB246}" sibTransId="{57533A0E-64D3-AC48-9BD9-26606A469C59}"/>
     <dgm:cxn modelId="{67DF3B40-AB7C-C146-A02E-AD7D3CD6489F}" type="presOf" srcId="{C7C7742D-0EF2-684D-8EE2-CD033EED53AC}" destId="{F970713F-D8C1-EF45-B118-5D1C6A54FDF2}" srcOrd="1" destOrd="0" presId="urn:microsoft.com/office/officeart/2005/8/layout/hierarchy5"/>
     <dgm:cxn modelId="{E8A9D440-430F-B14A-9EF3-18B6B87BADB3}" type="presOf" srcId="{552802E6-D185-F84E-B3B8-ADD9BF17BB88}" destId="{FEEAB88C-3FA1-FD49-957A-DBD4B72C6CE6}" srcOrd="0" destOrd="0" presId="urn:microsoft.com/office/officeart/2005/8/layout/hierarchy5"/>
-    <dgm:cxn modelId="{5EFD4A41-9B42-DC4A-B3B0-A8C298C0F36F}" type="presOf" srcId="{E91B1DF9-0981-8F46-A86D-BF43E44A0A32}" destId="{930BB466-81C3-F843-B23D-2A44CCB5F756}" srcOrd="0" destOrd="0" presId="urn:microsoft.com/office/officeart/2005/8/layout/hierarchy5"/>
     <dgm:cxn modelId="{3BEAAF41-CBA3-9248-BBEC-5BBC34DBF5F8}" type="presOf" srcId="{12F2A5AD-0EF0-7C4E-A44A-01ACD0D00E7D}" destId="{EC567BCA-7C43-1D45-B05E-3D11674B54EE}" srcOrd="1" destOrd="0" presId="urn:microsoft.com/office/officeart/2005/8/layout/hierarchy5"/>
     <dgm:cxn modelId="{21AC1844-25E8-0E48-A57E-E5C4AAFCE830}" type="presOf" srcId="{3BF68A1E-9B17-EF4C-945B-23385A7827A0}" destId="{439FBDF5-7C84-0D4C-9FE0-F9646B80D49B}" srcOrd="0" destOrd="0" presId="urn:microsoft.com/office/officeart/2005/8/layout/hierarchy5"/>
     <dgm:cxn modelId="{F6601A48-3BE6-9C4F-80F0-205583B52D32}" type="presOf" srcId="{8E589F8D-FB1A-5848-960B-918D51C2939F}" destId="{5625E0CD-8675-9A46-8B99-772D47419F32}" srcOrd="0" destOrd="0" presId="urn:microsoft.com/office/officeart/2005/8/layout/hierarchy5"/>
     <dgm:cxn modelId="{F03AB44B-BFE7-F34A-82C4-B36163CAC4A1}" srcId="{6233EEBE-8EA0-EC46-98C6-D2F1E0F885EB}" destId="{440C823C-CF5F-4B4E-BCAF-A55A3D4CECFB}" srcOrd="2" destOrd="0" parTransId="{12F2A5AD-0EF0-7C4E-A44A-01ACD0D00E7D}" sibTransId="{2333CF66-C8E3-7A47-B5D8-F73DB1425CFF}"/>
-    <dgm:cxn modelId="{C9C8CE4D-BEEE-8C4F-AE32-7779883C7F59}" type="presOf" srcId="{139FE588-F06D-A041-B072-CFFF188A9D68}" destId="{06283703-33C4-FF4D-AF1E-B1E876AACC28}" srcOrd="0" destOrd="0" presId="urn:microsoft.com/office/officeart/2005/8/layout/hierarchy5"/>
     <dgm:cxn modelId="{E877E753-CCB1-0D47-B2E3-4E3BF898E8AE}" type="presOf" srcId="{552802E6-D185-F84E-B3B8-ADD9BF17BB88}" destId="{16FFA66C-5817-C648-8782-F6FE583CD7E5}" srcOrd="1" destOrd="0" presId="urn:microsoft.com/office/officeart/2005/8/layout/hierarchy5"/>
     <dgm:cxn modelId="{8A995B5A-AC42-E447-99CD-B13115B5E1C9}" type="presOf" srcId="{440C823C-CF5F-4B4E-BCAF-A55A3D4CECFB}" destId="{7FBB34B1-6FC2-2448-B193-46CAF63327D6}" srcOrd="0" destOrd="0" presId="urn:microsoft.com/office/officeart/2005/8/layout/hierarchy5"/>
-    <dgm:cxn modelId="{A7AD305C-6CA1-9A48-98F0-6E9C2805BAD2}" srcId="{6233EEBE-8EA0-EC46-98C6-D2F1E0F885EB}" destId="{2DC4C02F-D718-9E4A-A7A4-795F2E8AF1C6}" srcOrd="24" destOrd="0" parTransId="{E91B1DF9-0981-8F46-A86D-BF43E44A0A32}" sibTransId="{0F87E386-17D3-EF45-BABC-4C34AC5F378D}"/>
+    <dgm:cxn modelId="{A7AD305C-6CA1-9A48-98F0-6E9C2805BAD2}" srcId="{6233EEBE-8EA0-EC46-98C6-D2F1E0F885EB}" destId="{2DC4C02F-D718-9E4A-A7A4-795F2E8AF1C6}" srcOrd="23" destOrd="0" parTransId="{E91B1DF9-0981-8F46-A86D-BF43E44A0A32}" sibTransId="{0F87E386-17D3-EF45-BABC-4C34AC5F378D}"/>
     <dgm:cxn modelId="{2A82255D-873E-6C42-BBD2-1716C598A3B4}" srcId="{6233EEBE-8EA0-EC46-98C6-D2F1E0F885EB}" destId="{9118F74D-2E74-AE40-B46B-8CD54349CB1F}" srcOrd="13" destOrd="0" parTransId="{051A668A-F68B-644A-A58A-71917D4F95A8}" sibTransId="{52E24C49-B576-984C-8DDE-F6D30BC83922}"/>
     <dgm:cxn modelId="{7E8ABD5E-4C79-304C-886B-40AA8E2EADA6}" type="presOf" srcId="{C151942D-02D0-2749-8921-9A01BF73270F}" destId="{405E2DBC-DC2D-784B-8141-B760FC2DD6CF}" srcOrd="0" destOrd="0" presId="urn:microsoft.com/office/officeart/2005/8/layout/hierarchy5"/>
     <dgm:cxn modelId="{BFD38366-9F6E-EF44-A13D-440D692DAF0B}" type="presOf" srcId="{12F2A5AD-0EF0-7C4E-A44A-01ACD0D00E7D}" destId="{51555E19-D16B-9F42-8D99-15EE5C9E9404}" srcOrd="0" destOrd="0" presId="urn:microsoft.com/office/officeart/2005/8/layout/hierarchy5"/>
@@ -3376,21 +3320,21 @@
     <dgm:cxn modelId="{B991E5A6-364A-ED43-B69A-C697E56EC898}" type="presOf" srcId="{0C46B7B2-9228-9540-8568-A9292F1C438D}" destId="{60229A0C-FFCE-A547-865E-2EB6579C6B04}" srcOrd="0" destOrd="0" presId="urn:microsoft.com/office/officeart/2005/8/layout/hierarchy5"/>
     <dgm:cxn modelId="{97A32DA7-0D2D-D548-BA9F-61DCF13AB2A5}" type="presOf" srcId="{2A5ACF61-7959-7D46-A721-BE913F5EF38B}" destId="{E64CE84F-B3E9-D247-A32A-2ED6AFE3B3A4}" srcOrd="0" destOrd="0" presId="urn:microsoft.com/office/officeart/2005/8/layout/hierarchy5"/>
     <dgm:cxn modelId="{59B67CA8-9F25-254A-88E8-D5286019A572}" type="presOf" srcId="{85CE2295-9C36-EA45-B231-583E23C496E3}" destId="{02E93767-72AF-1547-B699-8EF00968861A}" srcOrd="1" destOrd="0" presId="urn:microsoft.com/office/officeart/2005/8/layout/hierarchy5"/>
+    <dgm:cxn modelId="{9421C9A8-48AE-9A4E-99F8-F7B9C67670EE}" type="presOf" srcId="{E91B1DF9-0981-8F46-A86D-BF43E44A0A32}" destId="{E501CF91-6D44-FA44-9CF1-8C1D1A7FC0D9}" srcOrd="1" destOrd="0" presId="urn:microsoft.com/office/officeart/2005/8/layout/hierarchy5"/>
     <dgm:cxn modelId="{7C43D0A9-8D86-7E45-B486-E5165AC995A7}" type="presOf" srcId="{C3013AF6-A5CD-7E43-9E34-048C85B4186A}" destId="{2D43822A-D53D-BA46-9910-38E933BE5F5E}" srcOrd="0" destOrd="0" presId="urn:microsoft.com/office/officeart/2005/8/layout/hierarchy5"/>
-    <dgm:cxn modelId="{DBD22FAF-9BB5-4D4E-9626-E05378FB93CB}" type="presOf" srcId="{E91B1DF9-0981-8F46-A86D-BF43E44A0A32}" destId="{19D2C979-52D0-7549-B4D7-E452BAD68738}" srcOrd="1" destOrd="0" presId="urn:microsoft.com/office/officeart/2005/8/layout/hierarchy5"/>
     <dgm:cxn modelId="{BECEE6B4-9CDB-224E-916A-58EC4EDE66CA}" srcId="{6233EEBE-8EA0-EC46-98C6-D2F1E0F885EB}" destId="{784BC7F6-B521-9E42-94CA-E6E78986E2B6}" srcOrd="7" destOrd="0" parTransId="{F590A5D4-F227-594C-9EE0-FE054F028F14}" sibTransId="{77F445B8-C879-8449-9BCF-4BBF0B6D26D7}"/>
     <dgm:cxn modelId="{E9E56DB9-2F4A-7947-8D32-15B22BF312B0}" type="presOf" srcId="{06973F15-C0DB-CE4A-ABB9-D2CE5347155F}" destId="{E08B967A-24A7-B942-ABB0-DAF237D8FD54}" srcOrd="1" destOrd="0" presId="urn:microsoft.com/office/officeart/2005/8/layout/hierarchy5"/>
     <dgm:cxn modelId="{0FEC51BC-4F8B-A444-ACCD-3C76B6EF33AE}" type="presOf" srcId="{93915103-2624-684A-ACF8-91A5BF07F55F}" destId="{9B8DD4B9-CDF5-9343-97C0-8F9376F28583}" srcOrd="1" destOrd="0" presId="urn:microsoft.com/office/officeart/2005/8/layout/hierarchy5"/>
     <dgm:cxn modelId="{A10AFBBC-E408-074A-B572-06A903EC1B7C}" type="presOf" srcId="{9BF6AB22-8DCD-FB43-8830-6A4A81124DBA}" destId="{CBEC6CF4-DC44-6A45-A7C6-DAD20C03EDAF}" srcOrd="0" destOrd="0" presId="urn:microsoft.com/office/officeart/2005/8/layout/hierarchy5"/>
     <dgm:cxn modelId="{0866FCBC-0C3A-D74B-85C5-400A0B713EDC}" type="presOf" srcId="{5105791D-3095-404F-BB77-88ACFFB2D9DA}" destId="{CBBB8745-E466-5A4C-8EB6-E13F92625655}" srcOrd="0" destOrd="0" presId="urn:microsoft.com/office/officeart/2005/8/layout/hierarchy5"/>
+    <dgm:cxn modelId="{8D4B48BE-713E-254B-86B8-AD61089C228D}" type="presOf" srcId="{139FE588-F06D-A041-B072-CFFF188A9D68}" destId="{EC2E63CA-2EC9-0F4E-9D1F-3AFD2B926D14}" srcOrd="0" destOrd="0" presId="urn:microsoft.com/office/officeart/2005/8/layout/hierarchy5"/>
+    <dgm:cxn modelId="{575062BF-A8AC-3841-AF20-A82A60C0B6B4}" type="presOf" srcId="{3EBB9E4D-B769-104C-A202-07B497D123E2}" destId="{DF821C6A-036F-BF4C-A79F-2767F5017844}" srcOrd="0" destOrd="0" presId="urn:microsoft.com/office/officeart/2005/8/layout/hierarchy5"/>
+    <dgm:cxn modelId="{ED93A0C0-10C7-E14B-9957-DCF19D47D675}" type="presOf" srcId="{E91B1DF9-0981-8F46-A86D-BF43E44A0A32}" destId="{2E7EC5D6-C9BB-8545-81A7-27940D1777C1}" srcOrd="0" destOrd="0" presId="urn:microsoft.com/office/officeart/2005/8/layout/hierarchy5"/>
     <dgm:cxn modelId="{07CA43C1-357A-6347-A0E1-8BAADBA94A8D}" type="presOf" srcId="{C7A8F4DA-F093-2F4C-A8F2-1CAE9F19D3CF}" destId="{7B658FF8-B5C8-284D-8233-E4D1D3EA382D}" srcOrd="1" destOrd="0" presId="urn:microsoft.com/office/officeart/2005/8/layout/hierarchy5"/>
     <dgm:cxn modelId="{CF6E10C3-EB26-CB4D-9510-22BCDCAEBEAD}" type="presOf" srcId="{333CE00A-9826-0742-A7EA-A37F817DBAC7}" destId="{2E1D7EA0-6AB4-9141-86FE-0F761B089AE5}" srcOrd="0" destOrd="0" presId="urn:microsoft.com/office/officeart/2005/8/layout/hierarchy5"/>
     <dgm:cxn modelId="{48A99ACF-30DC-0443-9213-D8FEB05FAAAD}" srcId="{6233EEBE-8EA0-EC46-98C6-D2F1E0F885EB}" destId="{5105791D-3095-404F-BB77-88ACFFB2D9DA}" srcOrd="12" destOrd="0" parTransId="{85CE2295-9C36-EA45-B231-583E23C496E3}" sibTransId="{2F1F3A3D-2A0E-5C4E-B81C-315B1DBC7D3C}"/>
     <dgm:cxn modelId="{A0659ECF-550E-3B44-B378-488B440DBD12}" srcId="{6233EEBE-8EA0-EC46-98C6-D2F1E0F885EB}" destId="{379D3441-5B98-514C-B06A-460E7F24AF14}" srcOrd="20" destOrd="0" parTransId="{229571E2-2FAC-3A48-8B93-FF3A4ED57E50}" sibTransId="{5A327CEE-63B4-084C-AFBE-617BFB3AC5C9}"/>
-    <dgm:cxn modelId="{4456D5D2-6603-EF47-A30D-18E4B5F1B377}" srcId="{6233EEBE-8EA0-EC46-98C6-D2F1E0F885EB}" destId="{3FC442DB-3FAF-9C47-9463-E1ED64C9DCA7}" srcOrd="22" destOrd="0" parTransId="{47093809-A9C8-C641-AA7F-B0FD0F52B50F}" sibTransId="{8293BB08-09C3-E542-9D80-F066763BAC0C}"/>
     <dgm:cxn modelId="{369DDBD5-4CF0-2B40-A17E-69522949E396}" type="presOf" srcId="{1691AC4C-1901-A844-80D2-D4241630105F}" destId="{DF967CC0-5D1D-3D47-B26B-BFE911929264}" srcOrd="0" destOrd="0" presId="urn:microsoft.com/office/officeart/2005/8/layout/hierarchy5"/>
-    <dgm:cxn modelId="{8762EFD8-ED81-324F-93A7-6FC6D6254634}" type="presOf" srcId="{2DC4C02F-D718-9E4A-A7A4-795F2E8AF1C6}" destId="{7A789CAC-4CAA-3A43-A2FE-FFDDD364D4C8}" srcOrd="0" destOrd="0" presId="urn:microsoft.com/office/officeart/2005/8/layout/hierarchy5"/>
-    <dgm:cxn modelId="{E3B648DC-77BB-7A48-B260-E599CA9DC01E}" type="presOf" srcId="{3FC442DB-3FAF-9C47-9463-E1ED64C9DCA7}" destId="{F98C6F64-C2A4-AF42-8FAD-334EABD39D16}" srcOrd="0" destOrd="0" presId="urn:microsoft.com/office/officeart/2005/8/layout/hierarchy5"/>
     <dgm:cxn modelId="{42F7AADD-C901-EC44-A196-C794FB660043}" srcId="{6233EEBE-8EA0-EC46-98C6-D2F1E0F885EB}" destId="{C151942D-02D0-2749-8921-9A01BF73270F}" srcOrd="17" destOrd="0" parTransId="{3FFC5128-734C-3B42-893E-F476F8A1CE1C}" sibTransId="{7092C975-35DF-7543-9EB9-DCD8949EA2FB}"/>
     <dgm:cxn modelId="{E7C5B7DD-3D35-C544-8BEA-EA0ABDF990CA}" type="presOf" srcId="{9118F74D-2E74-AE40-B46B-8CD54349CB1F}" destId="{67C57D55-59E8-1B4A-B1B5-6B3887F607C6}" srcOrd="0" destOrd="0" presId="urn:microsoft.com/office/officeart/2005/8/layout/hierarchy5"/>
     <dgm:cxn modelId="{A7238FE2-30C3-7443-9B5B-B3B0AD5CA5FA}" type="presOf" srcId="{6B0FF664-7B4E-E345-8537-63C3EB1DC0A7}" destId="{BAE0FEAE-239B-CD46-B8BC-6C53DD99554A}" srcOrd="0" destOrd="0" presId="urn:microsoft.com/office/officeart/2005/8/layout/hierarchy5"/>
@@ -3399,14 +3343,14 @@
     <dgm:cxn modelId="{E35FC7E9-2859-B743-B551-E124D857515D}" srcId="{6233EEBE-8EA0-EC46-98C6-D2F1E0F885EB}" destId="{684CCBB5-0A75-2343-BCC5-670C7BA71746}" srcOrd="21" destOrd="0" parTransId="{06973F15-C0DB-CE4A-ABB9-D2CE5347155F}" sibTransId="{C1B63473-1E8B-4345-91F8-C4B5374988AC}"/>
     <dgm:cxn modelId="{0DC610EB-0F50-1040-AD93-B391F98DD5F8}" type="presOf" srcId="{FE170462-FE36-2445-88C8-6703125B5DDB}" destId="{55F6D424-0C3E-9746-81D6-3992B3097CE6}" srcOrd="0" destOrd="0" presId="urn:microsoft.com/office/officeart/2005/8/layout/hierarchy5"/>
     <dgm:cxn modelId="{83A782ED-C707-C542-8042-24974CCCA399}" type="presOf" srcId="{F0A61594-EAF8-8E42-8792-171B56BBB246}" destId="{77216575-51C7-354B-89B0-1E0575870855}" srcOrd="1" destOrd="0" presId="urn:microsoft.com/office/officeart/2005/8/layout/hierarchy5"/>
-    <dgm:cxn modelId="{A83DE4ED-3050-AF4A-81AC-297A7637DA20}" type="presOf" srcId="{139FE588-F06D-A041-B072-CFFF188A9D68}" destId="{B3D58A65-9EDB-C445-BD07-78AA3EB1882E}" srcOrd="1" destOrd="0" presId="urn:microsoft.com/office/officeart/2005/8/layout/hierarchy5"/>
     <dgm:cxn modelId="{74AF0CEF-656D-FB47-AA74-A4B616331F66}" srcId="{6233EEBE-8EA0-EC46-98C6-D2F1E0F885EB}" destId="{2288C821-584B-F342-B599-989987F218BF}" srcOrd="14" destOrd="0" parTransId="{9BF6AB22-8DCD-FB43-8830-6A4A81124DBA}" sibTransId="{546BABEC-4F4B-CB4F-9BFC-92ACFFA76FD5}"/>
     <dgm:cxn modelId="{EA44C6F0-30D4-8E41-8D60-3BBD28E56F7E}" type="presOf" srcId="{3FFC5128-734C-3B42-893E-F476F8A1CE1C}" destId="{77B49D6C-F968-2841-A1D7-8E4234186E13}" srcOrd="0" destOrd="0" presId="urn:microsoft.com/office/officeart/2005/8/layout/hierarchy5"/>
     <dgm:cxn modelId="{3A6E86F4-3E7E-3F44-A2D3-E3755A8E6560}" srcId="{6233EEBE-8EA0-EC46-98C6-D2F1E0F885EB}" destId="{8E589F8D-FB1A-5848-960B-918D51C2939F}" srcOrd="10" destOrd="0" parTransId="{3BF68A1E-9B17-EF4C-945B-23385A7827A0}" sibTransId="{8F0F8A01-7E20-D445-A392-592244EB91D2}"/>
     <dgm:cxn modelId="{3C5A3DF5-41DE-924E-ACC1-2347587A0D85}" srcId="{6233EEBE-8EA0-EC46-98C6-D2F1E0F885EB}" destId="{64A7FF19-1CB1-4247-90F5-1DE5C4B543A1}" srcOrd="11" destOrd="0" parTransId="{0C46B7B2-9228-9540-8568-A9292F1C438D}" sibTransId="{A70890D9-1A27-DD4D-BE9D-6A16644F858E}"/>
-    <dgm:cxn modelId="{B5958AF8-D865-EF4D-A4EA-C34F324EE903}" srcId="{6233EEBE-8EA0-EC46-98C6-D2F1E0F885EB}" destId="{3EBB9E4D-B769-104C-A202-07B497D123E2}" srcOrd="23" destOrd="0" parTransId="{139FE588-F06D-A041-B072-CFFF188A9D68}" sibTransId="{4486CACD-4B04-2147-8925-4CF1349B3398}"/>
+    <dgm:cxn modelId="{B5958AF8-D865-EF4D-A4EA-C34F324EE903}" srcId="{6233EEBE-8EA0-EC46-98C6-D2F1E0F885EB}" destId="{3EBB9E4D-B769-104C-A202-07B497D123E2}" srcOrd="22" destOrd="0" parTransId="{139FE588-F06D-A041-B072-CFFF188A9D68}" sibTransId="{4486CACD-4B04-2147-8925-4CF1349B3398}"/>
     <dgm:cxn modelId="{59F603F9-F35E-DD44-9266-CA841CA984CB}" srcId="{6233EEBE-8EA0-EC46-98C6-D2F1E0F885EB}" destId="{9B654400-210F-154B-82AE-D517A31FC37B}" srcOrd="8" destOrd="0" parTransId="{C7A8F4DA-F093-2F4C-A8F2-1CAE9F19D3CF}" sibTransId="{DD103497-A880-5443-86CA-62D8ABABE237}"/>
     <dgm:cxn modelId="{57BB7DF9-ACC2-8044-B442-638288B9B4A3}" type="presOf" srcId="{FE170462-FE36-2445-88C8-6703125B5DDB}" destId="{5F27C417-6E2E-0D40-B336-182FD9B2AE07}" srcOrd="1" destOrd="0" presId="urn:microsoft.com/office/officeart/2005/8/layout/hierarchy5"/>
+    <dgm:cxn modelId="{F5C989F9-A01A-7645-A82B-01B8E8F3ED1D}" type="presOf" srcId="{2DC4C02F-D718-9E4A-A7A4-795F2E8AF1C6}" destId="{0FB4856C-5335-3A43-9584-3D6694A05062}" srcOrd="0" destOrd="0" presId="urn:microsoft.com/office/officeart/2005/8/layout/hierarchy5"/>
     <dgm:cxn modelId="{CE0C6EFB-CF67-834D-868D-843513265BF6}" type="presOf" srcId="{14FA5825-1846-F94C-A96F-8DE9533D0FAB}" destId="{08725D77-2006-FE4E-9C39-80544BDD7CC5}" srcOrd="1" destOrd="0" presId="urn:microsoft.com/office/officeart/2005/8/layout/hierarchy5"/>
     <dgm:cxn modelId="{39F181FF-F743-684A-9009-209DB4E42099}" type="presOf" srcId="{14FA5825-1846-F94C-A96F-8DE9533D0FAB}" destId="{5B9690A2-7D29-614F-ADBE-E8599DD2D150}" srcOrd="0" destOrd="0" presId="urn:microsoft.com/office/officeart/2005/8/layout/hierarchy5"/>
     <dgm:cxn modelId="{5590CD19-B69F-044E-9B17-76293CBCD8B4}" type="presParOf" srcId="{01B14312-B8F4-4A48-91AC-C8B2841BF41F}" destId="{B929AEB7-C20B-E442-B518-9B8D1112E37B}" srcOrd="0" destOrd="0" presId="urn:microsoft.com/office/officeart/2005/8/layout/hierarchy5"/>
@@ -3524,21 +3468,16 @@
     <dgm:cxn modelId="{BE536619-79B6-3743-9112-BE9B8A98B3D0}" type="presParOf" srcId="{9EB7755A-2E33-934F-9EF4-C1F41ADF2296}" destId="{8480A077-F0D5-C747-992D-847479DFC0C2}" srcOrd="43" destOrd="0" presId="urn:microsoft.com/office/officeart/2005/8/layout/hierarchy5"/>
     <dgm:cxn modelId="{B456FCEC-6ED7-FA45-A217-611300E474D7}" type="presParOf" srcId="{8480A077-F0D5-C747-992D-847479DFC0C2}" destId="{F21CA52C-B75C-4A4B-B197-8AC086F7F825}" srcOrd="0" destOrd="0" presId="urn:microsoft.com/office/officeart/2005/8/layout/hierarchy5"/>
     <dgm:cxn modelId="{DF3941E5-9CEB-8846-BEEE-5BB9360D7F93}" type="presParOf" srcId="{8480A077-F0D5-C747-992D-847479DFC0C2}" destId="{40A73574-CB62-E447-800B-DC66FD3FEF19}" srcOrd="1" destOrd="0" presId="urn:microsoft.com/office/officeart/2005/8/layout/hierarchy5"/>
-    <dgm:cxn modelId="{EF007504-A6EB-DA48-B5D1-84DC0C2EDB9A}" type="presParOf" srcId="{9EB7755A-2E33-934F-9EF4-C1F41ADF2296}" destId="{114B6E05-9A1A-DC4F-BE03-42FAF049F489}" srcOrd="44" destOrd="0" presId="urn:microsoft.com/office/officeart/2005/8/layout/hierarchy5"/>
-    <dgm:cxn modelId="{BA12AD2E-9B61-4C45-AE7F-AEE6263AB8F9}" type="presParOf" srcId="{114B6E05-9A1A-DC4F-BE03-42FAF049F489}" destId="{E6987C68-D5C7-D248-BCFE-08D4C1008CBF}" srcOrd="0" destOrd="0" presId="urn:microsoft.com/office/officeart/2005/8/layout/hierarchy5"/>
-    <dgm:cxn modelId="{06C0FCFE-43EE-2E45-AF00-426D0DE3ED35}" type="presParOf" srcId="{9EB7755A-2E33-934F-9EF4-C1F41ADF2296}" destId="{D7E561E1-D2F6-3848-B3B1-E2E78313D58B}" srcOrd="45" destOrd="0" presId="urn:microsoft.com/office/officeart/2005/8/layout/hierarchy5"/>
-    <dgm:cxn modelId="{1FDFD4A7-83D9-3146-9DE2-8AE135FB5C0A}" type="presParOf" srcId="{D7E561E1-D2F6-3848-B3B1-E2E78313D58B}" destId="{F98C6F64-C2A4-AF42-8FAD-334EABD39D16}" srcOrd="0" destOrd="0" presId="urn:microsoft.com/office/officeart/2005/8/layout/hierarchy5"/>
-    <dgm:cxn modelId="{8BF3D6A0-F4F3-1342-81CE-2DA5534C6115}" type="presParOf" srcId="{D7E561E1-D2F6-3848-B3B1-E2E78313D58B}" destId="{0B686479-74F6-D74C-9736-48075BE9B3B5}" srcOrd="1" destOrd="0" presId="urn:microsoft.com/office/officeart/2005/8/layout/hierarchy5"/>
-    <dgm:cxn modelId="{3395D4E8-E05A-914C-96A7-DCCD7B71DF43}" type="presParOf" srcId="{9EB7755A-2E33-934F-9EF4-C1F41ADF2296}" destId="{06283703-33C4-FF4D-AF1E-B1E876AACC28}" srcOrd="46" destOrd="0" presId="urn:microsoft.com/office/officeart/2005/8/layout/hierarchy5"/>
-    <dgm:cxn modelId="{EC6AAD97-FE92-7E45-8110-46F5CC231122}" type="presParOf" srcId="{06283703-33C4-FF4D-AF1E-B1E876AACC28}" destId="{B3D58A65-9EDB-C445-BD07-78AA3EB1882E}" srcOrd="0" destOrd="0" presId="urn:microsoft.com/office/officeart/2005/8/layout/hierarchy5"/>
-    <dgm:cxn modelId="{EDE2436A-879D-5343-BBF0-782EDE797FAC}" type="presParOf" srcId="{9EB7755A-2E33-934F-9EF4-C1F41ADF2296}" destId="{40CD444D-3D0A-D34B-8F0C-EFF30EA26E6E}" srcOrd="47" destOrd="0" presId="urn:microsoft.com/office/officeart/2005/8/layout/hierarchy5"/>
-    <dgm:cxn modelId="{60DC8EE6-E40C-C748-B91E-1730A35DE045}" type="presParOf" srcId="{40CD444D-3D0A-D34B-8F0C-EFF30EA26E6E}" destId="{D7567818-17D6-8B4A-B431-A93BB6E6F124}" srcOrd="0" destOrd="0" presId="urn:microsoft.com/office/officeart/2005/8/layout/hierarchy5"/>
-    <dgm:cxn modelId="{B3E3AA24-0D91-7347-83BD-E3997DCE2341}" type="presParOf" srcId="{40CD444D-3D0A-D34B-8F0C-EFF30EA26E6E}" destId="{3F205D18-10D7-534B-9018-B75EA0B52605}" srcOrd="1" destOrd="0" presId="urn:microsoft.com/office/officeart/2005/8/layout/hierarchy5"/>
-    <dgm:cxn modelId="{88132D66-6288-7E42-8016-AE2032BBE311}" type="presParOf" srcId="{9EB7755A-2E33-934F-9EF4-C1F41ADF2296}" destId="{930BB466-81C3-F843-B23D-2A44CCB5F756}" srcOrd="48" destOrd="0" presId="urn:microsoft.com/office/officeart/2005/8/layout/hierarchy5"/>
-    <dgm:cxn modelId="{8D8A3598-4A52-C746-8033-F091925F62DC}" type="presParOf" srcId="{930BB466-81C3-F843-B23D-2A44CCB5F756}" destId="{19D2C979-52D0-7549-B4D7-E452BAD68738}" srcOrd="0" destOrd="0" presId="urn:microsoft.com/office/officeart/2005/8/layout/hierarchy5"/>
-    <dgm:cxn modelId="{05EA6179-2D41-3046-9A4A-33EFF9A1B435}" type="presParOf" srcId="{9EB7755A-2E33-934F-9EF4-C1F41ADF2296}" destId="{D22D7FAC-4AE3-E948-9F51-57916B7C92C9}" srcOrd="49" destOrd="0" presId="urn:microsoft.com/office/officeart/2005/8/layout/hierarchy5"/>
-    <dgm:cxn modelId="{6EBD5054-C6FC-E546-9889-0E5790F84266}" type="presParOf" srcId="{D22D7FAC-4AE3-E948-9F51-57916B7C92C9}" destId="{7A789CAC-4CAA-3A43-A2FE-FFDDD364D4C8}" srcOrd="0" destOrd="0" presId="urn:microsoft.com/office/officeart/2005/8/layout/hierarchy5"/>
-    <dgm:cxn modelId="{2321C3B9-BB6C-054E-95E3-0C9A0C65D096}" type="presParOf" srcId="{D22D7FAC-4AE3-E948-9F51-57916B7C92C9}" destId="{475017D5-2A91-8946-A8BD-72C00B383AED}" srcOrd="1" destOrd="0" presId="urn:microsoft.com/office/officeart/2005/8/layout/hierarchy5"/>
+    <dgm:cxn modelId="{17E68E1C-F49E-D94D-8773-96867F4C1B8A}" type="presParOf" srcId="{9EB7755A-2E33-934F-9EF4-C1F41ADF2296}" destId="{EC2E63CA-2EC9-0F4E-9D1F-3AFD2B926D14}" srcOrd="44" destOrd="0" presId="urn:microsoft.com/office/officeart/2005/8/layout/hierarchy5"/>
+    <dgm:cxn modelId="{A20E3707-65CA-E542-BE13-05999195BDF1}" type="presParOf" srcId="{EC2E63CA-2EC9-0F4E-9D1F-3AFD2B926D14}" destId="{FD0DC035-5D10-1E41-A165-29D6950AC3B2}" srcOrd="0" destOrd="0" presId="urn:microsoft.com/office/officeart/2005/8/layout/hierarchy5"/>
+    <dgm:cxn modelId="{35615DF9-6C29-DF41-B36F-74D40E273E52}" type="presParOf" srcId="{9EB7755A-2E33-934F-9EF4-C1F41ADF2296}" destId="{3956C997-DCAA-E142-B538-19C83391D0A6}" srcOrd="45" destOrd="0" presId="urn:microsoft.com/office/officeart/2005/8/layout/hierarchy5"/>
+    <dgm:cxn modelId="{C77100D7-D5E8-FD43-BA2C-950284822B4E}" type="presParOf" srcId="{3956C997-DCAA-E142-B538-19C83391D0A6}" destId="{DF821C6A-036F-BF4C-A79F-2767F5017844}" srcOrd="0" destOrd="0" presId="urn:microsoft.com/office/officeart/2005/8/layout/hierarchy5"/>
+    <dgm:cxn modelId="{E1B7F4C2-E8DD-174E-BA0A-CEABF4180F94}" type="presParOf" srcId="{3956C997-DCAA-E142-B538-19C83391D0A6}" destId="{FCDB7F01-7877-BF4E-9AD4-FB7EF1A99A46}" srcOrd="1" destOrd="0" presId="urn:microsoft.com/office/officeart/2005/8/layout/hierarchy5"/>
+    <dgm:cxn modelId="{96B8AB7D-9AE2-A44D-A925-53EC02323181}" type="presParOf" srcId="{9EB7755A-2E33-934F-9EF4-C1F41ADF2296}" destId="{2E7EC5D6-C9BB-8545-81A7-27940D1777C1}" srcOrd="46" destOrd="0" presId="urn:microsoft.com/office/officeart/2005/8/layout/hierarchy5"/>
+    <dgm:cxn modelId="{7EF2667F-4616-1849-A2B3-C2C39F7A8CA9}" type="presParOf" srcId="{2E7EC5D6-C9BB-8545-81A7-27940D1777C1}" destId="{E501CF91-6D44-FA44-9CF1-8C1D1A7FC0D9}" srcOrd="0" destOrd="0" presId="urn:microsoft.com/office/officeart/2005/8/layout/hierarchy5"/>
+    <dgm:cxn modelId="{CFB5B706-9496-0C44-8BC5-3F9E65C290B8}" type="presParOf" srcId="{9EB7755A-2E33-934F-9EF4-C1F41ADF2296}" destId="{A03C1B55-7506-2D40-B503-CB705B5C4B52}" srcOrd="47" destOrd="0" presId="urn:microsoft.com/office/officeart/2005/8/layout/hierarchy5"/>
+    <dgm:cxn modelId="{68DF9894-F458-E641-8AF4-639BECFA595A}" type="presParOf" srcId="{A03C1B55-7506-2D40-B503-CB705B5C4B52}" destId="{0FB4856C-5335-3A43-9584-3D6694A05062}" srcOrd="0" destOrd="0" presId="urn:microsoft.com/office/officeart/2005/8/layout/hierarchy5"/>
+    <dgm:cxn modelId="{A9BDB5BC-C644-1E4E-9245-2B55F1D4D0CB}" type="presParOf" srcId="{A03C1B55-7506-2D40-B503-CB705B5C4B52}" destId="{388900C8-84B6-D448-A8FC-BF739C05FDD5}" srcOrd="1" destOrd="0" presId="urn:microsoft.com/office/officeart/2005/8/layout/hierarchy5"/>
     <dgm:cxn modelId="{1D4F1358-E1CB-BA48-BBFE-7FC4141FF7F6}" type="presParOf" srcId="{01B14312-B8F4-4A48-91AC-C8B2841BF41F}" destId="{F0C9EF69-AE17-A244-A13D-B9AA65187220}" srcOrd="1" destOrd="0" presId="urn:microsoft.com/office/officeart/2005/8/layout/hierarchy5"/>
   </dgm:cxnLst>
   <dgm:bg/>
@@ -3949,8 +3888,8 @@
       </dsp:nvSpPr>
       <dsp:spPr>
         <a:xfrm>
-          <a:off x="3531477" y="3304095"/>
-          <a:ext cx="478854" cy="239427"/>
+          <a:off x="3487819" y="3298854"/>
+          <a:ext cx="498946" cy="249473"/>
         </a:xfrm>
         <a:prstGeom prst="roundRect">
           <a:avLst>
@@ -3994,12 +3933,12 @@
         </a:fontRef>
       </dsp:style>
       <dsp:txBody>
-        <a:bodyPr spcFirstLastPara="0" vert="horz" wrap="square" lIns="8890" tIns="8890" rIns="8890" bIns="8890" numCol="1" spcCol="1270" anchor="ctr" anchorCtr="0">
+        <a:bodyPr spcFirstLastPara="0" vert="horz" wrap="square" lIns="9525" tIns="9525" rIns="9525" bIns="9525" numCol="1" spcCol="1270" anchor="ctr" anchorCtr="0">
           <a:noAutofit/>
         </a:bodyPr>
         <a:lstStyle/>
         <a:p>
-          <a:pPr marL="0" lvl="0" indent="0" algn="ctr" defTabSz="622300">
+          <a:pPr marL="0" lvl="0" indent="0" algn="ctr" defTabSz="666750">
             <a:lnSpc>
               <a:spcPct val="90000"/>
             </a:lnSpc>
@@ -4011,12 +3950,12 @@
             </a:spcAft>
             <a:buNone/>
           </a:pPr>
-          <a:endParaRPr lang="en-US" sz="1400" kern="1200" dirty="0"/>
+          <a:endParaRPr lang="en-US" sz="1500" kern="1200" dirty="0"/>
         </a:p>
       </dsp:txBody>
       <dsp:txXfrm>
-        <a:off x="3538490" y="3311108"/>
-        <a:ext cx="464828" cy="225401"/>
+        <a:off x="3495126" y="3306161"/>
+        <a:ext cx="484332" cy="234859"/>
       </dsp:txXfrm>
     </dsp:sp>
     <dsp:sp modelId="{55F6D424-0C3E-9746-81D6-3992B3097CE6}">
@@ -4025,9 +3964,9 @@
         <dsp:cNvSpPr/>
       </dsp:nvSpPr>
       <dsp:spPr>
-        <a:xfrm rot="16850699">
-          <a:off x="2644731" y="1768619"/>
-          <a:ext cx="3364180" cy="6284"/>
+        <a:xfrm rot="16878362">
+          <a:off x="2634464" y="1770890"/>
+          <a:ext cx="3364139" cy="6547"/>
         </a:xfrm>
         <a:custGeom>
           <a:avLst/>
@@ -4038,10 +3977,10 @@
           <a:pathLst>
             <a:path>
               <a:moveTo>
-                <a:pt x="0" y="3142"/>
+                <a:pt x="0" y="3273"/>
               </a:moveTo>
               <a:lnTo>
-                <a:pt x="3364180" y="3142"/>
+                <a:pt x="3364139" y="3273"/>
               </a:lnTo>
             </a:path>
           </a:pathLst>
@@ -4096,8 +4035,8 @@
         </a:p>
       </dsp:txBody>
       <dsp:txXfrm>
-        <a:off x="4242717" y="1687656"/>
-        <a:ext cx="168209" cy="168209"/>
+        <a:off x="4232431" y="1690060"/>
+        <a:ext cx="168206" cy="168206"/>
       </dsp:txXfrm>
     </dsp:sp>
     <dsp:sp modelId="{2D43822A-D53D-BA46-9910-38E933BE5F5E}">
@@ -4107,8 +4046,8 @@
       </dsp:nvSpPr>
       <dsp:spPr>
         <a:xfrm>
-          <a:off x="4643311" y="0"/>
-          <a:ext cx="478854" cy="239427"/>
+          <a:off x="4646303" y="0"/>
+          <a:ext cx="498946" cy="249473"/>
         </a:xfrm>
         <a:prstGeom prst="roundRect">
           <a:avLst>
@@ -4152,12 +4091,12 @@
         </a:fontRef>
       </dsp:style>
       <dsp:txBody>
-        <a:bodyPr spcFirstLastPara="0" vert="horz" wrap="square" lIns="8890" tIns="8890" rIns="8890" bIns="8890" numCol="1" spcCol="1270" anchor="ctr" anchorCtr="0">
+        <a:bodyPr spcFirstLastPara="0" vert="horz" wrap="square" lIns="9525" tIns="9525" rIns="9525" bIns="9525" numCol="1" spcCol="1270" anchor="ctr" anchorCtr="0">
           <a:noAutofit/>
         </a:bodyPr>
         <a:lstStyle/>
         <a:p>
-          <a:pPr marL="0" lvl="0" indent="0" algn="ctr" defTabSz="622300">
+          <a:pPr marL="0" lvl="0" indent="0" algn="ctr" defTabSz="666750">
             <a:lnSpc>
               <a:spcPct val="90000"/>
             </a:lnSpc>
@@ -4170,14 +4109,14 @@
             <a:buNone/>
           </a:pPr>
           <a:r>
-            <a:rPr lang="en-US" sz="1400" kern="1200" dirty="0"/>
+            <a:rPr lang="en-US" sz="1500" kern="1200" dirty="0"/>
             <a:t>chr1</a:t>
           </a:r>
         </a:p>
       </dsp:txBody>
       <dsp:txXfrm>
-        <a:off x="4650324" y="7013"/>
-        <a:ext cx="464828" cy="225401"/>
+        <a:off x="4653610" y="7307"/>
+        <a:ext cx="484332" cy="234859"/>
       </dsp:txXfrm>
     </dsp:sp>
     <dsp:sp modelId="{CA1501D0-BB60-2A44-BDD1-5C704DEBDF47}">
@@ -4186,9 +4125,9 @@
         <dsp:cNvSpPr/>
       </dsp:nvSpPr>
       <dsp:spPr>
-        <a:xfrm rot="16936041">
-          <a:off x="2791944" y="1908885"/>
-          <a:ext cx="3094214" cy="6284"/>
+        <a:xfrm rot="16970016">
+          <a:off x="2787267" y="1916827"/>
+          <a:ext cx="3084020" cy="6547"/>
         </a:xfrm>
         <a:custGeom>
           <a:avLst/>
@@ -4199,10 +4138,10 @@
           <a:pathLst>
             <a:path>
               <a:moveTo>
-                <a:pt x="0" y="3142"/>
+                <a:pt x="0" y="3273"/>
               </a:moveTo>
               <a:lnTo>
-                <a:pt x="3094214" y="3142"/>
+                <a:pt x="3084020" y="3273"/>
               </a:lnTo>
             </a:path>
           </a:pathLst>
@@ -4257,8 +4196,8 @@
         </a:p>
       </dsp:txBody>
       <dsp:txXfrm>
-        <a:off x="4261696" y="1834671"/>
-        <a:ext cx="154710" cy="154710"/>
+        <a:off x="4252177" y="1843001"/>
+        <a:ext cx="154201" cy="154201"/>
       </dsp:txXfrm>
     </dsp:sp>
     <dsp:sp modelId="{DF967CC0-5D1D-3D47-B26B-BFE911929264}">
@@ -4268,8 +4207,8 @@
       </dsp:nvSpPr>
       <dsp:spPr>
         <a:xfrm>
-          <a:off x="4667770" y="280531"/>
-          <a:ext cx="478854" cy="239427"/>
+          <a:off x="4671789" y="291875"/>
+          <a:ext cx="498946" cy="249473"/>
         </a:xfrm>
         <a:prstGeom prst="roundRect">
           <a:avLst>
@@ -4313,12 +4252,12 @@
         </a:fontRef>
       </dsp:style>
       <dsp:txBody>
-        <a:bodyPr spcFirstLastPara="0" vert="horz" wrap="square" lIns="8890" tIns="8890" rIns="8890" bIns="8890" numCol="1" spcCol="1270" anchor="ctr" anchorCtr="0">
+        <a:bodyPr spcFirstLastPara="0" vert="horz" wrap="square" lIns="9525" tIns="9525" rIns="9525" bIns="9525" numCol="1" spcCol="1270" anchor="ctr" anchorCtr="0">
           <a:noAutofit/>
         </a:bodyPr>
         <a:lstStyle/>
         <a:p>
-          <a:pPr marL="0" lvl="0" indent="0" algn="ctr" defTabSz="622300">
+          <a:pPr marL="0" lvl="0" indent="0" algn="ctr" defTabSz="666750">
             <a:lnSpc>
               <a:spcPct val="90000"/>
             </a:lnSpc>
@@ -4331,14 +4270,14 @@
             <a:buNone/>
           </a:pPr>
           <a:r>
-            <a:rPr lang="en-US" sz="1400" kern="1200" dirty="0"/>
+            <a:rPr lang="en-US" sz="1500" kern="1200" dirty="0"/>
             <a:t>chr2</a:t>
           </a:r>
         </a:p>
       </dsp:txBody>
       <dsp:txXfrm>
-        <a:off x="4674783" y="287544"/>
-        <a:ext cx="464828" cy="225401"/>
+        <a:off x="4679096" y="299182"/>
+        <a:ext cx="484332" cy="234859"/>
       </dsp:txXfrm>
     </dsp:sp>
     <dsp:sp modelId="{51555E19-D16B-9F42-8D99-15EE5C9E9404}">
@@ -4347,9 +4286,9 @@
         <dsp:cNvSpPr/>
       </dsp:nvSpPr>
       <dsp:spPr>
-        <a:xfrm rot="17007218">
-          <a:off x="2926168" y="2046555"/>
-          <a:ext cx="2825765" cy="6284"/>
+        <a:xfrm rot="17048122">
+          <a:off x="2926768" y="2060274"/>
+          <a:ext cx="2805017" cy="6547"/>
         </a:xfrm>
         <a:custGeom>
           <a:avLst/>
@@ -4360,10 +4299,10 @@
           <a:pathLst>
             <a:path>
               <a:moveTo>
-                <a:pt x="0" y="3142"/>
+                <a:pt x="0" y="3273"/>
               </a:moveTo>
               <a:lnTo>
-                <a:pt x="2825765" y="3142"/>
+                <a:pt x="2805017" y="3273"/>
               </a:lnTo>
             </a:path>
           </a:pathLst>
@@ -4418,8 +4357,8 @@
         </a:p>
       </dsp:txBody>
       <dsp:txXfrm>
-        <a:off x="4268407" y="1979053"/>
-        <a:ext cx="141288" cy="141288"/>
+        <a:off x="4259152" y="1993423"/>
+        <a:ext cx="140250" cy="140250"/>
       </dsp:txXfrm>
     </dsp:sp>
     <dsp:sp modelId="{7FBB34B1-6FC2-2448-B193-46CAF63327D6}">
@@ -4429,8 +4368,8 @@
       </dsp:nvSpPr>
       <dsp:spPr>
         <a:xfrm>
-          <a:off x="4667770" y="555873"/>
-          <a:ext cx="478854" cy="239427"/>
+          <a:off x="4671789" y="578769"/>
+          <a:ext cx="498946" cy="249473"/>
         </a:xfrm>
         <a:prstGeom prst="roundRect">
           <a:avLst>
@@ -4474,12 +4413,12 @@
         </a:fontRef>
       </dsp:style>
       <dsp:txBody>
-        <a:bodyPr spcFirstLastPara="0" vert="horz" wrap="square" lIns="8890" tIns="8890" rIns="8890" bIns="8890" numCol="1" spcCol="1270" anchor="ctr" anchorCtr="0">
+        <a:bodyPr spcFirstLastPara="0" vert="horz" wrap="square" lIns="9525" tIns="9525" rIns="9525" bIns="9525" numCol="1" spcCol="1270" anchor="ctr" anchorCtr="0">
           <a:noAutofit/>
         </a:bodyPr>
         <a:lstStyle/>
         <a:p>
-          <a:pPr marL="0" lvl="0" indent="0" algn="ctr" defTabSz="622300">
+          <a:pPr marL="0" lvl="0" indent="0" algn="ctr" defTabSz="666750">
             <a:lnSpc>
               <a:spcPct val="90000"/>
             </a:lnSpc>
@@ -4492,14 +4431,14 @@
             <a:buNone/>
           </a:pPr>
           <a:r>
-            <a:rPr lang="en-US" sz="1400" kern="1200" dirty="0"/>
+            <a:rPr lang="en-US" sz="1500" kern="1200" dirty="0"/>
             <a:t>chr3</a:t>
           </a:r>
         </a:p>
       </dsp:txBody>
       <dsp:txXfrm>
-        <a:off x="4674783" y="562886"/>
-        <a:ext cx="464828" cy="225401"/>
+        <a:off x="4679096" y="586076"/>
+        <a:ext cx="484332" cy="234859"/>
       </dsp:txXfrm>
     </dsp:sp>
     <dsp:sp modelId="{851004DB-3D27-8D41-B7D8-F5585A05FBC9}">
@@ -4508,9 +4447,9 @@
         <dsp:cNvSpPr/>
       </dsp:nvSpPr>
       <dsp:spPr>
-        <a:xfrm rot="17093293">
-          <a:off x="3059660" y="2184226"/>
-          <a:ext cx="2558782" cy="6284"/>
+        <a:xfrm rot="17143419">
+          <a:off x="3065387" y="2203721"/>
+          <a:ext cx="2527781" cy="6547"/>
         </a:xfrm>
         <a:custGeom>
           <a:avLst/>
@@ -4521,10 +4460,10 @@
           <a:pathLst>
             <a:path>
               <a:moveTo>
-                <a:pt x="0" y="3142"/>
+                <a:pt x="0" y="3273"/>
               </a:moveTo>
               <a:lnTo>
-                <a:pt x="2558782" y="3142"/>
+                <a:pt x="2527781" y="3273"/>
               </a:lnTo>
             </a:path>
           </a:pathLst>
@@ -4579,8 +4518,8 @@
         </a:p>
       </dsp:txBody>
       <dsp:txXfrm>
-        <a:off x="4275082" y="2123399"/>
-        <a:ext cx="127939" cy="127939"/>
+        <a:off x="4266083" y="2143801"/>
+        <a:ext cx="126389" cy="126389"/>
       </dsp:txXfrm>
     </dsp:sp>
     <dsp:sp modelId="{CCE3219C-C860-364F-8077-CC9B11A019CF}">
@@ -4590,8 +4529,8 @@
       </dsp:nvSpPr>
       <dsp:spPr>
         <a:xfrm>
-          <a:off x="4667770" y="831214"/>
-          <a:ext cx="478854" cy="239427"/>
+          <a:off x="4671789" y="865663"/>
+          <a:ext cx="498946" cy="249473"/>
         </a:xfrm>
         <a:prstGeom prst="roundRect">
           <a:avLst>
@@ -4635,12 +4574,12 @@
         </a:fontRef>
       </dsp:style>
       <dsp:txBody>
-        <a:bodyPr spcFirstLastPara="0" vert="horz" wrap="square" lIns="8890" tIns="8890" rIns="8890" bIns="8890" numCol="1" spcCol="1270" anchor="ctr" anchorCtr="0">
+        <a:bodyPr spcFirstLastPara="0" vert="horz" wrap="square" lIns="9525" tIns="9525" rIns="9525" bIns="9525" numCol="1" spcCol="1270" anchor="ctr" anchorCtr="0">
           <a:noAutofit/>
         </a:bodyPr>
         <a:lstStyle/>
         <a:p>
-          <a:pPr marL="0" lvl="0" indent="0" algn="ctr" defTabSz="622300">
+          <a:pPr marL="0" lvl="0" indent="0" algn="ctr" defTabSz="666750">
             <a:lnSpc>
               <a:spcPct val="90000"/>
             </a:lnSpc>
@@ -4653,14 +4592,14 @@
             <a:buNone/>
           </a:pPr>
           <a:r>
-            <a:rPr lang="en-US" sz="1400" kern="1200" dirty="0"/>
+            <a:rPr lang="en-US" sz="1500" kern="1200" dirty="0"/>
             <a:t>chr4</a:t>
           </a:r>
         </a:p>
       </dsp:txBody>
       <dsp:txXfrm>
-        <a:off x="4674783" y="838227"/>
-        <a:ext cx="464828" cy="225401"/>
+        <a:off x="4679096" y="872970"/>
+        <a:ext cx="484332" cy="234859"/>
       </dsp:txXfrm>
     </dsp:sp>
     <dsp:sp modelId="{54CF4744-7EFB-8F4A-8559-6EA33EA2B829}">
@@ -4669,9 +4608,9 @@
         <dsp:cNvSpPr/>
       </dsp:nvSpPr>
       <dsp:spPr>
-        <a:xfrm rot="17199337">
-          <a:off x="3192163" y="2321897"/>
-          <a:ext cx="2293775" cy="6284"/>
+        <a:xfrm rot="17262076">
+          <a:off x="3202795" y="2347168"/>
+          <a:ext cx="2252964" cy="6547"/>
         </a:xfrm>
         <a:custGeom>
           <a:avLst/>
@@ -4682,10 +4621,10 @@
           <a:pathLst>
             <a:path>
               <a:moveTo>
-                <a:pt x="0" y="3142"/>
+                <a:pt x="0" y="3273"/>
               </a:moveTo>
               <a:lnTo>
-                <a:pt x="2293775" y="3142"/>
+                <a:pt x="2252964" y="3273"/>
               </a:lnTo>
             </a:path>
           </a:pathLst>
@@ -4740,8 +4679,8 @@
         </a:p>
       </dsp:txBody>
       <dsp:txXfrm>
-        <a:off x="4281707" y="2267694"/>
-        <a:ext cx="114688" cy="114688"/>
+        <a:off x="4272953" y="2294118"/>
+        <a:ext cx="112648" cy="112648"/>
       </dsp:txXfrm>
     </dsp:sp>
     <dsp:sp modelId="{D48B78A3-B660-484C-A33E-190B59FC9068}">
@@ -4751,8 +4690,8 @@
       </dsp:nvSpPr>
       <dsp:spPr>
         <a:xfrm>
-          <a:off x="4667770" y="1106555"/>
-          <a:ext cx="478854" cy="239427"/>
+          <a:off x="4671789" y="1152557"/>
+          <a:ext cx="498946" cy="249473"/>
         </a:xfrm>
         <a:prstGeom prst="roundRect">
           <a:avLst>
@@ -4796,12 +4735,12 @@
         </a:fontRef>
       </dsp:style>
       <dsp:txBody>
-        <a:bodyPr spcFirstLastPara="0" vert="horz" wrap="square" lIns="8890" tIns="8890" rIns="8890" bIns="8890" numCol="1" spcCol="1270" anchor="ctr" anchorCtr="0">
+        <a:bodyPr spcFirstLastPara="0" vert="horz" wrap="square" lIns="9525" tIns="9525" rIns="9525" bIns="9525" numCol="1" spcCol="1270" anchor="ctr" anchorCtr="0">
           <a:noAutofit/>
         </a:bodyPr>
         <a:lstStyle/>
         <a:p>
-          <a:pPr marL="0" lvl="0" indent="0" algn="ctr" defTabSz="622300">
+          <a:pPr marL="0" lvl="0" indent="0" algn="ctr" defTabSz="666750">
             <a:lnSpc>
               <a:spcPct val="90000"/>
             </a:lnSpc>
@@ -4814,14 +4753,14 @@
             <a:buNone/>
           </a:pPr>
           <a:r>
-            <a:rPr lang="en-US" sz="1400" kern="1200" dirty="0"/>
+            <a:rPr lang="en-US" sz="1500" kern="1200" dirty="0"/>
             <a:t>chr5</a:t>
           </a:r>
         </a:p>
       </dsp:txBody>
       <dsp:txXfrm>
-        <a:off x="4674783" y="1113568"/>
-        <a:ext cx="464828" cy="225401"/>
+        <a:off x="4679096" y="1159864"/>
+        <a:ext cx="484332" cy="234859"/>
       </dsp:txXfrm>
     </dsp:sp>
     <dsp:sp modelId="{870FCE60-2715-3746-82DB-6C354285458E}">
@@ -4830,9 +4769,9 @@
         <dsp:cNvSpPr/>
       </dsp:nvSpPr>
       <dsp:spPr>
-        <a:xfrm rot="17332916">
-          <a:off x="3323291" y="2459567"/>
-          <a:ext cx="2031519" cy="6284"/>
+        <a:xfrm rot="17413459">
+          <a:off x="3338490" y="2490615"/>
+          <a:ext cx="1981574" cy="6547"/>
         </a:xfrm>
         <a:custGeom>
           <a:avLst/>
@@ -4843,10 +4782,10 @@
           <a:pathLst>
             <a:path>
               <a:moveTo>
-                <a:pt x="0" y="3142"/>
+                <a:pt x="0" y="3273"/>
               </a:moveTo>
               <a:lnTo>
-                <a:pt x="2031519" y="3142"/>
+                <a:pt x="1981574" y="3273"/>
               </a:lnTo>
             </a:path>
           </a:pathLst>
@@ -4901,8 +4840,8 @@
         </a:p>
       </dsp:txBody>
       <dsp:txXfrm>
-        <a:off x="4288263" y="2411921"/>
-        <a:ext cx="101575" cy="101575"/>
+        <a:off x="4279738" y="2444350"/>
+        <a:ext cx="99078" cy="99078"/>
       </dsp:txXfrm>
     </dsp:sp>
     <dsp:sp modelId="{3A900AD8-E4D1-874A-BFF9-E7ED232100E1}">
@@ -4912,8 +4851,8 @@
       </dsp:nvSpPr>
       <dsp:spPr>
         <a:xfrm>
-          <a:off x="4667770" y="1381897"/>
-          <a:ext cx="478854" cy="239427"/>
+          <a:off x="4671789" y="1439451"/>
+          <a:ext cx="498946" cy="249473"/>
         </a:xfrm>
         <a:prstGeom prst="roundRect">
           <a:avLst>
@@ -4957,12 +4896,12 @@
         </a:fontRef>
       </dsp:style>
       <dsp:txBody>
-        <a:bodyPr spcFirstLastPara="0" vert="horz" wrap="square" lIns="8890" tIns="8890" rIns="8890" bIns="8890" numCol="1" spcCol="1270" anchor="ctr" anchorCtr="0">
+        <a:bodyPr spcFirstLastPara="0" vert="horz" wrap="square" lIns="9525" tIns="9525" rIns="9525" bIns="9525" numCol="1" spcCol="1270" anchor="ctr" anchorCtr="0">
           <a:noAutofit/>
         </a:bodyPr>
         <a:lstStyle/>
         <a:p>
-          <a:pPr marL="0" lvl="0" indent="0" algn="ctr" defTabSz="622300">
+          <a:pPr marL="0" lvl="0" indent="0" algn="ctr" defTabSz="666750">
             <a:lnSpc>
               <a:spcPct val="90000"/>
             </a:lnSpc>
@@ -4975,14 +4914,14 @@
             <a:buNone/>
           </a:pPr>
           <a:r>
-            <a:rPr lang="en-US" sz="1400" kern="1200" dirty="0"/>
+            <a:rPr lang="en-US" sz="1500" kern="1200" dirty="0"/>
             <a:t>chr6</a:t>
           </a:r>
         </a:p>
       </dsp:txBody>
       <dsp:txXfrm>
-        <a:off x="4674783" y="1388910"/>
-        <a:ext cx="464828" cy="225401"/>
+        <a:off x="4679096" y="1446758"/>
+        <a:ext cx="484332" cy="234859"/>
       </dsp:txXfrm>
     </dsp:sp>
     <dsp:sp modelId="{D7DAE6FF-862E-904E-AA50-ABB148E11EB4}">
@@ -4991,9 +4930,9 @@
         <dsp:cNvSpPr/>
       </dsp:nvSpPr>
       <dsp:spPr>
-        <a:xfrm rot="17505737">
-          <a:off x="3452433" y="2597238"/>
-          <a:ext cx="1773235" cy="6284"/>
+        <a:xfrm rot="17612347">
+          <a:off x="3471658" y="2634062"/>
+          <a:ext cx="1715238" cy="6547"/>
         </a:xfrm>
         <a:custGeom>
           <a:avLst/>
@@ -5004,10 +4943,10 @@
           <a:pathLst>
             <a:path>
               <a:moveTo>
-                <a:pt x="0" y="3142"/>
+                <a:pt x="0" y="3273"/>
               </a:moveTo>
               <a:lnTo>
-                <a:pt x="1773235" y="3142"/>
+                <a:pt x="1715238" y="3273"/>
               </a:lnTo>
             </a:path>
           </a:pathLst>
@@ -5062,8 +5001,8 @@
         </a:p>
       </dsp:txBody>
       <dsp:txXfrm>
-        <a:off x="4294720" y="2556049"/>
-        <a:ext cx="88661" cy="88661"/>
+        <a:off x="4286396" y="2594455"/>
+        <a:ext cx="85761" cy="85761"/>
       </dsp:txXfrm>
     </dsp:sp>
     <dsp:sp modelId="{6FF70F9E-F18C-A549-9540-2E619403D71F}">
@@ -5073,8 +5012,8 @@
       </dsp:nvSpPr>
       <dsp:spPr>
         <a:xfrm>
-          <a:off x="4667770" y="1657238"/>
-          <a:ext cx="478854" cy="239427"/>
+          <a:off x="4671789" y="1726345"/>
+          <a:ext cx="498946" cy="249473"/>
         </a:xfrm>
         <a:prstGeom prst="roundRect">
           <a:avLst>
@@ -5118,12 +5057,12 @@
         </a:fontRef>
       </dsp:style>
       <dsp:txBody>
-        <a:bodyPr spcFirstLastPara="0" vert="horz" wrap="square" lIns="8890" tIns="8890" rIns="8890" bIns="8890" numCol="1" spcCol="1270" anchor="ctr" anchorCtr="0">
+        <a:bodyPr spcFirstLastPara="0" vert="horz" wrap="square" lIns="9525" tIns="9525" rIns="9525" bIns="9525" numCol="1" spcCol="1270" anchor="ctr" anchorCtr="0">
           <a:noAutofit/>
         </a:bodyPr>
         <a:lstStyle/>
         <a:p>
-          <a:pPr marL="0" lvl="0" indent="0" algn="ctr" defTabSz="622300">
+          <a:pPr marL="0" lvl="0" indent="0" algn="ctr" defTabSz="666750">
             <a:lnSpc>
               <a:spcPct val="90000"/>
             </a:lnSpc>
@@ -5136,14 +5075,14 @@
             <a:buNone/>
           </a:pPr>
           <a:r>
-            <a:rPr lang="en-US" sz="1400" kern="1200" dirty="0"/>
+            <a:rPr lang="en-US" sz="1500" kern="1200" dirty="0"/>
             <a:t>chr7</a:t>
           </a:r>
         </a:p>
       </dsp:txBody>
       <dsp:txXfrm>
-        <a:off x="4674783" y="1664251"/>
-        <a:ext cx="464828" cy="225401"/>
+        <a:off x="4679096" y="1733652"/>
+        <a:ext cx="484332" cy="234859"/>
       </dsp:txXfrm>
     </dsp:sp>
     <dsp:sp modelId="{70BF2D5B-6425-5D40-8C55-CC92D08C6D9F}">
@@ -5152,9 +5091,9 @@
         <dsp:cNvSpPr/>
       </dsp:nvSpPr>
       <dsp:spPr>
-        <a:xfrm rot="17736649">
-          <a:off x="3578577" y="2734909"/>
-          <a:ext cx="1520947" cy="6284"/>
+        <a:xfrm rot="17883021">
+          <a:off x="3600912" y="2777510"/>
+          <a:ext cx="1456730" cy="6547"/>
         </a:xfrm>
         <a:custGeom>
           <a:avLst/>
@@ -5165,10 +5104,10 @@
           <a:pathLst>
             <a:path>
               <a:moveTo>
-                <a:pt x="0" y="3142"/>
+                <a:pt x="0" y="3273"/>
               </a:moveTo>
               <a:lnTo>
-                <a:pt x="1520947" y="3142"/>
+                <a:pt x="1456730" y="3273"/>
               </a:lnTo>
             </a:path>
           </a:pathLst>
@@ -5223,8 +5162,8 @@
         </a:p>
       </dsp:txBody>
       <dsp:txXfrm>
-        <a:off x="4301027" y="2700027"/>
-        <a:ext cx="76047" cy="76047"/>
+        <a:off x="4292859" y="2744365"/>
+        <a:ext cx="72836" cy="72836"/>
       </dsp:txXfrm>
     </dsp:sp>
     <dsp:sp modelId="{AF20F9D4-A121-A844-B26D-00C13F030434}">
@@ -5234,8 +5173,8 @@
       </dsp:nvSpPr>
       <dsp:spPr>
         <a:xfrm>
-          <a:off x="4667770" y="1932579"/>
-          <a:ext cx="478854" cy="239427"/>
+          <a:off x="4671789" y="2013239"/>
+          <a:ext cx="498946" cy="249473"/>
         </a:xfrm>
         <a:prstGeom prst="roundRect">
           <a:avLst>
@@ -5279,12 +5218,12 @@
         </a:fontRef>
       </dsp:style>
       <dsp:txBody>
-        <a:bodyPr spcFirstLastPara="0" vert="horz" wrap="square" lIns="8890" tIns="8890" rIns="8890" bIns="8890" numCol="1" spcCol="1270" anchor="ctr" anchorCtr="0">
+        <a:bodyPr spcFirstLastPara="0" vert="horz" wrap="square" lIns="9525" tIns="9525" rIns="9525" bIns="9525" numCol="1" spcCol="1270" anchor="ctr" anchorCtr="0">
           <a:noAutofit/>
         </a:bodyPr>
         <a:lstStyle/>
         <a:p>
-          <a:pPr marL="0" lvl="0" indent="0" algn="ctr" defTabSz="622300">
+          <a:pPr marL="0" lvl="0" indent="0" algn="ctr" defTabSz="666750">
             <a:lnSpc>
               <a:spcPct val="90000"/>
             </a:lnSpc>
@@ -5297,14 +5236,14 @@
             <a:buNone/>
           </a:pPr>
           <a:r>
-            <a:rPr lang="en-US" sz="1400" kern="1200" dirty="0"/>
+            <a:rPr lang="en-US" sz="1500" kern="1200" dirty="0"/>
             <a:t>chr8</a:t>
           </a:r>
         </a:p>
       </dsp:txBody>
       <dsp:txXfrm>
-        <a:off x="4674783" y="1939592"/>
-        <a:ext cx="464828" cy="225401"/>
+        <a:off x="4679096" y="2020546"/>
+        <a:ext cx="484332" cy="234859"/>
       </dsp:txXfrm>
     </dsp:sp>
     <dsp:sp modelId="{812DE7EE-50D0-FA41-BB8B-3C7C1F2E6173}">
@@ -5313,9 +5252,9 @@
         <dsp:cNvSpPr/>
       </dsp:nvSpPr>
       <dsp:spPr>
-        <a:xfrm rot="18057211">
-          <a:off x="3699946" y="2872579"/>
-          <a:ext cx="1278211" cy="6284"/>
+        <a:xfrm rot="18266775">
+          <a:off x="3723740" y="2920957"/>
+          <a:ext cx="1211074" cy="6547"/>
         </a:xfrm>
         <a:custGeom>
           <a:avLst/>
@@ -5326,10 +5265,10 @@
           <a:pathLst>
             <a:path>
               <a:moveTo>
-                <a:pt x="0" y="3142"/>
+                <a:pt x="0" y="3273"/>
               </a:moveTo>
               <a:lnTo>
-                <a:pt x="1278211" y="3142"/>
+                <a:pt x="1211074" y="3273"/>
               </a:lnTo>
             </a:path>
           </a:pathLst>
@@ -5384,8 +5323,8 @@
         </a:p>
       </dsp:txBody>
       <dsp:txXfrm>
-        <a:off x="4307096" y="2843766"/>
-        <a:ext cx="63910" cy="63910"/>
+        <a:off x="4299000" y="2893954"/>
+        <a:ext cx="60553" cy="60553"/>
       </dsp:txXfrm>
     </dsp:sp>
     <dsp:sp modelId="{B53F28F2-8DC7-FF41-8194-031D6090094F}">
@@ -5395,8 +5334,8 @@
       </dsp:nvSpPr>
       <dsp:spPr>
         <a:xfrm>
-          <a:off x="4667770" y="2207921"/>
-          <a:ext cx="478854" cy="239427"/>
+          <a:off x="4671789" y="2300134"/>
+          <a:ext cx="498946" cy="249473"/>
         </a:xfrm>
         <a:prstGeom prst="roundRect">
           <a:avLst>
@@ -5440,12 +5379,12 @@
         </a:fontRef>
       </dsp:style>
       <dsp:txBody>
-        <a:bodyPr spcFirstLastPara="0" vert="horz" wrap="square" lIns="8890" tIns="8890" rIns="8890" bIns="8890" numCol="1" spcCol="1270" anchor="ctr" anchorCtr="0">
+        <a:bodyPr spcFirstLastPara="0" vert="horz" wrap="square" lIns="9525" tIns="9525" rIns="9525" bIns="9525" numCol="1" spcCol="1270" anchor="ctr" anchorCtr="0">
           <a:noAutofit/>
         </a:bodyPr>
         <a:lstStyle/>
         <a:p>
-          <a:pPr marL="0" lvl="0" indent="0" algn="ctr" defTabSz="622300">
+          <a:pPr marL="0" lvl="0" indent="0" algn="ctr" defTabSz="666750">
             <a:lnSpc>
               <a:spcPct val="90000"/>
             </a:lnSpc>
@@ -5458,14 +5397,14 @@
             <a:buNone/>
           </a:pPr>
           <a:r>
-            <a:rPr lang="en-US" sz="1400" kern="1200" dirty="0"/>
+            <a:rPr lang="en-US" sz="1500" kern="1200" dirty="0"/>
             <a:t>chr9</a:t>
           </a:r>
         </a:p>
       </dsp:txBody>
       <dsp:txXfrm>
-        <a:off x="4674783" y="2214934"/>
-        <a:ext cx="464828" cy="225401"/>
+        <a:off x="4679096" y="2307441"/>
+        <a:ext cx="484332" cy="234859"/>
       </dsp:txXfrm>
     </dsp:sp>
     <dsp:sp modelId="{C4518E9A-E7BC-B64C-9E82-50DAC7362BE3}">
@@ -5474,9 +5413,9 @@
         <dsp:cNvSpPr/>
       </dsp:nvSpPr>
       <dsp:spPr>
-        <a:xfrm rot="18521559">
-          <a:off x="3813220" y="3010250"/>
-          <a:ext cx="1051661" cy="6284"/>
+        <a:xfrm rot="18834043">
+          <a:off x="3835325" y="3064404"/>
+          <a:ext cx="987903" cy="6547"/>
         </a:xfrm>
         <a:custGeom>
           <a:avLst/>
@@ -5487,10 +5426,10 @@
           <a:pathLst>
             <a:path>
               <a:moveTo>
-                <a:pt x="0" y="3142"/>
+                <a:pt x="0" y="3273"/>
               </a:moveTo>
               <a:lnTo>
-                <a:pt x="1051661" y="3142"/>
+                <a:pt x="987903" y="3273"/>
               </a:lnTo>
             </a:path>
           </a:pathLst>
@@ -5545,8 +5484,8 @@
         </a:p>
       </dsp:txBody>
       <dsp:txXfrm>
-        <a:off x="4312760" y="2987101"/>
-        <a:ext cx="52583" cy="52583"/>
+        <a:off x="4304579" y="3042980"/>
+        <a:ext cx="49395" cy="49395"/>
       </dsp:txXfrm>
     </dsp:sp>
     <dsp:sp modelId="{57C5DA5C-AC8A-F941-8A8A-9F5C7809C086}">
@@ -5556,8 +5495,8 @@
       </dsp:nvSpPr>
       <dsp:spPr>
         <a:xfrm>
-          <a:off x="4667770" y="2483262"/>
-          <a:ext cx="478854" cy="239427"/>
+          <a:off x="4671789" y="2587028"/>
+          <a:ext cx="498946" cy="249473"/>
         </a:xfrm>
         <a:prstGeom prst="roundRect">
           <a:avLst>
@@ -5601,12 +5540,12 @@
         </a:fontRef>
       </dsp:style>
       <dsp:txBody>
-        <a:bodyPr spcFirstLastPara="0" vert="horz" wrap="square" lIns="8890" tIns="8890" rIns="8890" bIns="8890" numCol="1" spcCol="1270" anchor="ctr" anchorCtr="0">
+        <a:bodyPr spcFirstLastPara="0" vert="horz" wrap="square" lIns="9525" tIns="9525" rIns="9525" bIns="9525" numCol="1" spcCol="1270" anchor="ctr" anchorCtr="0">
           <a:noAutofit/>
         </a:bodyPr>
         <a:lstStyle/>
         <a:p>
-          <a:pPr marL="0" lvl="0" indent="0" algn="ctr" defTabSz="622300">
+          <a:pPr marL="0" lvl="0" indent="0" algn="ctr" defTabSz="666750">
             <a:lnSpc>
               <a:spcPct val="90000"/>
             </a:lnSpc>
@@ -5619,14 +5558,14 @@
             <a:buNone/>
           </a:pPr>
           <a:r>
-            <a:rPr lang="en-US" sz="1400" kern="1200" dirty="0"/>
+            <a:rPr lang="en-US" sz="1500" kern="1200" dirty="0"/>
             <a:t>chr10</a:t>
           </a:r>
         </a:p>
       </dsp:txBody>
       <dsp:txXfrm>
-        <a:off x="4674783" y="2490275"/>
-        <a:ext cx="464828" cy="225401"/>
+        <a:off x="4679096" y="2594335"/>
+        <a:ext cx="484332" cy="234859"/>
       </dsp:txXfrm>
     </dsp:sp>
     <dsp:sp modelId="{439FBDF5-7C84-0D4C-9FE0-F9646B80D49B}">
@@ -5635,9 +5574,9 @@
         <dsp:cNvSpPr/>
       </dsp:nvSpPr>
       <dsp:spPr>
-        <a:xfrm rot="19219003">
-          <a:off x="3911913" y="3147921"/>
-          <a:ext cx="854275" cy="6284"/>
+        <a:xfrm rot="19691275">
+          <a:off x="3926219" y="3207851"/>
+          <a:ext cx="806117" cy="6547"/>
         </a:xfrm>
         <a:custGeom>
           <a:avLst/>
@@ -5648,10 +5587,10 @@
           <a:pathLst>
             <a:path>
               <a:moveTo>
-                <a:pt x="0" y="3142"/>
+                <a:pt x="0" y="3273"/>
               </a:moveTo>
               <a:lnTo>
-                <a:pt x="854275" y="3142"/>
+                <a:pt x="806117" y="3273"/>
               </a:lnTo>
             </a:path>
           </a:pathLst>
@@ -5706,8 +5645,8 @@
         </a:p>
       </dsp:txBody>
       <dsp:txXfrm>
-        <a:off x="4317694" y="3129706"/>
-        <a:ext cx="42713" cy="42713"/>
+        <a:off x="4309124" y="3190972"/>
+        <a:ext cx="40305" cy="40305"/>
       </dsp:txXfrm>
     </dsp:sp>
     <dsp:sp modelId="{5625E0CD-8675-9A46-8B99-772D47419F32}">
@@ -5717,8 +5656,8 @@
       </dsp:nvSpPr>
       <dsp:spPr>
         <a:xfrm>
-          <a:off x="4667770" y="2758603"/>
-          <a:ext cx="478854" cy="239427"/>
+          <a:off x="4671789" y="2873922"/>
+          <a:ext cx="498946" cy="249473"/>
         </a:xfrm>
         <a:prstGeom prst="roundRect">
           <a:avLst>
@@ -5762,12 +5701,12 @@
         </a:fontRef>
       </dsp:style>
       <dsp:txBody>
-        <a:bodyPr spcFirstLastPara="0" vert="horz" wrap="square" lIns="8890" tIns="8890" rIns="8890" bIns="8890" numCol="1" spcCol="1270" anchor="ctr" anchorCtr="0">
+        <a:bodyPr spcFirstLastPara="0" vert="horz" wrap="square" lIns="9525" tIns="9525" rIns="9525" bIns="9525" numCol="1" spcCol="1270" anchor="ctr" anchorCtr="0">
           <a:noAutofit/>
         </a:bodyPr>
         <a:lstStyle/>
         <a:p>
-          <a:pPr marL="0" lvl="0" indent="0" algn="ctr" defTabSz="622300">
+          <a:pPr marL="0" lvl="0" indent="0" algn="ctr" defTabSz="666750">
             <a:lnSpc>
               <a:spcPct val="90000"/>
             </a:lnSpc>
@@ -5780,14 +5719,14 @@
             <a:buNone/>
           </a:pPr>
           <a:r>
-            <a:rPr lang="en-US" sz="1400" kern="1200" dirty="0"/>
+            <a:rPr lang="en-US" sz="1500" kern="1200" dirty="0"/>
             <a:t>chr11</a:t>
           </a:r>
         </a:p>
       </dsp:txBody>
       <dsp:txXfrm>
-        <a:off x="4674783" y="2765616"/>
-        <a:ext cx="464828" cy="225401"/>
+        <a:off x="4679096" y="2881229"/>
+        <a:ext cx="484332" cy="234859"/>
       </dsp:txXfrm>
     </dsp:sp>
     <dsp:sp modelId="{60229A0C-FFCE-A547-865E-2EB6579C6B04}">
@@ -5796,9 +5735,9 @@
         <dsp:cNvSpPr/>
       </dsp:nvSpPr>
       <dsp:spPr>
-        <a:xfrm rot="20259694">
-          <a:off x="3983662" y="3285591"/>
-          <a:ext cx="710778" cy="6284"/>
+        <a:xfrm rot="20916417">
+          <a:off x="3979881" y="3351298"/>
+          <a:ext cx="698792" cy="6547"/>
         </a:xfrm>
         <a:custGeom>
           <a:avLst/>
@@ -5809,10 +5748,10 @@
           <a:pathLst>
             <a:path>
               <a:moveTo>
-                <a:pt x="0" y="3142"/>
+                <a:pt x="0" y="3273"/>
               </a:moveTo>
               <a:lnTo>
-                <a:pt x="710778" y="3142"/>
+                <a:pt x="698792" y="3273"/>
               </a:lnTo>
             </a:path>
           </a:pathLst>
@@ -5867,8 +5806,8 @@
         </a:p>
       </dsp:txBody>
       <dsp:txXfrm>
-        <a:off x="4321282" y="3270964"/>
-        <a:ext cx="35538" cy="35538"/>
+        <a:off x="4311807" y="3337102"/>
+        <a:ext cx="34939" cy="34939"/>
       </dsp:txXfrm>
     </dsp:sp>
     <dsp:sp modelId="{61CDE175-5DB6-0C4B-866D-7AEAA68BF44C}">
@@ -5878,8 +5817,8 @@
       </dsp:nvSpPr>
       <dsp:spPr>
         <a:xfrm>
-          <a:off x="4667770" y="3033945"/>
-          <a:ext cx="478854" cy="239427"/>
+          <a:off x="4671789" y="3160816"/>
+          <a:ext cx="498946" cy="249473"/>
         </a:xfrm>
         <a:prstGeom prst="roundRect">
           <a:avLst>
@@ -5923,12 +5862,12 @@
         </a:fontRef>
       </dsp:style>
       <dsp:txBody>
-        <a:bodyPr spcFirstLastPara="0" vert="horz" wrap="square" lIns="8890" tIns="8890" rIns="8890" bIns="8890" numCol="1" spcCol="1270" anchor="ctr" anchorCtr="0">
+        <a:bodyPr spcFirstLastPara="0" vert="horz" wrap="square" lIns="9525" tIns="9525" rIns="9525" bIns="9525" numCol="1" spcCol="1270" anchor="ctr" anchorCtr="0">
           <a:noAutofit/>
         </a:bodyPr>
         <a:lstStyle/>
         <a:p>
-          <a:pPr marL="0" lvl="0" indent="0" algn="ctr" defTabSz="622300">
+          <a:pPr marL="0" lvl="0" indent="0" algn="ctr" defTabSz="666750">
             <a:lnSpc>
               <a:spcPct val="90000"/>
             </a:lnSpc>
@@ -5941,14 +5880,14 @@
             <a:buNone/>
           </a:pPr>
           <a:r>
-            <a:rPr lang="en-US" sz="1400" kern="1200" dirty="0"/>
+            <a:rPr lang="en-US" sz="1500" kern="1200" dirty="0"/>
             <a:t>chr12</a:t>
           </a:r>
         </a:p>
       </dsp:txBody>
       <dsp:txXfrm>
-        <a:off x="4674783" y="3040958"/>
-        <a:ext cx="464828" cy="225401"/>
+        <a:off x="4679096" y="3168123"/>
+        <a:ext cx="484332" cy="234859"/>
       </dsp:txXfrm>
     </dsp:sp>
     <dsp:sp modelId="{58B9977E-81D7-3D40-A6A6-3B86AAA454D2}">
@@ -5957,9 +5896,9 @@
         <dsp:cNvSpPr/>
       </dsp:nvSpPr>
       <dsp:spPr>
-        <a:xfrm rot="27142">
-          <a:off x="4010322" y="3423262"/>
-          <a:ext cx="657458" cy="6284"/>
+        <a:xfrm rot="735587">
+          <a:off x="3978772" y="3494745"/>
+          <a:ext cx="701009" cy="6547"/>
         </a:xfrm>
         <a:custGeom>
           <a:avLst/>
@@ -5970,10 +5909,10 @@
           <a:pathLst>
             <a:path>
               <a:moveTo>
-                <a:pt x="0" y="3142"/>
+                <a:pt x="0" y="3273"/>
               </a:moveTo>
               <a:lnTo>
-                <a:pt x="657458" y="3142"/>
+                <a:pt x="701009" y="3273"/>
               </a:lnTo>
             </a:path>
           </a:pathLst>
@@ -6028,8 +5967,8 @@
         </a:p>
       </dsp:txBody>
       <dsp:txXfrm>
-        <a:off x="4322615" y="3409968"/>
-        <a:ext cx="32872" cy="32872"/>
+        <a:off x="4311752" y="3480493"/>
+        <a:ext cx="35050" cy="35050"/>
       </dsp:txXfrm>
     </dsp:sp>
     <dsp:sp modelId="{CBBB8745-E466-5A4C-8EB6-E13F92625655}">
@@ -6039,8 +5978,8 @@
       </dsp:nvSpPr>
       <dsp:spPr>
         <a:xfrm>
-          <a:off x="4667770" y="3309286"/>
-          <a:ext cx="478854" cy="239427"/>
+          <a:off x="4671789" y="3447710"/>
+          <a:ext cx="498946" cy="249473"/>
         </a:xfrm>
         <a:prstGeom prst="roundRect">
           <a:avLst>
@@ -6084,12 +6023,12 @@
         </a:fontRef>
       </dsp:style>
       <dsp:txBody>
-        <a:bodyPr spcFirstLastPara="0" vert="horz" wrap="square" lIns="8890" tIns="8890" rIns="8890" bIns="8890" numCol="1" spcCol="1270" anchor="ctr" anchorCtr="0">
+        <a:bodyPr spcFirstLastPara="0" vert="horz" wrap="square" lIns="9525" tIns="9525" rIns="9525" bIns="9525" numCol="1" spcCol="1270" anchor="ctr" anchorCtr="0">
           <a:noAutofit/>
         </a:bodyPr>
         <a:lstStyle/>
         <a:p>
-          <a:pPr marL="0" lvl="0" indent="0" algn="ctr" defTabSz="622300">
+          <a:pPr marL="0" lvl="0" indent="0" algn="ctr" defTabSz="666750">
             <a:lnSpc>
               <a:spcPct val="90000"/>
             </a:lnSpc>
@@ -6102,14 +6041,14 @@
             <a:buNone/>
           </a:pPr>
           <a:r>
-            <a:rPr lang="en-US" sz="1400" kern="1200" dirty="0"/>
+            <a:rPr lang="en-US" sz="1500" kern="1200" dirty="0"/>
             <a:t>chr13</a:t>
           </a:r>
         </a:p>
       </dsp:txBody>
       <dsp:txXfrm>
-        <a:off x="4674783" y="3316299"/>
-        <a:ext cx="464828" cy="225401"/>
+        <a:off x="4679096" y="3455017"/>
+        <a:ext cx="484332" cy="234859"/>
       </dsp:txXfrm>
     </dsp:sp>
     <dsp:sp modelId="{1B7D74DC-D6D3-9044-891C-F3074618C62B}">
@@ -6118,9 +6057,9 @@
         <dsp:cNvSpPr/>
       </dsp:nvSpPr>
       <dsp:spPr>
-        <a:xfrm rot="1386490">
-          <a:off x="3981657" y="3560933"/>
-          <a:ext cx="714789" cy="6284"/>
+        <a:xfrm rot="1947649">
+          <a:off x="3923342" y="3638192"/>
+          <a:ext cx="811871" cy="6547"/>
         </a:xfrm>
         <a:custGeom>
           <a:avLst/>
@@ -6131,10 +6070,10 @@
           <a:pathLst>
             <a:path>
               <a:moveTo>
-                <a:pt x="0" y="3142"/>
+                <a:pt x="0" y="3273"/>
               </a:moveTo>
               <a:lnTo>
-                <a:pt x="714789" y="3142"/>
+                <a:pt x="811871" y="3273"/>
               </a:lnTo>
             </a:path>
           </a:pathLst>
@@ -6189,8 +6128,8 @@
         </a:p>
       </dsp:txBody>
       <dsp:txXfrm>
-        <a:off x="4321181" y="3546205"/>
-        <a:ext cx="35739" cy="35739"/>
+        <a:off x="4308980" y="3621169"/>
+        <a:ext cx="40593" cy="40593"/>
       </dsp:txXfrm>
     </dsp:sp>
     <dsp:sp modelId="{67C57D55-59E8-1B4A-B1B5-6B3887F607C6}">
@@ -6200,8 +6139,8 @@
       </dsp:nvSpPr>
       <dsp:spPr>
         <a:xfrm>
-          <a:off x="4667770" y="3584627"/>
-          <a:ext cx="478854" cy="239427"/>
+          <a:off x="4671789" y="3734604"/>
+          <a:ext cx="498946" cy="249473"/>
         </a:xfrm>
         <a:prstGeom prst="roundRect">
           <a:avLst>
@@ -6245,12 +6184,12 @@
         </a:fontRef>
       </dsp:style>
       <dsp:txBody>
-        <a:bodyPr spcFirstLastPara="0" vert="horz" wrap="square" lIns="8890" tIns="8890" rIns="8890" bIns="8890" numCol="1" spcCol="1270" anchor="ctr" anchorCtr="0">
+        <a:bodyPr spcFirstLastPara="0" vert="horz" wrap="square" lIns="9525" tIns="9525" rIns="9525" bIns="9525" numCol="1" spcCol="1270" anchor="ctr" anchorCtr="0">
           <a:noAutofit/>
         </a:bodyPr>
         <a:lstStyle/>
         <a:p>
-          <a:pPr marL="0" lvl="0" indent="0" algn="ctr" defTabSz="622300">
+          <a:pPr marL="0" lvl="0" indent="0" algn="ctr" defTabSz="666750">
             <a:lnSpc>
               <a:spcPct val="90000"/>
             </a:lnSpc>
@@ -6263,14 +6202,14 @@
             <a:buNone/>
           </a:pPr>
           <a:r>
-            <a:rPr lang="en-US" sz="1400" kern="1200" dirty="0"/>
+            <a:rPr lang="en-US" sz="1500" kern="1200" dirty="0"/>
             <a:t>chr14</a:t>
           </a:r>
         </a:p>
       </dsp:txBody>
       <dsp:txXfrm>
-        <a:off x="4674783" y="3591640"/>
-        <a:ext cx="464828" cy="225401"/>
+        <a:off x="4679096" y="3741911"/>
+        <a:ext cx="484332" cy="234859"/>
       </dsp:txXfrm>
     </dsp:sp>
     <dsp:sp modelId="{CBEC6CF4-DC44-6A45-A7C6-DAD20C03EDAF}">
@@ -6279,9 +6218,9 @@
         <dsp:cNvSpPr/>
       </dsp:nvSpPr>
       <dsp:spPr>
-        <a:xfrm rot="2412899">
-          <a:off x="3908580" y="3698603"/>
-          <a:ext cx="860941" cy="6284"/>
+        <a:xfrm rot="2791853">
+          <a:off x="3831414" y="3781639"/>
+          <a:ext cx="995726" cy="6547"/>
         </a:xfrm>
         <a:custGeom>
           <a:avLst/>
@@ -6292,10 +6231,10 @@
           <a:pathLst>
             <a:path>
               <a:moveTo>
-                <a:pt x="0" y="3142"/>
+                <a:pt x="0" y="3273"/>
               </a:moveTo>
               <a:lnTo>
-                <a:pt x="860941" y="3142"/>
+                <a:pt x="995726" y="3273"/>
               </a:lnTo>
             </a:path>
           </a:pathLst>
@@ -6350,8 +6289,8 @@
         </a:p>
       </dsp:txBody>
       <dsp:txXfrm>
-        <a:off x="4317528" y="3680222"/>
-        <a:ext cx="43047" cy="43047"/>
+        <a:off x="4304384" y="3760020"/>
+        <a:ext cx="49786" cy="49786"/>
       </dsp:txXfrm>
     </dsp:sp>
     <dsp:sp modelId="{00864838-1B52-8E45-B86B-39EAD4017B01}">
@@ -6361,8 +6300,8 @@
       </dsp:nvSpPr>
       <dsp:spPr>
         <a:xfrm>
-          <a:off x="4667770" y="3859969"/>
-          <a:ext cx="478854" cy="239427"/>
+          <a:off x="4671789" y="4021498"/>
+          <a:ext cx="498946" cy="249473"/>
         </a:xfrm>
         <a:prstGeom prst="roundRect">
           <a:avLst>
@@ -6406,12 +6345,12 @@
         </a:fontRef>
       </dsp:style>
       <dsp:txBody>
-        <a:bodyPr spcFirstLastPara="0" vert="horz" wrap="square" lIns="8890" tIns="8890" rIns="8890" bIns="8890" numCol="1" spcCol="1270" anchor="ctr" anchorCtr="0">
+        <a:bodyPr spcFirstLastPara="0" vert="horz" wrap="square" lIns="9525" tIns="9525" rIns="9525" bIns="9525" numCol="1" spcCol="1270" anchor="ctr" anchorCtr="0">
           <a:noAutofit/>
         </a:bodyPr>
         <a:lstStyle/>
         <a:p>
-          <a:pPr marL="0" lvl="0" indent="0" algn="ctr" defTabSz="622300">
+          <a:pPr marL="0" lvl="0" indent="0" algn="ctr" defTabSz="666750">
             <a:lnSpc>
               <a:spcPct val="90000"/>
             </a:lnSpc>
@@ -6424,14 +6363,14 @@
             <a:buNone/>
           </a:pPr>
           <a:r>
-            <a:rPr lang="en-US" sz="1400" kern="1200" dirty="0"/>
+            <a:rPr lang="en-US" sz="1500" kern="1200" dirty="0"/>
             <a:t>chr15</a:t>
           </a:r>
         </a:p>
       </dsp:txBody>
       <dsp:txXfrm>
-        <a:off x="4674783" y="3866982"/>
-        <a:ext cx="464828" cy="225401"/>
+        <a:off x="4679096" y="4028805"/>
+        <a:ext cx="484332" cy="234859"/>
       </dsp:txXfrm>
     </dsp:sp>
     <dsp:sp modelId="{5B9690A2-7D29-614F-ADBE-E8599DD2D150}">
@@ -6440,9 +6379,9 @@
         <dsp:cNvSpPr/>
       </dsp:nvSpPr>
       <dsp:spPr>
-        <a:xfrm rot="3099494">
-          <a:off x="3809159" y="3836274"/>
-          <a:ext cx="1059784" cy="6284"/>
+        <a:xfrm rot="3350466">
+          <a:off x="3719272" y="3925086"/>
+          <a:ext cx="1220009" cy="6547"/>
         </a:xfrm>
         <a:custGeom>
           <a:avLst/>
@@ -6453,10 +6392,10 @@
           <a:pathLst>
             <a:path>
               <a:moveTo>
-                <a:pt x="0" y="3142"/>
+                <a:pt x="0" y="3273"/>
               </a:moveTo>
               <a:lnTo>
-                <a:pt x="1059784" y="3142"/>
+                <a:pt x="1220009" y="3273"/>
               </a:lnTo>
             </a:path>
           </a:pathLst>
@@ -6511,8 +6450,8 @@
         </a:p>
       </dsp:txBody>
       <dsp:txXfrm>
-        <a:off x="4312557" y="3812921"/>
-        <a:ext cx="52989" cy="52989"/>
+        <a:off x="4298777" y="3897860"/>
+        <a:ext cx="61000" cy="61000"/>
       </dsp:txXfrm>
     </dsp:sp>
     <dsp:sp modelId="{1F717781-6253-174D-8898-94FB6BBD213B}">
@@ -6522,8 +6461,8 @@
       </dsp:nvSpPr>
       <dsp:spPr>
         <a:xfrm>
-          <a:off x="4667770" y="4135310"/>
-          <a:ext cx="478854" cy="239427"/>
+          <a:off x="4671789" y="4308392"/>
+          <a:ext cx="498946" cy="249473"/>
         </a:xfrm>
         <a:prstGeom prst="roundRect">
           <a:avLst>
@@ -6567,12 +6506,12 @@
         </a:fontRef>
       </dsp:style>
       <dsp:txBody>
-        <a:bodyPr spcFirstLastPara="0" vert="horz" wrap="square" lIns="8890" tIns="8890" rIns="8890" bIns="8890" numCol="1" spcCol="1270" anchor="ctr" anchorCtr="0">
+        <a:bodyPr spcFirstLastPara="0" vert="horz" wrap="square" lIns="9525" tIns="9525" rIns="9525" bIns="9525" numCol="1" spcCol="1270" anchor="ctr" anchorCtr="0">
           <a:noAutofit/>
         </a:bodyPr>
         <a:lstStyle/>
         <a:p>
-          <a:pPr marL="0" lvl="0" indent="0" algn="ctr" defTabSz="622300">
+          <a:pPr marL="0" lvl="0" indent="0" algn="ctr" defTabSz="666750">
             <a:lnSpc>
               <a:spcPct val="90000"/>
             </a:lnSpc>
@@ -6585,14 +6524,14 @@
             <a:buNone/>
           </a:pPr>
           <a:r>
-            <a:rPr lang="en-US" sz="1400" kern="1200" dirty="0"/>
+            <a:rPr lang="en-US" sz="1500" kern="1200" dirty="0"/>
             <a:t>chr16</a:t>
           </a:r>
         </a:p>
       </dsp:txBody>
       <dsp:txXfrm>
-        <a:off x="4674783" y="4142323"/>
-        <a:ext cx="464828" cy="225401"/>
+        <a:off x="4679096" y="4315699"/>
+        <a:ext cx="484332" cy="234859"/>
       </dsp:txXfrm>
     </dsp:sp>
     <dsp:sp modelId="{3E791A08-CC1A-A248-9DB4-ED573FD7ABB7}">
@@ -6601,9 +6540,9 @@
         <dsp:cNvSpPr/>
       </dsp:nvSpPr>
       <dsp:spPr>
-        <a:xfrm rot="3557050">
-          <a:off x="3695488" y="3973945"/>
-          <a:ext cx="1287125" cy="6284"/>
+        <a:xfrm rot="3728905">
+          <a:off x="3596134" y="4068533"/>
+          <a:ext cx="1466285" cy="6547"/>
         </a:xfrm>
         <a:custGeom>
           <a:avLst/>
@@ -6614,10 +6553,10 @@
           <a:pathLst>
             <a:path>
               <a:moveTo>
-                <a:pt x="0" y="3142"/>
+                <a:pt x="0" y="3273"/>
               </a:moveTo>
               <a:lnTo>
-                <a:pt x="1287125" y="3142"/>
+                <a:pt x="1466285" y="3273"/>
               </a:lnTo>
             </a:path>
           </a:pathLst>
@@ -6672,8 +6611,8 @@
         </a:p>
       </dsp:txBody>
       <dsp:txXfrm>
-        <a:off x="4306873" y="3944909"/>
-        <a:ext cx="64356" cy="64356"/>
+        <a:off x="4292620" y="4035150"/>
+        <a:ext cx="73314" cy="73314"/>
       </dsp:txXfrm>
     </dsp:sp>
     <dsp:sp modelId="{2E1D7EA0-6AB4-9141-86FE-0F761B089AE5}">
@@ -6683,8 +6622,8 @@
       </dsp:nvSpPr>
       <dsp:spPr>
         <a:xfrm>
-          <a:off x="4667770" y="4410651"/>
-          <a:ext cx="478854" cy="239427"/>
+          <a:off x="4671789" y="4595286"/>
+          <a:ext cx="498946" cy="249473"/>
         </a:xfrm>
         <a:prstGeom prst="roundRect">
           <a:avLst>
@@ -6728,12 +6667,12 @@
         </a:fontRef>
       </dsp:style>
       <dsp:txBody>
-        <a:bodyPr spcFirstLastPara="0" vert="horz" wrap="square" lIns="8890" tIns="8890" rIns="8890" bIns="8890" numCol="1" spcCol="1270" anchor="ctr" anchorCtr="0">
+        <a:bodyPr spcFirstLastPara="0" vert="horz" wrap="square" lIns="9525" tIns="9525" rIns="9525" bIns="9525" numCol="1" spcCol="1270" anchor="ctr" anchorCtr="0">
           <a:noAutofit/>
         </a:bodyPr>
         <a:lstStyle/>
         <a:p>
-          <a:pPr marL="0" lvl="0" indent="0" algn="ctr" defTabSz="622300">
+          <a:pPr marL="0" lvl="0" indent="0" algn="ctr" defTabSz="666750">
             <a:lnSpc>
               <a:spcPct val="90000"/>
             </a:lnSpc>
@@ -6746,14 +6685,14 @@
             <a:buNone/>
           </a:pPr>
           <a:r>
-            <a:rPr lang="en-US" sz="1400" kern="1200" dirty="0"/>
+            <a:rPr lang="en-US" sz="1500" kern="1200" dirty="0"/>
             <a:t>chr17</a:t>
           </a:r>
         </a:p>
       </dsp:txBody>
       <dsp:txXfrm>
-        <a:off x="4674783" y="4417664"/>
-        <a:ext cx="464828" cy="225401"/>
+        <a:off x="4679096" y="4602593"/>
+        <a:ext cx="484332" cy="234859"/>
       </dsp:txXfrm>
     </dsp:sp>
     <dsp:sp modelId="{77B49D6C-F968-2841-A1D7-8E4234186E13}">
@@ -6762,9 +6701,9 @@
         <dsp:cNvSpPr/>
       </dsp:nvSpPr>
       <dsp:spPr>
-        <a:xfrm rot="3873432">
-          <a:off x="3573893" y="4111615"/>
-          <a:ext cx="1530315" cy="6284"/>
+        <a:xfrm rot="3996262">
+          <a:off x="3466697" y="4211980"/>
+          <a:ext cx="1725160" cy="6547"/>
         </a:xfrm>
         <a:custGeom>
           <a:avLst/>
@@ -6775,10 +6714,10 @@
           <a:pathLst>
             <a:path>
               <a:moveTo>
-                <a:pt x="0" y="3142"/>
+                <a:pt x="0" y="3273"/>
               </a:moveTo>
               <a:lnTo>
-                <a:pt x="1530315" y="3142"/>
+                <a:pt x="1725160" y="3273"/>
               </a:lnTo>
             </a:path>
           </a:pathLst>
@@ -6817,7 +6756,7 @@
         </a:bodyPr>
         <a:lstStyle/>
         <a:p>
-          <a:pPr marL="0" lvl="0" indent="0" algn="ctr" defTabSz="222250">
+          <a:pPr marL="0" lvl="0" indent="0" algn="ctr" defTabSz="266700">
             <a:lnSpc>
               <a:spcPct val="90000"/>
             </a:lnSpc>
@@ -6829,12 +6768,12 @@
             </a:spcAft>
             <a:buNone/>
           </a:pPr>
-          <a:endParaRPr lang="en-US" sz="500" kern="1200"/>
+          <a:endParaRPr lang="en-US" sz="600" kern="1200"/>
         </a:p>
       </dsp:txBody>
       <dsp:txXfrm>
-        <a:off x="4300793" y="4076500"/>
-        <a:ext cx="76515" cy="76515"/>
+        <a:off x="4286148" y="4172125"/>
+        <a:ext cx="86258" cy="86258"/>
       </dsp:txXfrm>
     </dsp:sp>
     <dsp:sp modelId="{405E2DBC-DC2D-784B-8141-B760FC2DD6CF}">
@@ -6844,8 +6783,8 @@
       </dsp:nvSpPr>
       <dsp:spPr>
         <a:xfrm>
-          <a:off x="4667770" y="4685993"/>
-          <a:ext cx="478854" cy="239427"/>
+          <a:off x="4671789" y="4882181"/>
+          <a:ext cx="498946" cy="249473"/>
         </a:xfrm>
         <a:prstGeom prst="roundRect">
           <a:avLst>
@@ -6889,12 +6828,12 @@
         </a:fontRef>
       </dsp:style>
       <dsp:txBody>
-        <a:bodyPr spcFirstLastPara="0" vert="horz" wrap="square" lIns="8890" tIns="8890" rIns="8890" bIns="8890" numCol="1" spcCol="1270" anchor="ctr" anchorCtr="0">
+        <a:bodyPr spcFirstLastPara="0" vert="horz" wrap="square" lIns="9525" tIns="9525" rIns="9525" bIns="9525" numCol="1" spcCol="1270" anchor="ctr" anchorCtr="0">
           <a:noAutofit/>
         </a:bodyPr>
         <a:lstStyle/>
         <a:p>
-          <a:pPr marL="0" lvl="0" indent="0" algn="ctr" defTabSz="622300">
+          <a:pPr marL="0" lvl="0" indent="0" algn="ctr" defTabSz="666750">
             <a:lnSpc>
               <a:spcPct val="90000"/>
             </a:lnSpc>
@@ -6907,14 +6846,14 @@
             <a:buNone/>
           </a:pPr>
           <a:r>
-            <a:rPr lang="en-US" sz="1400" kern="1200" dirty="0"/>
+            <a:rPr lang="en-US" sz="1500" kern="1200" dirty="0"/>
             <a:t>chr18</a:t>
           </a:r>
         </a:p>
       </dsp:txBody>
       <dsp:txXfrm>
-        <a:off x="4674783" y="4693006"/>
-        <a:ext cx="464828" cy="225401"/>
+        <a:off x="4679096" y="4889488"/>
+        <a:ext cx="484332" cy="234859"/>
       </dsp:txXfrm>
     </dsp:sp>
     <dsp:sp modelId="{FEEAB88C-3FA1-FD49-957A-DBD4B72C6CE6}">
@@ -6923,9 +6862,9 @@
         <dsp:cNvSpPr/>
       </dsp:nvSpPr>
       <dsp:spPr>
-        <a:xfrm rot="4101685">
-          <a:off x="3447611" y="4249286"/>
-          <a:ext cx="1782881" cy="6284"/>
+        <a:xfrm rot="4192995">
+          <a:off x="3333413" y="4355427"/>
+          <a:ext cx="1991728" cy="6547"/>
         </a:xfrm>
         <a:custGeom>
           <a:avLst/>
@@ -6936,10 +6875,10 @@
           <a:pathLst>
             <a:path>
               <a:moveTo>
-                <a:pt x="0" y="3142"/>
+                <a:pt x="0" y="3273"/>
               </a:moveTo>
               <a:lnTo>
-                <a:pt x="1782881" y="3142"/>
+                <a:pt x="1991728" y="3273"/>
               </a:lnTo>
             </a:path>
           </a:pathLst>
@@ -6978,7 +6917,7 @@
         </a:bodyPr>
         <a:lstStyle/>
         <a:p>
-          <a:pPr marL="0" lvl="0" indent="0" algn="ctr" defTabSz="266700">
+          <a:pPr marL="0" lvl="0" indent="0" algn="ctr" defTabSz="311150">
             <a:lnSpc>
               <a:spcPct val="90000"/>
             </a:lnSpc>
@@ -6990,12 +6929,12 @@
             </a:spcAft>
             <a:buNone/>
           </a:pPr>
-          <a:endParaRPr lang="en-US" sz="600" kern="1200"/>
+          <a:endParaRPr lang="en-US" sz="700" kern="1200"/>
         </a:p>
       </dsp:txBody>
       <dsp:txXfrm>
-        <a:off x="4294479" y="4207856"/>
-        <a:ext cx="89144" cy="89144"/>
+        <a:off x="4279484" y="4308908"/>
+        <a:ext cx="99586" cy="99586"/>
       </dsp:txXfrm>
     </dsp:sp>
     <dsp:sp modelId="{BAE0FEAE-239B-CD46-B8BC-6C53DD99554A}">
@@ -7005,8 +6944,8 @@
       </dsp:nvSpPr>
       <dsp:spPr>
         <a:xfrm>
-          <a:off x="4667770" y="4961334"/>
-          <a:ext cx="478854" cy="239427"/>
+          <a:off x="4671789" y="5169075"/>
+          <a:ext cx="498946" cy="249473"/>
         </a:xfrm>
         <a:prstGeom prst="roundRect">
           <a:avLst>
@@ -7050,12 +6989,12 @@
         </a:fontRef>
       </dsp:style>
       <dsp:txBody>
-        <a:bodyPr spcFirstLastPara="0" vert="horz" wrap="square" lIns="8890" tIns="8890" rIns="8890" bIns="8890" numCol="1" spcCol="1270" anchor="ctr" anchorCtr="0">
+        <a:bodyPr spcFirstLastPara="0" vert="horz" wrap="square" lIns="9525" tIns="9525" rIns="9525" bIns="9525" numCol="1" spcCol="1270" anchor="ctr" anchorCtr="0">
           <a:noAutofit/>
         </a:bodyPr>
         <a:lstStyle/>
         <a:p>
-          <a:pPr marL="0" lvl="0" indent="0" algn="ctr" defTabSz="622300">
+          <a:pPr marL="0" lvl="0" indent="0" algn="ctr" defTabSz="666750">
             <a:lnSpc>
               <a:spcPct val="90000"/>
             </a:lnSpc>
@@ -7068,14 +7007,14 @@
             <a:buNone/>
           </a:pPr>
           <a:r>
-            <a:rPr lang="en-US" sz="1400" kern="1200" dirty="0"/>
+            <a:rPr lang="en-US" sz="1500" kern="1200" dirty="0"/>
             <a:t>chr19</a:t>
           </a:r>
         </a:p>
       </dsp:txBody>
       <dsp:txXfrm>
-        <a:off x="4674783" y="4968347"/>
-        <a:ext cx="464828" cy="225401"/>
+        <a:off x="4679096" y="5176382"/>
+        <a:ext cx="484332" cy="234859"/>
       </dsp:txXfrm>
     </dsp:sp>
     <dsp:sp modelId="{C1A4BF2C-CE03-C249-9398-0EE1FC713264}">
@@ -7084,9 +7023,9 @@
         <dsp:cNvSpPr/>
       </dsp:nvSpPr>
       <dsp:spPr>
-        <a:xfrm rot="4272742">
-          <a:off x="3318378" y="4386957"/>
-          <a:ext cx="2041345" cy="6284"/>
+        <a:xfrm rot="4342919">
+          <a:off x="3197641" y="4498874"/>
+          <a:ext cx="2263271" cy="6547"/>
         </a:xfrm>
         <a:custGeom>
           <a:avLst/>
@@ -7097,10 +7036,10 @@
           <a:pathLst>
             <a:path>
               <a:moveTo>
-                <a:pt x="0" y="3142"/>
+                <a:pt x="0" y="3273"/>
               </a:moveTo>
               <a:lnTo>
-                <a:pt x="2041345" y="3142"/>
+                <a:pt x="2263271" y="3273"/>
               </a:lnTo>
             </a:path>
           </a:pathLst>
@@ -7139,7 +7078,7 @@
         </a:bodyPr>
         <a:lstStyle/>
         <a:p>
-          <a:pPr marL="0" lvl="0" indent="0" algn="ctr" defTabSz="311150">
+          <a:pPr marL="0" lvl="0" indent="0" algn="ctr" defTabSz="355600">
             <a:lnSpc>
               <a:spcPct val="90000"/>
             </a:lnSpc>
@@ -7151,12 +7090,12 @@
             </a:spcAft>
             <a:buNone/>
           </a:pPr>
-          <a:endParaRPr lang="en-US" sz="700" kern="1200"/>
+          <a:endParaRPr lang="en-US" sz="800" kern="1200"/>
         </a:p>
       </dsp:txBody>
       <dsp:txXfrm>
-        <a:off x="4288018" y="4339065"/>
-        <a:ext cx="102067" cy="102067"/>
+        <a:off x="4272695" y="4445566"/>
+        <a:ext cx="113163" cy="113163"/>
       </dsp:txXfrm>
     </dsp:sp>
     <dsp:sp modelId="{E64CE84F-B3E9-D247-A32A-2ED6AFE3B3A4}">
@@ -7166,8 +7105,8 @@
       </dsp:nvSpPr>
       <dsp:spPr>
         <a:xfrm>
-          <a:off x="4667770" y="5236675"/>
-          <a:ext cx="478854" cy="239427"/>
+          <a:off x="4671789" y="5455969"/>
+          <a:ext cx="498946" cy="249473"/>
         </a:xfrm>
         <a:prstGeom prst="roundRect">
           <a:avLst>
@@ -7211,12 +7150,12 @@
         </a:fontRef>
       </dsp:style>
       <dsp:txBody>
-        <a:bodyPr spcFirstLastPara="0" vert="horz" wrap="square" lIns="8890" tIns="8890" rIns="8890" bIns="8890" numCol="1" spcCol="1270" anchor="ctr" anchorCtr="0">
+        <a:bodyPr spcFirstLastPara="0" vert="horz" wrap="square" lIns="9525" tIns="9525" rIns="9525" bIns="9525" numCol="1" spcCol="1270" anchor="ctr" anchorCtr="0">
           <a:noAutofit/>
         </a:bodyPr>
         <a:lstStyle/>
         <a:p>
-          <a:pPr marL="0" lvl="0" indent="0" algn="ctr" defTabSz="622300">
+          <a:pPr marL="0" lvl="0" indent="0" algn="ctr" defTabSz="666750">
             <a:lnSpc>
               <a:spcPct val="90000"/>
             </a:lnSpc>
@@ -7229,14 +7168,14 @@
             <a:buNone/>
           </a:pPr>
           <a:r>
-            <a:rPr lang="en-US" sz="1400" kern="1200" dirty="0"/>
+            <a:rPr lang="en-US" sz="1500" kern="1200" dirty="0"/>
             <a:t>chr20</a:t>
           </a:r>
         </a:p>
       </dsp:txBody>
       <dsp:txXfrm>
-        <a:off x="4674783" y="5243688"/>
-        <a:ext cx="464828" cy="225401"/>
+        <a:off x="4679096" y="5463276"/>
+        <a:ext cx="484332" cy="234859"/>
       </dsp:txXfrm>
     </dsp:sp>
     <dsp:sp modelId="{5A867635-C7C9-0543-AD10-1815728B35A0}">
@@ -7245,9 +7184,9 @@
         <dsp:cNvSpPr/>
       </dsp:nvSpPr>
       <dsp:spPr>
-        <a:xfrm rot="4405103">
-          <a:off x="3187189" y="4524627"/>
-          <a:ext cx="2303723" cy="6284"/>
+        <a:xfrm rot="4460551">
+          <a:off x="3060180" y="4642321"/>
+          <a:ext cx="2538195" cy="6547"/>
         </a:xfrm>
         <a:custGeom>
           <a:avLst/>
@@ -7258,10 +7197,10 @@
           <a:pathLst>
             <a:path>
               <a:moveTo>
-                <a:pt x="0" y="3142"/>
+                <a:pt x="0" y="3273"/>
               </a:moveTo>
               <a:lnTo>
-                <a:pt x="2303723" y="3142"/>
+                <a:pt x="2538195" y="3273"/>
               </a:lnTo>
             </a:path>
           </a:pathLst>
@@ -7300,7 +7239,7 @@
         </a:bodyPr>
         <a:lstStyle/>
         <a:p>
-          <a:pPr marL="0" lvl="0" indent="0" algn="ctr" defTabSz="355600">
+          <a:pPr marL="0" lvl="0" indent="0" algn="ctr" defTabSz="400050">
             <a:lnSpc>
               <a:spcPct val="90000"/>
             </a:lnSpc>
@@ -7312,12 +7251,12 @@
             </a:spcAft>
             <a:buNone/>
           </a:pPr>
-          <a:endParaRPr lang="en-US" sz="800" kern="1200"/>
+          <a:endParaRPr lang="en-US" sz="900" kern="1200"/>
         </a:p>
       </dsp:txBody>
       <dsp:txXfrm>
-        <a:off x="4281458" y="4470176"/>
-        <a:ext cx="115186" cy="115186"/>
+        <a:off x="4265822" y="4582140"/>
+        <a:ext cx="126909" cy="126909"/>
       </dsp:txXfrm>
     </dsp:sp>
     <dsp:sp modelId="{34B2AC0E-F2BF-1243-8FCC-E2ED149030BD}">
@@ -7327,8 +7266,8 @@
       </dsp:nvSpPr>
       <dsp:spPr>
         <a:xfrm>
-          <a:off x="4667770" y="5512017"/>
-          <a:ext cx="478854" cy="239427"/>
+          <a:off x="4671789" y="5742863"/>
+          <a:ext cx="498946" cy="249473"/>
         </a:xfrm>
         <a:prstGeom prst="roundRect">
           <a:avLst>
@@ -7372,12 +7311,12 @@
         </a:fontRef>
       </dsp:style>
       <dsp:txBody>
-        <a:bodyPr spcFirstLastPara="0" vert="horz" wrap="square" lIns="8890" tIns="8890" rIns="8890" bIns="8890" numCol="1" spcCol="1270" anchor="ctr" anchorCtr="0">
+        <a:bodyPr spcFirstLastPara="0" vert="horz" wrap="square" lIns="9525" tIns="9525" rIns="9525" bIns="9525" numCol="1" spcCol="1270" anchor="ctr" anchorCtr="0">
           <a:noAutofit/>
         </a:bodyPr>
         <a:lstStyle/>
         <a:p>
-          <a:pPr marL="0" lvl="0" indent="0" algn="ctr" defTabSz="622300">
+          <a:pPr marL="0" lvl="0" indent="0" algn="ctr" defTabSz="666750">
             <a:lnSpc>
               <a:spcPct val="90000"/>
             </a:lnSpc>
@@ -7390,14 +7329,14 @@
             <a:buNone/>
           </a:pPr>
           <a:r>
-            <a:rPr lang="en-US" sz="1400" kern="1200" dirty="0"/>
+            <a:rPr lang="en-US" sz="1500" kern="1200" dirty="0"/>
             <a:t>chr21</a:t>
           </a:r>
         </a:p>
       </dsp:txBody>
       <dsp:txXfrm>
-        <a:off x="4674783" y="5519030"/>
-        <a:ext cx="464828" cy="225401"/>
+        <a:off x="4679096" y="5750170"/>
+        <a:ext cx="484332" cy="234859"/>
       </dsp:txXfrm>
     </dsp:sp>
     <dsp:sp modelId="{B4DD0CD4-6CF2-F148-8458-F4E7BBF4367B}">
@@ -7406,9 +7345,9 @@
         <dsp:cNvSpPr/>
       </dsp:nvSpPr>
       <dsp:spPr>
-        <a:xfrm rot="4510276">
-          <a:off x="3054643" y="4662298"/>
-          <a:ext cx="2568816" cy="6284"/>
+        <a:xfrm rot="4555104">
+          <a:off x="2921523" y="4785768"/>
+          <a:ext cx="2815508" cy="6547"/>
         </a:xfrm>
         <a:custGeom>
           <a:avLst/>
@@ -7419,10 +7358,10 @@
           <a:pathLst>
             <a:path>
               <a:moveTo>
-                <a:pt x="0" y="3142"/>
+                <a:pt x="0" y="3273"/>
               </a:moveTo>
               <a:lnTo>
-                <a:pt x="2568816" y="3142"/>
+                <a:pt x="2815508" y="3273"/>
               </a:lnTo>
             </a:path>
           </a:pathLst>
@@ -7461,7 +7400,7 @@
         </a:bodyPr>
         <a:lstStyle/>
         <a:p>
-          <a:pPr marL="0" lvl="0" indent="0" algn="ctr" defTabSz="400050">
+          <a:pPr marL="0" lvl="0" indent="0" algn="ctr" defTabSz="444500">
             <a:lnSpc>
               <a:spcPct val="90000"/>
             </a:lnSpc>
@@ -7473,12 +7412,12 @@
             </a:spcAft>
             <a:buNone/>
           </a:pPr>
-          <a:endParaRPr lang="en-US" sz="900" kern="1200"/>
+          <a:endParaRPr lang="en-US" sz="1000" kern="1200"/>
         </a:p>
       </dsp:txBody>
       <dsp:txXfrm>
-        <a:off x="4274831" y="4601220"/>
-        <a:ext cx="128440" cy="128440"/>
+        <a:off x="4258889" y="4718655"/>
+        <a:ext cx="140775" cy="140775"/>
       </dsp:txXfrm>
     </dsp:sp>
     <dsp:sp modelId="{F21CA52C-B75C-4A4B-B197-8AC086F7F825}">
@@ -7488,8 +7427,8 @@
       </dsp:nvSpPr>
       <dsp:spPr>
         <a:xfrm>
-          <a:off x="4667770" y="5787358"/>
-          <a:ext cx="478854" cy="239427"/>
+          <a:off x="4671789" y="6029757"/>
+          <a:ext cx="498946" cy="249473"/>
         </a:xfrm>
         <a:prstGeom prst="roundRect">
           <a:avLst>
@@ -7533,12 +7472,12 @@
         </a:fontRef>
       </dsp:style>
       <dsp:txBody>
-        <a:bodyPr spcFirstLastPara="0" vert="horz" wrap="square" lIns="8890" tIns="8890" rIns="8890" bIns="8890" numCol="1" spcCol="1270" anchor="ctr" anchorCtr="0">
+        <a:bodyPr spcFirstLastPara="0" vert="horz" wrap="square" lIns="9525" tIns="9525" rIns="9525" bIns="9525" numCol="1" spcCol="1270" anchor="ctr" anchorCtr="0">
           <a:noAutofit/>
         </a:bodyPr>
         <a:lstStyle/>
         <a:p>
-          <a:pPr marL="0" lvl="0" indent="0" algn="ctr" defTabSz="622300">
+          <a:pPr marL="0" lvl="0" indent="0" algn="ctr" defTabSz="666750">
             <a:lnSpc>
               <a:spcPct val="90000"/>
             </a:lnSpc>
@@ -7551,25 +7490,25 @@
             <a:buNone/>
           </a:pPr>
           <a:r>
-            <a:rPr lang="en-US" sz="1400" kern="1200" dirty="0"/>
+            <a:rPr lang="en-US" sz="1500" kern="1200" dirty="0"/>
             <a:t>chr22</a:t>
           </a:r>
         </a:p>
       </dsp:txBody>
       <dsp:txXfrm>
-        <a:off x="4674783" y="5794371"/>
-        <a:ext cx="464828" cy="225401"/>
+        <a:off x="4679096" y="6037064"/>
+        <a:ext cx="484332" cy="234859"/>
       </dsp:txXfrm>
     </dsp:sp>
-    <dsp:sp modelId="{114B6E05-9A1A-DC4F-BE03-42FAF049F489}">
+    <dsp:sp modelId="{EC2E63CA-2EC9-0F4E-9D1F-3AFD2B926D14}">
       <dsp:nvSpPr>
         <dsp:cNvPr id="0" name=""/>
         <dsp:cNvSpPr/>
       </dsp:nvSpPr>
       <dsp:spPr>
-        <a:xfrm rot="4595710">
-          <a:off x="2921119" y="4799969"/>
-          <a:ext cx="2835863" cy="6284"/>
+        <a:xfrm rot="4632654">
+          <a:off x="2781993" y="4929215"/>
+          <a:ext cx="3094568" cy="6547"/>
         </a:xfrm>
         <a:custGeom>
           <a:avLst/>
@@ -7580,10 +7519,10 @@
           <a:pathLst>
             <a:path>
               <a:moveTo>
-                <a:pt x="0" y="3142"/>
+                <a:pt x="0" y="3273"/>
               </a:moveTo>
               <a:lnTo>
-                <a:pt x="2835863" y="3142"/>
+                <a:pt x="3094568" y="3273"/>
               </a:lnTo>
             </a:path>
           </a:pathLst>
@@ -7622,7 +7561,7 @@
         </a:bodyPr>
         <a:lstStyle/>
         <a:p>
-          <a:pPr marL="0" lvl="0" indent="0" algn="ctr" defTabSz="444500">
+          <a:pPr marL="0" lvl="0" indent="0" algn="ctr" defTabSz="488950">
             <a:lnSpc>
               <a:spcPct val="90000"/>
             </a:lnSpc>
@@ -7634,23 +7573,23 @@
             </a:spcAft>
             <a:buNone/>
           </a:pPr>
-          <a:endParaRPr lang="en-US" sz="1000" kern="1200"/>
+          <a:endParaRPr lang="en-US" sz="1100" kern="1200"/>
         </a:p>
       </dsp:txBody>
       <dsp:txXfrm>
-        <a:off x="4268155" y="4732214"/>
-        <a:ext cx="141793" cy="141793"/>
+        <a:off x="4251913" y="4855125"/>
+        <a:ext cx="154728" cy="154728"/>
       </dsp:txXfrm>
     </dsp:sp>
-    <dsp:sp modelId="{F98C6F64-C2A4-AF42-8FAD-334EABD39D16}">
+    <dsp:sp modelId="{DF821C6A-036F-BF4C-A79F-2767F5017844}">
       <dsp:nvSpPr>
         <dsp:cNvPr id="0" name=""/>
         <dsp:cNvSpPr/>
       </dsp:nvSpPr>
       <dsp:spPr>
         <a:xfrm>
-          <a:off x="4667770" y="6062699"/>
-          <a:ext cx="478854" cy="239427"/>
+          <a:off x="4671789" y="6316651"/>
+          <a:ext cx="498946" cy="249473"/>
         </a:xfrm>
         <a:prstGeom prst="roundRect">
           <a:avLst>
@@ -7694,12 +7633,12 @@
         </a:fontRef>
       </dsp:style>
       <dsp:txBody>
-        <a:bodyPr spcFirstLastPara="0" vert="horz" wrap="square" lIns="8890" tIns="8890" rIns="8890" bIns="8890" numCol="1" spcCol="1270" anchor="ctr" anchorCtr="0">
+        <a:bodyPr spcFirstLastPara="0" vert="horz" wrap="square" lIns="9525" tIns="9525" rIns="9525" bIns="9525" numCol="1" spcCol="1270" anchor="ctr" anchorCtr="0">
           <a:noAutofit/>
         </a:bodyPr>
         <a:lstStyle/>
         <a:p>
-          <a:pPr marL="0" lvl="0" indent="0" algn="ctr" defTabSz="622300">
+          <a:pPr marL="0" lvl="0" indent="0" algn="ctr" defTabSz="666750">
             <a:lnSpc>
               <a:spcPct val="90000"/>
             </a:lnSpc>
@@ -7712,26 +7651,26 @@
             <a:buNone/>
           </a:pPr>
           <a:r>
-            <a:rPr lang="en-US" sz="1400" kern="1200" dirty="0" err="1"/>
-            <a:t>chrM</a:t>
+            <a:rPr lang="en-US" sz="1500" kern="1200" dirty="0" err="1"/>
+            <a:t>chrX</a:t>
           </a:r>
-          <a:endParaRPr lang="en-US" sz="1400" kern="1200" dirty="0"/>
+          <a:endParaRPr lang="en-US" sz="1500" kern="1200" dirty="0"/>
         </a:p>
       </dsp:txBody>
       <dsp:txXfrm>
-        <a:off x="4674783" y="6069712"/>
-        <a:ext cx="464828" cy="225401"/>
+        <a:off x="4679096" y="6323958"/>
+        <a:ext cx="484332" cy="234859"/>
       </dsp:txXfrm>
     </dsp:sp>
-    <dsp:sp modelId="{06283703-33C4-FF4D-AF1E-B1E876AACC28}">
+    <dsp:sp modelId="{2E7EC5D6-C9BB-8545-81A7-27940D1777C1}">
       <dsp:nvSpPr>
         <dsp:cNvPr id="0" name=""/>
         <dsp:cNvSpPr/>
       </dsp:nvSpPr>
       <dsp:spPr>
-        <a:xfrm rot="4666402">
-          <a:off x="2786871" y="4937639"/>
-          <a:ext cx="3104359" cy="6284"/>
+        <a:xfrm rot="4697347">
+          <a:off x="2641806" y="5072662"/>
+          <a:ext cx="3374942" cy="6547"/>
         </a:xfrm>
         <a:custGeom>
           <a:avLst/>
@@ -7742,10 +7681,10 @@
           <a:pathLst>
             <a:path>
               <a:moveTo>
-                <a:pt x="0" y="3142"/>
+                <a:pt x="0" y="3273"/>
               </a:moveTo>
               <a:lnTo>
-                <a:pt x="3104359" y="3142"/>
+                <a:pt x="3374942" y="3273"/>
               </a:lnTo>
             </a:path>
           </a:pathLst>
@@ -7784,7 +7723,7 @@
         </a:bodyPr>
         <a:lstStyle/>
         <a:p>
-          <a:pPr marL="0" lvl="0" indent="0" algn="ctr" defTabSz="488950">
+          <a:pPr marL="0" lvl="0" indent="0" algn="ctr" defTabSz="533400">
             <a:lnSpc>
               <a:spcPct val="90000"/>
             </a:lnSpc>
@@ -7796,23 +7735,23 @@
             </a:spcAft>
             <a:buNone/>
           </a:pPr>
-          <a:endParaRPr lang="en-US" sz="1100" kern="1200"/>
+          <a:endParaRPr lang="en-US" sz="1200" kern="1200"/>
         </a:p>
       </dsp:txBody>
       <dsp:txXfrm>
-        <a:off x="4261442" y="4863172"/>
-        <a:ext cx="155217" cy="155217"/>
+        <a:off x="4244904" y="4991563"/>
+        <a:ext cx="168747" cy="168747"/>
       </dsp:txXfrm>
     </dsp:sp>
-    <dsp:sp modelId="{D7567818-17D6-8B4A-B431-A93BB6E6F124}">
+    <dsp:sp modelId="{0FB4856C-5335-3A43-9584-3D6694A05062}">
       <dsp:nvSpPr>
         <dsp:cNvPr id="0" name=""/>
         <dsp:cNvSpPr/>
       </dsp:nvSpPr>
       <dsp:spPr>
         <a:xfrm>
-          <a:off x="4667770" y="6338041"/>
-          <a:ext cx="478854" cy="239427"/>
+          <a:off x="4671789" y="6603545"/>
+          <a:ext cx="498946" cy="249473"/>
         </a:xfrm>
         <a:prstGeom prst="roundRect">
           <a:avLst>
@@ -7856,12 +7795,12 @@
         </a:fontRef>
       </dsp:style>
       <dsp:txBody>
-        <a:bodyPr spcFirstLastPara="0" vert="horz" wrap="square" lIns="8890" tIns="8890" rIns="8890" bIns="8890" numCol="1" spcCol="1270" anchor="ctr" anchorCtr="0">
+        <a:bodyPr spcFirstLastPara="0" vert="horz" wrap="square" lIns="9525" tIns="9525" rIns="9525" bIns="9525" numCol="1" spcCol="1270" anchor="ctr" anchorCtr="0">
           <a:noAutofit/>
         </a:bodyPr>
         <a:lstStyle/>
         <a:p>
-          <a:pPr marL="0" lvl="0" indent="0" algn="ctr" defTabSz="622300">
+          <a:pPr marL="0" lvl="0" indent="0" algn="ctr" defTabSz="666750">
             <a:lnSpc>
               <a:spcPct val="90000"/>
             </a:lnSpc>
@@ -7874,177 +7813,15 @@
             <a:buNone/>
           </a:pPr>
           <a:r>
-            <a:rPr lang="en-US" sz="1400" kern="1200" dirty="0" err="1"/>
-            <a:t>chrX</a:t>
+            <a:rPr lang="en-US" sz="1500" kern="1200" dirty="0" err="1"/>
+            <a:t>chrY</a:t>
           </a:r>
-          <a:endParaRPr lang="en-US" sz="1400" kern="1200" dirty="0"/>
+          <a:endParaRPr lang="en-US" sz="1500" kern="1200" dirty="0"/>
         </a:p>
       </dsp:txBody>
       <dsp:txXfrm>
-        <a:off x="4674783" y="6345054"/>
-        <a:ext cx="464828" cy="225401"/>
-      </dsp:txXfrm>
-    </dsp:sp>
-    <dsp:sp modelId="{930BB466-81C3-F843-B23D-2A44CCB5F756}">
-      <dsp:nvSpPr>
-        <dsp:cNvPr id="0" name=""/>
-        <dsp:cNvSpPr/>
-      </dsp:nvSpPr>
-      <dsp:spPr>
-        <a:xfrm rot="4725819">
-          <a:off x="2652071" y="5075310"/>
-          <a:ext cx="3373959" cy="6284"/>
-        </a:xfrm>
-        <a:custGeom>
-          <a:avLst/>
-          <a:gdLst/>
-          <a:ahLst/>
-          <a:cxnLst/>
-          <a:rect l="0" t="0" r="0" b="0"/>
-          <a:pathLst>
-            <a:path>
-              <a:moveTo>
-                <a:pt x="0" y="3142"/>
-              </a:moveTo>
-              <a:lnTo>
-                <a:pt x="3373959" y="3142"/>
-              </a:lnTo>
-            </a:path>
-          </a:pathLst>
-        </a:custGeom>
-        <a:noFill/>
-        <a:ln w="12700" cap="flat" cmpd="sng" algn="ctr">
-          <a:solidFill>
-            <a:schemeClr val="accent1">
-              <a:shade val="60000"/>
-              <a:hueOff val="0"/>
-              <a:satOff val="0"/>
-              <a:lumOff val="0"/>
-              <a:alphaOff val="0"/>
-            </a:schemeClr>
-          </a:solidFill>
-          <a:prstDash val="solid"/>
-          <a:miter lim="800000"/>
-        </a:ln>
-        <a:effectLst/>
-      </dsp:spPr>
-      <dsp:style>
-        <a:lnRef idx="2">
-          <a:scrgbClr r="0" g="0" b="0"/>
-        </a:lnRef>
-        <a:fillRef idx="0">
-          <a:scrgbClr r="0" g="0" b="0"/>
-        </a:fillRef>
-        <a:effectRef idx="0">
-          <a:scrgbClr r="0" g="0" b="0"/>
-        </a:effectRef>
-        <a:fontRef idx="minor"/>
-      </dsp:style>
-      <dsp:txBody>
-        <a:bodyPr spcFirstLastPara="0" vert="horz" wrap="square" lIns="12700" tIns="0" rIns="12700" bIns="0" numCol="1" spcCol="1270" anchor="ctr" anchorCtr="0">
-          <a:noAutofit/>
-        </a:bodyPr>
-        <a:lstStyle/>
-        <a:p>
-          <a:pPr marL="0" lvl="0" indent="0" algn="ctr" defTabSz="533400">
-            <a:lnSpc>
-              <a:spcPct val="90000"/>
-            </a:lnSpc>
-            <a:spcBef>
-              <a:spcPct val="0"/>
-            </a:spcBef>
-            <a:spcAft>
-              <a:spcPct val="35000"/>
-            </a:spcAft>
-            <a:buNone/>
-          </a:pPr>
-          <a:endParaRPr lang="en-US" sz="1200" kern="1200"/>
-        </a:p>
-      </dsp:txBody>
-      <dsp:txXfrm>
-        <a:off x="4254702" y="4994103"/>
-        <a:ext cx="168697" cy="168697"/>
-      </dsp:txXfrm>
-    </dsp:sp>
-    <dsp:sp modelId="{7A789CAC-4CAA-3A43-A2FE-FFDDD364D4C8}">
-      <dsp:nvSpPr>
-        <dsp:cNvPr id="0" name=""/>
-        <dsp:cNvSpPr/>
-      </dsp:nvSpPr>
-      <dsp:spPr>
-        <a:xfrm>
-          <a:off x="4667770" y="6613382"/>
-          <a:ext cx="478854" cy="239427"/>
-        </a:xfrm>
-        <a:prstGeom prst="roundRect">
-          <a:avLst>
-            <a:gd name="adj" fmla="val 10000"/>
-          </a:avLst>
-        </a:prstGeom>
-        <a:solidFill>
-          <a:schemeClr val="accent1">
-            <a:hueOff val="0"/>
-            <a:satOff val="0"/>
-            <a:lumOff val="0"/>
-            <a:alphaOff val="0"/>
-          </a:schemeClr>
-        </a:solidFill>
-        <a:ln w="12700" cap="flat" cmpd="sng" algn="ctr">
-          <a:solidFill>
-            <a:schemeClr val="lt1">
-              <a:hueOff val="0"/>
-              <a:satOff val="0"/>
-              <a:lumOff val="0"/>
-              <a:alphaOff val="0"/>
-            </a:schemeClr>
-          </a:solidFill>
-          <a:prstDash val="solid"/>
-          <a:miter lim="800000"/>
-        </a:ln>
-        <a:effectLst/>
-      </dsp:spPr>
-      <dsp:style>
-        <a:lnRef idx="2">
-          <a:scrgbClr r="0" g="0" b="0"/>
-        </a:lnRef>
-        <a:fillRef idx="1">
-          <a:scrgbClr r="0" g="0" b="0"/>
-        </a:fillRef>
-        <a:effectRef idx="0">
-          <a:scrgbClr r="0" g="0" b="0"/>
-        </a:effectRef>
-        <a:fontRef idx="minor">
-          <a:schemeClr val="lt1"/>
-        </a:fontRef>
-      </dsp:style>
-      <dsp:txBody>
-        <a:bodyPr spcFirstLastPara="0" vert="horz" wrap="square" lIns="8890" tIns="8890" rIns="8890" bIns="8890" numCol="1" spcCol="1270" anchor="ctr" anchorCtr="0">
-          <a:noAutofit/>
-        </a:bodyPr>
-        <a:lstStyle/>
-        <a:p>
-          <a:pPr marL="0" lvl="0" indent="0" algn="ctr" defTabSz="622300">
-            <a:lnSpc>
-              <a:spcPct val="90000"/>
-            </a:lnSpc>
-            <a:spcBef>
-              <a:spcPct val="0"/>
-            </a:spcBef>
-            <a:spcAft>
-              <a:spcPct val="35000"/>
-            </a:spcAft>
-            <a:buNone/>
-          </a:pPr>
-          <a:r>
-            <a:rPr lang="en-US" sz="1400" kern="1200" dirty="0" err="1"/>
-            <a:t>chrY</a:t>
-          </a:r>
-          <a:endParaRPr lang="en-US" sz="1400" kern="1200" dirty="0"/>
-        </a:p>
-      </dsp:txBody>
-      <dsp:txXfrm>
-        <a:off x="4674783" y="6620395"/>
-        <a:ext cx="464828" cy="225401"/>
+        <a:off x="4679096" y="6610852"/>
+        <a:ext cx="484332" cy="234859"/>
       </dsp:txXfrm>
     </dsp:sp>
   </dsp:spTree>
@@ -11040,7 +10817,7 @@
           <a:p>
             <a:fld id="{F258A75F-AC31-414C-AAA2-06DCCA98D3AC}" type="datetimeFigureOut">
               <a:rPr lang="en-US" smtClean="0"/>
-              <a:t>6/14/19</a:t>
+              <a:t>6/19/19</a:t>
             </a:fld>
             <a:endParaRPr lang="en-US"/>
           </a:p>
@@ -11538,7 +11315,7 @@
           <a:p>
             <a:fld id="{083D0FB7-B877-2D49-A701-9CDD7FB3CBCF}" type="datetimeFigureOut">
               <a:rPr lang="en-US" smtClean="0"/>
-              <a:t>6/14/19</a:t>
+              <a:t>6/19/19</a:t>
             </a:fld>
             <a:endParaRPr lang="en-US"/>
           </a:p>
@@ -11736,7 +11513,7 @@
           <a:p>
             <a:fld id="{083D0FB7-B877-2D49-A701-9CDD7FB3CBCF}" type="datetimeFigureOut">
               <a:rPr lang="en-US" smtClean="0"/>
-              <a:t>6/14/19</a:t>
+              <a:t>6/19/19</a:t>
             </a:fld>
             <a:endParaRPr lang="en-US"/>
           </a:p>
@@ -11944,7 +11721,7 @@
           <a:p>
             <a:fld id="{083D0FB7-B877-2D49-A701-9CDD7FB3CBCF}" type="datetimeFigureOut">
               <a:rPr lang="en-US" smtClean="0"/>
-              <a:t>6/14/19</a:t>
+              <a:t>6/19/19</a:t>
             </a:fld>
             <a:endParaRPr lang="en-US"/>
           </a:p>
@@ -12142,7 +11919,7 @@
           <a:p>
             <a:fld id="{083D0FB7-B877-2D49-A701-9CDD7FB3CBCF}" type="datetimeFigureOut">
               <a:rPr lang="en-US" smtClean="0"/>
-              <a:t>6/14/19</a:t>
+              <a:t>6/19/19</a:t>
             </a:fld>
             <a:endParaRPr lang="en-US"/>
           </a:p>
@@ -12417,7 +12194,7 @@
           <a:p>
             <a:fld id="{083D0FB7-B877-2D49-A701-9CDD7FB3CBCF}" type="datetimeFigureOut">
               <a:rPr lang="en-US" smtClean="0"/>
-              <a:t>6/14/19</a:t>
+              <a:t>6/19/19</a:t>
             </a:fld>
             <a:endParaRPr lang="en-US"/>
           </a:p>
@@ -12682,7 +12459,7 @@
           <a:p>
             <a:fld id="{083D0FB7-B877-2D49-A701-9CDD7FB3CBCF}" type="datetimeFigureOut">
               <a:rPr lang="en-US" smtClean="0"/>
-              <a:t>6/14/19</a:t>
+              <a:t>6/19/19</a:t>
             </a:fld>
             <a:endParaRPr lang="en-US"/>
           </a:p>
@@ -13094,7 +12871,7 @@
           <a:p>
             <a:fld id="{083D0FB7-B877-2D49-A701-9CDD7FB3CBCF}" type="datetimeFigureOut">
               <a:rPr lang="en-US" smtClean="0"/>
-              <a:t>6/14/19</a:t>
+              <a:t>6/19/19</a:t>
             </a:fld>
             <a:endParaRPr lang="en-US"/>
           </a:p>
@@ -13235,7 +13012,7 @@
           <a:p>
             <a:fld id="{083D0FB7-B877-2D49-A701-9CDD7FB3CBCF}" type="datetimeFigureOut">
               <a:rPr lang="en-US" smtClean="0"/>
-              <a:t>6/14/19</a:t>
+              <a:t>6/19/19</a:t>
             </a:fld>
             <a:endParaRPr lang="en-US"/>
           </a:p>
@@ -13348,7 +13125,7 @@
           <a:p>
             <a:fld id="{083D0FB7-B877-2D49-A701-9CDD7FB3CBCF}" type="datetimeFigureOut">
               <a:rPr lang="en-US" smtClean="0"/>
-              <a:t>6/14/19</a:t>
+              <a:t>6/19/19</a:t>
             </a:fld>
             <a:endParaRPr lang="en-US"/>
           </a:p>
@@ -13659,7 +13436,7 @@
           <a:p>
             <a:fld id="{083D0FB7-B877-2D49-A701-9CDD7FB3CBCF}" type="datetimeFigureOut">
               <a:rPr lang="en-US" smtClean="0"/>
-              <a:t>6/14/19</a:t>
+              <a:t>6/19/19</a:t>
             </a:fld>
             <a:endParaRPr lang="en-US"/>
           </a:p>
@@ -13947,7 +13724,7 @@
           <a:p>
             <a:fld id="{083D0FB7-B877-2D49-A701-9CDD7FB3CBCF}" type="datetimeFigureOut">
               <a:rPr lang="en-US" smtClean="0"/>
-              <a:t>6/14/19</a:t>
+              <a:t>6/19/19</a:t>
             </a:fld>
             <a:endParaRPr lang="en-US"/>
           </a:p>
@@ -14188,7 +13965,7 @@
           <a:p>
             <a:fld id="{083D0FB7-B877-2D49-A701-9CDD7FB3CBCF}" type="datetimeFigureOut">
               <a:rPr lang="en-US" smtClean="0"/>
-              <a:t>6/14/19</a:t>
+              <a:t>6/19/19</a:t>
             </a:fld>
             <a:endParaRPr lang="en-US"/>
           </a:p>
@@ -14646,7 +14423,7 @@
           <p:nvPr>
             <p:extLst>
               <p:ext uri="{D42A27DB-BD31-4B8C-83A1-F6EECF244321}">
-                <p14:modId xmlns:p14="http://schemas.microsoft.com/office/powerpoint/2010/main" val="2947783777"/>
+                <p14:modId xmlns:p14="http://schemas.microsoft.com/office/powerpoint/2010/main" val="80184365"/>
               </p:ext>
             </p:extLst>
           </p:nvPr>

</xml_diff>